<commit_message>
add links to slides for ch 6 and 7
</commit_message>
<xml_diff>
--- a/static/img/youtube_thumbnails/video_thumbnail_building.pptx
+++ b/static/img/youtube_thumbnails/video_thumbnail_building.pptx
@@ -8,9 +8,10 @@
     <p:sldId id="259" r:id="rId2"/>
     <p:sldId id="261" r:id="rId3"/>
     <p:sldId id="260" r:id="rId4"/>
-    <p:sldId id="257" r:id="rId5"/>
-    <p:sldId id="256" r:id="rId6"/>
-    <p:sldId id="258" r:id="rId7"/>
+    <p:sldId id="262" r:id="rId5"/>
+    <p:sldId id="257" r:id="rId6"/>
+    <p:sldId id="256" r:id="rId7"/>
+    <p:sldId id="258" r:id="rId8"/>
   </p:sldIdLst>
   <p:sldSz cx="12192000" cy="6858000"/>
   <p:notesSz cx="6858000" cy="9144000"/>
@@ -248,7 +249,7 @@
           <a:p>
             <a:fld id="{3C68F153-927F-4ADA-A90F-AFD816292B90}" type="datetimeFigureOut">
               <a:rPr lang="en-US" smtClean="0"/>
-              <a:t>1/24/2020</a:t>
+              <a:t>2/4/2020</a:t>
             </a:fld>
             <a:endParaRPr lang="en-US"/>
           </a:p>
@@ -418,7 +419,7 @@
           <a:p>
             <a:fld id="{3C68F153-927F-4ADA-A90F-AFD816292B90}" type="datetimeFigureOut">
               <a:rPr lang="en-US" smtClean="0"/>
-              <a:t>1/24/2020</a:t>
+              <a:t>2/4/2020</a:t>
             </a:fld>
             <a:endParaRPr lang="en-US"/>
           </a:p>
@@ -598,7 +599,7 @@
           <a:p>
             <a:fld id="{3C68F153-927F-4ADA-A90F-AFD816292B90}" type="datetimeFigureOut">
               <a:rPr lang="en-US" smtClean="0"/>
-              <a:t>1/24/2020</a:t>
+              <a:t>2/4/2020</a:t>
             </a:fld>
             <a:endParaRPr lang="en-US"/>
           </a:p>
@@ -768,7 +769,7 @@
           <a:p>
             <a:fld id="{3C68F153-927F-4ADA-A90F-AFD816292B90}" type="datetimeFigureOut">
               <a:rPr lang="en-US" smtClean="0"/>
-              <a:t>1/24/2020</a:t>
+              <a:t>2/4/2020</a:t>
             </a:fld>
             <a:endParaRPr lang="en-US"/>
           </a:p>
@@ -1014,7 +1015,7 @@
           <a:p>
             <a:fld id="{3C68F153-927F-4ADA-A90F-AFD816292B90}" type="datetimeFigureOut">
               <a:rPr lang="en-US" smtClean="0"/>
-              <a:t>1/24/2020</a:t>
+              <a:t>2/4/2020</a:t>
             </a:fld>
             <a:endParaRPr lang="en-US"/>
           </a:p>
@@ -1246,7 +1247,7 @@
           <a:p>
             <a:fld id="{3C68F153-927F-4ADA-A90F-AFD816292B90}" type="datetimeFigureOut">
               <a:rPr lang="en-US" smtClean="0"/>
-              <a:t>1/24/2020</a:t>
+              <a:t>2/4/2020</a:t>
             </a:fld>
             <a:endParaRPr lang="en-US"/>
           </a:p>
@@ -1613,7 +1614,7 @@
           <a:p>
             <a:fld id="{3C68F153-927F-4ADA-A90F-AFD816292B90}" type="datetimeFigureOut">
               <a:rPr lang="en-US" smtClean="0"/>
-              <a:t>1/24/2020</a:t>
+              <a:t>2/4/2020</a:t>
             </a:fld>
             <a:endParaRPr lang="en-US"/>
           </a:p>
@@ -1731,7 +1732,7 @@
           <a:p>
             <a:fld id="{3C68F153-927F-4ADA-A90F-AFD816292B90}" type="datetimeFigureOut">
               <a:rPr lang="en-US" smtClean="0"/>
-              <a:t>1/24/2020</a:t>
+              <a:t>2/4/2020</a:t>
             </a:fld>
             <a:endParaRPr lang="en-US"/>
           </a:p>
@@ -1826,7 +1827,7 @@
           <a:p>
             <a:fld id="{3C68F153-927F-4ADA-A90F-AFD816292B90}" type="datetimeFigureOut">
               <a:rPr lang="en-US" smtClean="0"/>
-              <a:t>1/24/2020</a:t>
+              <a:t>2/4/2020</a:t>
             </a:fld>
             <a:endParaRPr lang="en-US"/>
           </a:p>
@@ -2103,7 +2104,7 @@
           <a:p>
             <a:fld id="{3C68F153-927F-4ADA-A90F-AFD816292B90}" type="datetimeFigureOut">
               <a:rPr lang="en-US" smtClean="0"/>
-              <a:t>1/24/2020</a:t>
+              <a:t>2/4/2020</a:t>
             </a:fld>
             <a:endParaRPr lang="en-US"/>
           </a:p>
@@ -2356,7 +2357,7 @@
           <a:p>
             <a:fld id="{3C68F153-927F-4ADA-A90F-AFD816292B90}" type="datetimeFigureOut">
               <a:rPr lang="en-US" smtClean="0"/>
-              <a:t>1/24/2020</a:t>
+              <a:t>2/4/2020</a:t>
             </a:fld>
             <a:endParaRPr lang="en-US"/>
           </a:p>
@@ -2569,7 +2570,7 @@
           <a:p>
             <a:fld id="{3C68F153-927F-4ADA-A90F-AFD816292B90}" type="datetimeFigureOut">
               <a:rPr lang="en-US" smtClean="0"/>
-              <a:t>1/24/2020</a:t>
+              <a:t>2/4/2020</a:t>
             </a:fld>
             <a:endParaRPr lang="en-US"/>
           </a:p>
@@ -3081,15 +3082,7 @@
             <a:pPr algn="ctr"/>
             <a:r>
               <a:rPr lang="en-US" dirty="0" smtClean="0"/>
-              <a:t>Jan. </a:t>
-            </a:r>
-            <a:r>
-              <a:rPr lang="en-US" dirty="0" smtClean="0"/>
-              <a:t>24, </a:t>
-            </a:r>
-            <a:r>
-              <a:rPr lang="en-US" dirty="0" smtClean="0"/>
-              <a:t>2020</a:t>
+              <a:t>Jan. 24, 2020</a:t>
             </a:r>
             <a:endParaRPr lang="en-US" dirty="0"/>
           </a:p>
@@ -3120,11 +3113,7 @@
             <a:pPr algn="ctr"/>
             <a:r>
               <a:rPr lang="en-US" dirty="0" smtClean="0"/>
-              <a:t>Chapter </a:t>
-            </a:r>
-            <a:r>
-              <a:rPr lang="en-US" dirty="0" smtClean="0"/>
-              <a:t>4</a:t>
+              <a:t>Chapter 4</a:t>
             </a:r>
             <a:endParaRPr lang="en-US" dirty="0"/>
           </a:p>
@@ -3132,11 +3121,7 @@
             <a:pPr algn="ctr"/>
             <a:r>
               <a:rPr lang="en-US" b="1" u="sng" dirty="0" smtClean="0"/>
-              <a:t>Standardized Scores &amp; the Normal </a:t>
-            </a:r>
-            <a:r>
-              <a:rPr lang="en-US" b="1" u="sng" dirty="0" smtClean="0"/>
-              <a:t>Distribution</a:t>
+              <a:t>Standardized Scores &amp; the Normal Distribution</a:t>
             </a:r>
           </a:p>
           <a:p>
@@ -3395,15 +3380,7 @@
           <a:p>
             <a:r>
               <a:rPr lang="en-US" sz="5400" dirty="0" smtClean="0"/>
-              <a:t>OUT-OF-CLASS</a:t>
-            </a:r>
-            <a:r>
-              <a:rPr lang="en-US" sz="5400" dirty="0" smtClean="0"/>
-              <a:t> </a:t>
-            </a:r>
-            <a:r>
-              <a:rPr lang="en-US" sz="5400" dirty="0" smtClean="0"/>
-              <a:t>LECTURES</a:t>
+              <a:t>OUT-OF-CLASS LECTURES</a:t>
             </a:r>
             <a:endParaRPr lang="en-US" sz="5400" dirty="0"/>
           </a:p>
@@ -3434,15 +3411,7 @@
             <a:pPr algn="ctr"/>
             <a:r>
               <a:rPr lang="en-US" dirty="0" smtClean="0"/>
-              <a:t>Jan. </a:t>
-            </a:r>
-            <a:r>
-              <a:rPr lang="en-US" dirty="0" smtClean="0"/>
-              <a:t>24, </a:t>
-            </a:r>
-            <a:r>
-              <a:rPr lang="en-US" dirty="0" smtClean="0"/>
-              <a:t>2020</a:t>
+              <a:t>Jan. 24, 2020</a:t>
             </a:r>
             <a:endParaRPr lang="en-US" dirty="0"/>
           </a:p>
@@ -3473,11 +3442,7 @@
             <a:pPr algn="ctr"/>
             <a:r>
               <a:rPr lang="en-US" dirty="0" smtClean="0"/>
-              <a:t>Chapter </a:t>
-            </a:r>
-            <a:r>
-              <a:rPr lang="en-US" dirty="0" smtClean="0"/>
-              <a:t>4</a:t>
+              <a:t>Chapter 4</a:t>
             </a:r>
             <a:endParaRPr lang="en-US" dirty="0"/>
           </a:p>
@@ -3733,15 +3698,7 @@
           <a:p>
             <a:r>
               <a:rPr lang="en-US" sz="5400" dirty="0" smtClean="0"/>
-              <a:t>OUT-OF-CLASS</a:t>
-            </a:r>
-            <a:r>
-              <a:rPr lang="en-US" sz="5400" dirty="0" smtClean="0"/>
-              <a:t> </a:t>
-            </a:r>
-            <a:r>
-              <a:rPr lang="en-US" sz="5400" dirty="0" smtClean="0"/>
-              <a:t>LECTURES</a:t>
+              <a:t>OUT-OF-CLASS LECTURES</a:t>
             </a:r>
             <a:endParaRPr lang="en-US" sz="5400" dirty="0"/>
           </a:p>
@@ -3772,15 +3729,7 @@
             <a:pPr algn="ctr"/>
             <a:r>
               <a:rPr lang="en-US" dirty="0" smtClean="0"/>
-              <a:t>Jan. </a:t>
-            </a:r>
-            <a:r>
-              <a:rPr lang="en-US" dirty="0" smtClean="0"/>
-              <a:t>24, </a:t>
-            </a:r>
-            <a:r>
-              <a:rPr lang="en-US" dirty="0" smtClean="0"/>
-              <a:t>2020</a:t>
+              <a:t>Jan. 24, 2020</a:t>
             </a:r>
             <a:endParaRPr lang="en-US" dirty="0"/>
           </a:p>
@@ -3811,11 +3760,7 @@
             <a:pPr algn="ctr"/>
             <a:r>
               <a:rPr lang="en-US" dirty="0" smtClean="0"/>
-              <a:t>Chapter </a:t>
-            </a:r>
-            <a:r>
-              <a:rPr lang="en-US" dirty="0" smtClean="0"/>
-              <a:t>4</a:t>
+              <a:t>Chapter 4</a:t>
             </a:r>
             <a:endParaRPr lang="en-US" dirty="0"/>
           </a:p>
@@ -3831,31 +3776,15 @@
             <a:pPr algn="ctr"/>
             <a:r>
               <a:rPr lang="en-US" i="1" dirty="0" smtClean="0"/>
-              <a:t>Lecture </a:t>
-            </a:r>
+              <a:t>Lecture slides 25-43</a:t>
+            </a:r>
+            <a:endParaRPr lang="en-US" i="1" dirty="0"/>
+          </a:p>
+          <a:p>
+            <a:pPr algn="ctr"/>
             <a:r>
               <a:rPr lang="en-US" i="1" dirty="0" smtClean="0"/>
-              <a:t>slides 25-43</a:t>
-            </a:r>
-            <a:endParaRPr lang="en-US" i="1" dirty="0"/>
-          </a:p>
-          <a:p>
-            <a:pPr algn="ctr"/>
-            <a:r>
-              <a:rPr lang="en-US" i="1" dirty="0" smtClean="0"/>
-              <a:t>(</a:t>
-            </a:r>
-            <a:r>
-              <a:rPr lang="en-US" i="1" dirty="0" smtClean="0"/>
-              <a:t>Second</a:t>
-            </a:r>
-            <a:r>
-              <a:rPr lang="en-US" i="1" dirty="0" smtClean="0"/>
-              <a:t> </a:t>
-            </a:r>
-            <a:r>
-              <a:rPr lang="en-US" i="1" dirty="0" smtClean="0"/>
-              <a:t>half)</a:t>
+              <a:t>(Second half)</a:t>
             </a:r>
             <a:endParaRPr lang="en-US" i="1" dirty="0"/>
           </a:p>
@@ -4127,7 +4056,11 @@
             <a:pPr algn="ctr"/>
             <a:r>
               <a:rPr lang="en-US" dirty="0" smtClean="0"/>
-              <a:t>Jan. 22, 2020</a:t>
+              <a:t>Feb. 3, </a:t>
+            </a:r>
+            <a:r>
+              <a:rPr lang="en-US" dirty="0" smtClean="0"/>
+              <a:t>2020</a:t>
             </a:r>
             <a:endParaRPr lang="en-US" dirty="0"/>
           </a:p>
@@ -4158,15 +4091,21 @@
             <a:pPr algn="ctr"/>
             <a:r>
               <a:rPr lang="en-US" dirty="0"/>
-              <a:t>Chapter 3</a:t>
-            </a:r>
+              <a:t>Chapter </a:t>
+            </a:r>
+            <a:r>
+              <a:rPr lang="en-US" dirty="0" smtClean="0"/>
+              <a:t>5</a:t>
+            </a:r>
+            <a:endParaRPr lang="en-US" dirty="0"/>
           </a:p>
           <a:p>
             <a:pPr algn="ctr"/>
             <a:r>
-              <a:rPr lang="en-US" b="1" u="sng" dirty="0"/>
-              <a:t>Variable/Scale, Rounding &amp; Summation</a:t>
-            </a:r>
+              <a:rPr lang="en-US" b="1" u="sng" dirty="0" smtClean="0"/>
+              <a:t>Intro to Hypothesis Testing: 1 sample z-Test</a:t>
+            </a:r>
+            <a:endParaRPr lang="en-US" b="1" u="sng" dirty="0"/>
           </a:p>
           <a:p>
             <a:pPr algn="ctr"/>
@@ -4197,8 +4136,8 @@
               <a:t>Chapter </a:t>
             </a:r>
             <a:r>
-              <a:rPr lang="en-US" dirty="0" smtClean="0"/>
-              <a:t>4</a:t>
+              <a:rPr lang="en-US" dirty="0"/>
+              <a:t>6</a:t>
             </a:r>
             <a:endParaRPr lang="en-US" dirty="0"/>
           </a:p>
@@ -4206,7 +4145,7 @@
             <a:pPr algn="ctr"/>
             <a:r>
               <a:rPr lang="en-US" b="1" u="sng" dirty="0" smtClean="0"/>
-              <a:t>Standardized Scores &amp; the Normal Distribution</a:t>
+              <a:t>Confidence Interval Estimation: The t Distribution</a:t>
             </a:r>
             <a:endParaRPr lang="en-US" b="1" u="sng" dirty="0"/>
           </a:p>
@@ -4366,7 +4305,7 @@
     </p:spTree>
     <p:extLst>
       <p:ext uri="{BB962C8B-B14F-4D97-AF65-F5344CB8AC3E}">
-        <p14:creationId xmlns:p14="http://schemas.microsoft.com/office/powerpoint/2010/main" val="2900019700"/>
+        <p14:creationId xmlns:p14="http://schemas.microsoft.com/office/powerpoint/2010/main" val="1136618621"/>
       </p:ext>
     </p:extLst>
   </p:cSld>
@@ -4494,7 +4433,7 @@
             <a:pPr algn="ctr"/>
             <a:r>
               <a:rPr lang="en-US" dirty="0" smtClean="0"/>
-              <a:t>Jan. 15, 2020</a:t>
+              <a:t>Jan. 22, 2020</a:t>
             </a:r>
             <a:endParaRPr lang="en-US" dirty="0"/>
           </a:p>
@@ -4508,8 +4447,8 @@
         </p:nvSpPr>
         <p:spPr>
           <a:xfrm>
-            <a:off x="2318419" y="3043759"/>
-            <a:ext cx="4212906" cy="2585323"/>
+            <a:off x="2035110" y="3043759"/>
+            <a:ext cx="5005769" cy="2585323"/>
           </a:xfrm>
           <a:prstGeom prst="rect">
             <a:avLst/>
@@ -4524,48 +4463,58 @@
           <a:p>
             <a:pPr algn="ctr"/>
             <a:r>
+              <a:rPr lang="en-US" dirty="0"/>
+              <a:t>Chapter 3</a:t>
+            </a:r>
+          </a:p>
+          <a:p>
+            <a:pPr algn="ctr"/>
+            <a:r>
+              <a:rPr lang="en-US" b="1" u="sng" dirty="0"/>
+              <a:t>Variable/Scale, Rounding &amp; Summation</a:t>
+            </a:r>
+          </a:p>
+          <a:p>
+            <a:pPr algn="ctr"/>
+            <a:r>
+              <a:rPr lang="en-US" i="1" dirty="0" smtClean="0"/>
+              <a:t>Finish </a:t>
+            </a:r>
+            <a:r>
+              <a:rPr lang="en-US" i="1" dirty="0"/>
+              <a:t>discussion</a:t>
+            </a:r>
+          </a:p>
+          <a:p>
+            <a:pPr algn="ctr"/>
+            <a:r>
+              <a:rPr lang="en-US" i="1" dirty="0"/>
+              <a:t>Homework questions</a:t>
+            </a:r>
+          </a:p>
+          <a:p>
+            <a:pPr algn="ctr"/>
+            <a:endParaRPr lang="en-US" i="1" dirty="0"/>
+          </a:p>
+          <a:p>
+            <a:pPr algn="ctr"/>
+            <a:r>
+              <a:rPr lang="en-US" dirty="0"/>
+              <a:t>Chapter </a:t>
+            </a:r>
+            <a:r>
               <a:rPr lang="en-US" dirty="0" smtClean="0"/>
-              <a:t>Chapter 1</a:t>
-            </a:r>
+              <a:t>4</a:t>
+            </a:r>
+            <a:endParaRPr lang="en-US" dirty="0"/>
           </a:p>
           <a:p>
             <a:pPr algn="ctr"/>
             <a:r>
               <a:rPr lang="en-US" b="1" u="sng" dirty="0" smtClean="0"/>
-              <a:t>Variable/Scale, Rounding &amp; Summation</a:t>
-            </a:r>
-          </a:p>
-          <a:p>
-            <a:pPr algn="ctr"/>
-            <a:r>
-              <a:rPr lang="en-US" i="1" dirty="0" smtClean="0"/>
-              <a:t>Finish discussion</a:t>
-            </a:r>
-          </a:p>
-          <a:p>
-            <a:pPr algn="ctr"/>
-            <a:r>
-              <a:rPr lang="en-US" i="1" dirty="0" smtClean="0"/>
-              <a:t>Homework questions</a:t>
-            </a:r>
-          </a:p>
-          <a:p>
-            <a:pPr algn="ctr"/>
-            <a:endParaRPr lang="en-US" i="1" dirty="0" smtClean="0"/>
-          </a:p>
-          <a:p>
-            <a:pPr algn="ctr"/>
-            <a:r>
-              <a:rPr lang="en-US" dirty="0"/>
-              <a:t>Chapter 2 </a:t>
-            </a:r>
-          </a:p>
-          <a:p>
-            <a:pPr algn="ctr"/>
-            <a:r>
-              <a:rPr lang="en-US" b="1" u="sng" dirty="0"/>
-              <a:t>Exploring Data with Plots</a:t>
-            </a:r>
+              <a:t>Standardized Scores &amp; the Normal Distribution</a:t>
+            </a:r>
+            <a:endParaRPr lang="en-US" b="1" u="sng" dirty="0"/>
           </a:p>
           <a:p>
             <a:pPr algn="ctr"/>
@@ -4578,12 +4527,8 @@
           <a:p>
             <a:pPr algn="ctr"/>
             <a:r>
-              <a:rPr lang="en-US" i="1" dirty="0"/>
-              <a:t>Homework </a:t>
-            </a:r>
-            <a:r>
               <a:rPr lang="en-US" i="1" dirty="0" smtClean="0"/>
-              <a:t>questions</a:t>
+              <a:t>(first half)</a:t>
             </a:r>
             <a:endParaRPr lang="en-US" i="1" dirty="0"/>
           </a:p>
@@ -4727,6 +4672,367 @@
     </p:spTree>
     <p:extLst>
       <p:ext uri="{BB962C8B-B14F-4D97-AF65-F5344CB8AC3E}">
+        <p14:creationId xmlns:p14="http://schemas.microsoft.com/office/powerpoint/2010/main" val="2900019700"/>
+      </p:ext>
+    </p:extLst>
+  </p:cSld>
+  <p:clrMapOvr>
+    <a:masterClrMapping/>
+  </p:clrMapOvr>
+</p:sld>
+</file>
+
+<file path=ppt/slides/slide6.xml><?xml version="1.0" encoding="utf-8"?>
+<p:sld xmlns:a="http://schemas.openxmlformats.org/drawingml/2006/main" xmlns:r="http://schemas.openxmlformats.org/officeDocument/2006/relationships" xmlns:p="http://schemas.openxmlformats.org/presentationml/2006/main">
+  <p:cSld>
+    <p:spTree>
+      <p:nvGrpSpPr>
+        <p:cNvPr id="1" name=""/>
+        <p:cNvGrpSpPr/>
+        <p:nvPr/>
+      </p:nvGrpSpPr>
+      <p:grpSpPr>
+        <a:xfrm>
+          <a:off x="0" y="0"/>
+          <a:ext cx="0" cy="0"/>
+          <a:chOff x="0" y="0"/>
+          <a:chExt cx="0" cy="0"/>
+        </a:xfrm>
+      </p:grpSpPr>
+      <p:sp>
+        <p:nvSpPr>
+          <p:cNvPr id="4" name="Rectangle 3"/>
+          <p:cNvSpPr/>
+          <p:nvPr/>
+        </p:nvSpPr>
+        <p:spPr>
+          <a:xfrm>
+            <a:off x="1808702" y="824230"/>
+            <a:ext cx="8778240" cy="5010912"/>
+          </a:xfrm>
+          <a:prstGeom prst="rect">
+            <a:avLst/>
+          </a:prstGeom>
+          <a:solidFill>
+            <a:schemeClr val="bg1">
+              <a:lumMod val="95000"/>
+            </a:schemeClr>
+          </a:solidFill>
+          <a:ln w="38100"/>
+        </p:spPr>
+        <p:style>
+          <a:lnRef idx="2">
+            <a:schemeClr val="accent1">
+              <a:shade val="50000"/>
+            </a:schemeClr>
+          </a:lnRef>
+          <a:fillRef idx="1">
+            <a:schemeClr val="accent1"/>
+          </a:fillRef>
+          <a:effectRef idx="0">
+            <a:schemeClr val="accent1"/>
+          </a:effectRef>
+          <a:fontRef idx="minor">
+            <a:schemeClr val="lt1"/>
+          </a:fontRef>
+        </p:style>
+        <p:txBody>
+          <a:bodyPr rtlCol="0" anchor="ctr"/>
+          <a:lstStyle/>
+          <a:p>
+            <a:pPr algn="ctr"/>
+            <a:endParaRPr lang="en-US"/>
+          </a:p>
+        </p:txBody>
+      </p:sp>
+      <p:sp>
+        <p:nvSpPr>
+          <p:cNvPr id="7" name="TextBox 6"/>
+          <p:cNvSpPr txBox="1"/>
+          <p:nvPr/>
+        </p:nvSpPr>
+        <p:spPr>
+          <a:xfrm>
+            <a:off x="3840385" y="1213849"/>
+            <a:ext cx="5712369" cy="923330"/>
+          </a:xfrm>
+          <a:prstGeom prst="rect">
+            <a:avLst/>
+          </a:prstGeom>
+          <a:noFill/>
+        </p:spPr>
+        <p:txBody>
+          <a:bodyPr wrap="square" rtlCol="0">
+            <a:spAutoFit/>
+          </a:bodyPr>
+          <a:lstStyle/>
+          <a:p>
+            <a:r>
+              <a:rPr lang="en-US" sz="5400" dirty="0" smtClean="0"/>
+              <a:t>INCLASS LECTURES</a:t>
+            </a:r>
+            <a:endParaRPr lang="en-US" sz="5400" dirty="0"/>
+          </a:p>
+        </p:txBody>
+      </p:sp>
+      <p:sp>
+        <p:nvSpPr>
+          <p:cNvPr id="8" name="TextBox 7"/>
+          <p:cNvSpPr txBox="1"/>
+          <p:nvPr/>
+        </p:nvSpPr>
+        <p:spPr>
+          <a:xfrm>
+            <a:off x="7731444" y="5278932"/>
+            <a:ext cx="2076450" cy="369332"/>
+          </a:xfrm>
+          <a:prstGeom prst="rect">
+            <a:avLst/>
+          </a:prstGeom>
+          <a:noFill/>
+        </p:spPr>
+        <p:txBody>
+          <a:bodyPr wrap="square" rtlCol="0">
+            <a:spAutoFit/>
+          </a:bodyPr>
+          <a:lstStyle/>
+          <a:p>
+            <a:pPr algn="ctr"/>
+            <a:r>
+              <a:rPr lang="en-US" dirty="0" smtClean="0"/>
+              <a:t>Jan. 15, 2020</a:t>
+            </a:r>
+            <a:endParaRPr lang="en-US" dirty="0"/>
+          </a:p>
+        </p:txBody>
+      </p:sp>
+      <p:sp>
+        <p:nvSpPr>
+          <p:cNvPr id="9" name="TextBox 8"/>
+          <p:cNvSpPr txBox="1"/>
+          <p:nvPr/>
+        </p:nvSpPr>
+        <p:spPr>
+          <a:xfrm>
+            <a:off x="2318419" y="3043759"/>
+            <a:ext cx="4212906" cy="2585323"/>
+          </a:xfrm>
+          <a:prstGeom prst="rect">
+            <a:avLst/>
+          </a:prstGeom>
+          <a:noFill/>
+        </p:spPr>
+        <p:txBody>
+          <a:bodyPr wrap="square" rtlCol="0">
+            <a:spAutoFit/>
+          </a:bodyPr>
+          <a:lstStyle/>
+          <a:p>
+            <a:pPr algn="ctr"/>
+            <a:r>
+              <a:rPr lang="en-US" dirty="0" smtClean="0"/>
+              <a:t>Chapter 1</a:t>
+            </a:r>
+          </a:p>
+          <a:p>
+            <a:pPr algn="ctr"/>
+            <a:r>
+              <a:rPr lang="en-US" b="1" u="sng" dirty="0" smtClean="0"/>
+              <a:t>Variable/Scale, Rounding &amp; Summation</a:t>
+            </a:r>
+          </a:p>
+          <a:p>
+            <a:pPr algn="ctr"/>
+            <a:r>
+              <a:rPr lang="en-US" i="1" dirty="0" smtClean="0"/>
+              <a:t>Finish discussion</a:t>
+            </a:r>
+          </a:p>
+          <a:p>
+            <a:pPr algn="ctr"/>
+            <a:r>
+              <a:rPr lang="en-US" i="1" dirty="0" smtClean="0"/>
+              <a:t>Homework questions</a:t>
+            </a:r>
+          </a:p>
+          <a:p>
+            <a:pPr algn="ctr"/>
+            <a:endParaRPr lang="en-US" i="1" dirty="0" smtClean="0"/>
+          </a:p>
+          <a:p>
+            <a:pPr algn="ctr"/>
+            <a:r>
+              <a:rPr lang="en-US" dirty="0"/>
+              <a:t>Chapter 2 </a:t>
+            </a:r>
+          </a:p>
+          <a:p>
+            <a:pPr algn="ctr"/>
+            <a:r>
+              <a:rPr lang="en-US" b="1" u="sng" dirty="0"/>
+              <a:t>Exploring Data with Plots</a:t>
+            </a:r>
+          </a:p>
+          <a:p>
+            <a:pPr algn="ctr"/>
+            <a:r>
+              <a:rPr lang="en-US" i="1" dirty="0" smtClean="0"/>
+              <a:t>Lecture slides</a:t>
+            </a:r>
+            <a:endParaRPr lang="en-US" i="1" dirty="0"/>
+          </a:p>
+          <a:p>
+            <a:pPr algn="ctr"/>
+            <a:r>
+              <a:rPr lang="en-US" i="1" dirty="0"/>
+              <a:t>Homework </a:t>
+            </a:r>
+            <a:r>
+              <a:rPr lang="en-US" i="1" dirty="0" smtClean="0"/>
+              <a:t>questions</a:t>
+            </a:r>
+            <a:endParaRPr lang="en-US" i="1" dirty="0"/>
+          </a:p>
+        </p:txBody>
+      </p:sp>
+      <p:grpSp>
+        <p:nvGrpSpPr>
+          <p:cNvPr id="14" name="Group 13"/>
+          <p:cNvGrpSpPr/>
+          <p:nvPr/>
+        </p:nvGrpSpPr>
+        <p:grpSpPr>
+          <a:xfrm>
+            <a:off x="7198839" y="2137179"/>
+            <a:ext cx="3141660" cy="3193339"/>
+            <a:chOff x="7047391" y="1961976"/>
+            <a:chExt cx="3141660" cy="3193339"/>
+          </a:xfrm>
+        </p:grpSpPr>
+        <p:pic>
+          <p:nvPicPr>
+            <p:cNvPr id="2" name="Picture 1"/>
+            <p:cNvPicPr>
+              <a:picLocks noChangeAspect="1"/>
+            </p:cNvPicPr>
+            <p:nvPr/>
+          </p:nvPicPr>
+          <p:blipFill>
+            <a:blip r:embed="rId2" cstate="print">
+              <a:extLst>
+                <a:ext uri="{28A0092B-C50C-407E-A947-70E740481C1C}">
+                  <a14:useLocalDpi xmlns:a14="http://schemas.microsoft.com/office/drawing/2010/main" val="0"/>
+                </a:ext>
+              </a:extLst>
+            </a:blip>
+            <a:stretch>
+              <a:fillRect/>
+            </a:stretch>
+          </p:blipFill>
+          <p:spPr>
+            <a:xfrm>
+              <a:off x="7047391" y="3320161"/>
+              <a:ext cx="1578867" cy="1828804"/>
+            </a:xfrm>
+            <a:prstGeom prst="rect">
+              <a:avLst/>
+            </a:prstGeom>
+          </p:spPr>
+        </p:pic>
+        <p:pic>
+          <p:nvPicPr>
+            <p:cNvPr id="3" name="Picture 2"/>
+            <p:cNvPicPr>
+              <a:picLocks noChangeAspect="1"/>
+            </p:cNvPicPr>
+            <p:nvPr/>
+          </p:nvPicPr>
+          <p:blipFill>
+            <a:blip r:embed="rId3" cstate="print">
+              <a:extLst>
+                <a:ext uri="{28A0092B-C50C-407E-A947-70E740481C1C}">
+                  <a14:useLocalDpi xmlns:a14="http://schemas.microsoft.com/office/drawing/2010/main" val="0"/>
+                </a:ext>
+              </a:extLst>
+            </a:blip>
+            <a:stretch>
+              <a:fillRect/>
+            </a:stretch>
+          </p:blipFill>
+          <p:spPr>
+            <a:xfrm>
+              <a:off x="7830475" y="1961976"/>
+              <a:ext cx="1578867" cy="1828804"/>
+            </a:xfrm>
+            <a:prstGeom prst="rect">
+              <a:avLst/>
+            </a:prstGeom>
+          </p:spPr>
+        </p:pic>
+        <p:pic>
+          <p:nvPicPr>
+            <p:cNvPr id="11" name="Picture 10"/>
+            <p:cNvPicPr>
+              <a:picLocks noChangeAspect="1"/>
+            </p:cNvPicPr>
+            <p:nvPr/>
+          </p:nvPicPr>
+          <p:blipFill>
+            <a:blip r:embed="rId4" cstate="print">
+              <a:extLst>
+                <a:ext uri="{28A0092B-C50C-407E-A947-70E740481C1C}">
+                  <a14:useLocalDpi xmlns:a14="http://schemas.microsoft.com/office/drawing/2010/main" val="0"/>
+                </a:ext>
+              </a:extLst>
+            </a:blip>
+            <a:stretch>
+              <a:fillRect/>
+            </a:stretch>
+          </p:blipFill>
+          <p:spPr>
+            <a:xfrm>
+              <a:off x="8610184" y="3326511"/>
+              <a:ext cx="1578867" cy="1828804"/>
+            </a:xfrm>
+            <a:prstGeom prst="rect">
+              <a:avLst/>
+            </a:prstGeom>
+          </p:spPr>
+        </p:pic>
+      </p:grpSp>
+      <p:pic>
+        <p:nvPicPr>
+          <p:cNvPr id="12" name="Picture 11"/>
+          <p:cNvPicPr>
+            <a:picLocks noChangeAspect="1"/>
+          </p:cNvPicPr>
+          <p:nvPr/>
+        </p:nvPicPr>
+        <p:blipFill>
+          <a:blip r:embed="rId5" cstate="print">
+            <a:extLst>
+              <a:ext uri="{28A0092B-C50C-407E-A947-70E740481C1C}">
+                <a14:useLocalDpi xmlns:a14="http://schemas.microsoft.com/office/drawing/2010/main" val="0"/>
+              </a:ext>
+            </a:extLst>
+          </a:blip>
+          <a:stretch>
+            <a:fillRect/>
+          </a:stretch>
+        </p:blipFill>
+        <p:spPr>
+          <a:xfrm>
+            <a:off x="2035110" y="1019593"/>
+            <a:ext cx="1578867" cy="1828804"/>
+          </a:xfrm>
+          <a:prstGeom prst="rect">
+            <a:avLst/>
+          </a:prstGeom>
+        </p:spPr>
+      </p:pic>
+    </p:spTree>
+    <p:extLst>
+      <p:ext uri="{BB962C8B-B14F-4D97-AF65-F5344CB8AC3E}">
         <p14:creationId xmlns:p14="http://schemas.microsoft.com/office/powerpoint/2010/main" val="3290463226"/>
       </p:ext>
     </p:extLst>
@@ -4737,7 +5043,7 @@
 </p:sld>
 </file>
 
-<file path=ppt/slides/slide6.xml><?xml version="1.0" encoding="utf-8"?>
+<file path=ppt/slides/slide7.xml><?xml version="1.0" encoding="utf-8"?>
 <p:sld xmlns:a="http://schemas.openxmlformats.org/drawingml/2006/main" xmlns:r="http://schemas.openxmlformats.org/officeDocument/2006/relationships" xmlns:p="http://schemas.openxmlformats.org/presentationml/2006/main">
   <p:cSld>
     <p:spTree>

</xml_diff>

<commit_message>
add youtube thumbnail pics
</commit_message>
<xml_diff>
--- a/static/img/youtube_thumbnails/video_thumbnail_building.pptx
+++ b/static/img/youtube_thumbnails/video_thumbnail_building.pptx
@@ -8,11 +8,14 @@
     <p:sldId id="259" r:id="rId2"/>
     <p:sldId id="261" r:id="rId3"/>
     <p:sldId id="260" r:id="rId4"/>
-    <p:sldId id="263" r:id="rId5"/>
-    <p:sldId id="262" r:id="rId6"/>
-    <p:sldId id="257" r:id="rId7"/>
-    <p:sldId id="256" r:id="rId8"/>
-    <p:sldId id="258" r:id="rId9"/>
+    <p:sldId id="266" r:id="rId5"/>
+    <p:sldId id="265" r:id="rId6"/>
+    <p:sldId id="264" r:id="rId7"/>
+    <p:sldId id="263" r:id="rId8"/>
+    <p:sldId id="262" r:id="rId9"/>
+    <p:sldId id="257" r:id="rId10"/>
+    <p:sldId id="256" r:id="rId11"/>
+    <p:sldId id="258" r:id="rId12"/>
   </p:sldIdLst>
   <p:sldSz cx="12192000" cy="6858000"/>
   <p:notesSz cx="6858000" cy="9144000"/>
@@ -250,7 +253,7 @@
           <a:p>
             <a:fld id="{3C68F153-927F-4ADA-A90F-AFD816292B90}" type="datetimeFigureOut">
               <a:rPr lang="en-US" smtClean="0"/>
-              <a:t>2/5/2020</a:t>
+              <a:t>2/19/2020</a:t>
             </a:fld>
             <a:endParaRPr lang="en-US"/>
           </a:p>
@@ -420,7 +423,7 @@
           <a:p>
             <a:fld id="{3C68F153-927F-4ADA-A90F-AFD816292B90}" type="datetimeFigureOut">
               <a:rPr lang="en-US" smtClean="0"/>
-              <a:t>2/5/2020</a:t>
+              <a:t>2/19/2020</a:t>
             </a:fld>
             <a:endParaRPr lang="en-US"/>
           </a:p>
@@ -600,7 +603,7 @@
           <a:p>
             <a:fld id="{3C68F153-927F-4ADA-A90F-AFD816292B90}" type="datetimeFigureOut">
               <a:rPr lang="en-US" smtClean="0"/>
-              <a:t>2/5/2020</a:t>
+              <a:t>2/19/2020</a:t>
             </a:fld>
             <a:endParaRPr lang="en-US"/>
           </a:p>
@@ -770,7 +773,7 @@
           <a:p>
             <a:fld id="{3C68F153-927F-4ADA-A90F-AFD816292B90}" type="datetimeFigureOut">
               <a:rPr lang="en-US" smtClean="0"/>
-              <a:t>2/5/2020</a:t>
+              <a:t>2/19/2020</a:t>
             </a:fld>
             <a:endParaRPr lang="en-US"/>
           </a:p>
@@ -1016,7 +1019,7 @@
           <a:p>
             <a:fld id="{3C68F153-927F-4ADA-A90F-AFD816292B90}" type="datetimeFigureOut">
               <a:rPr lang="en-US" smtClean="0"/>
-              <a:t>2/5/2020</a:t>
+              <a:t>2/19/2020</a:t>
             </a:fld>
             <a:endParaRPr lang="en-US"/>
           </a:p>
@@ -1248,7 +1251,7 @@
           <a:p>
             <a:fld id="{3C68F153-927F-4ADA-A90F-AFD816292B90}" type="datetimeFigureOut">
               <a:rPr lang="en-US" smtClean="0"/>
-              <a:t>2/5/2020</a:t>
+              <a:t>2/19/2020</a:t>
             </a:fld>
             <a:endParaRPr lang="en-US"/>
           </a:p>
@@ -1615,7 +1618,7 @@
           <a:p>
             <a:fld id="{3C68F153-927F-4ADA-A90F-AFD816292B90}" type="datetimeFigureOut">
               <a:rPr lang="en-US" smtClean="0"/>
-              <a:t>2/5/2020</a:t>
+              <a:t>2/19/2020</a:t>
             </a:fld>
             <a:endParaRPr lang="en-US"/>
           </a:p>
@@ -1733,7 +1736,7 @@
           <a:p>
             <a:fld id="{3C68F153-927F-4ADA-A90F-AFD816292B90}" type="datetimeFigureOut">
               <a:rPr lang="en-US" smtClean="0"/>
-              <a:t>2/5/2020</a:t>
+              <a:t>2/19/2020</a:t>
             </a:fld>
             <a:endParaRPr lang="en-US"/>
           </a:p>
@@ -1828,7 +1831,7 @@
           <a:p>
             <a:fld id="{3C68F153-927F-4ADA-A90F-AFD816292B90}" type="datetimeFigureOut">
               <a:rPr lang="en-US" smtClean="0"/>
-              <a:t>2/5/2020</a:t>
+              <a:t>2/19/2020</a:t>
             </a:fld>
             <a:endParaRPr lang="en-US"/>
           </a:p>
@@ -2105,7 +2108,7 @@
           <a:p>
             <a:fld id="{3C68F153-927F-4ADA-A90F-AFD816292B90}" type="datetimeFigureOut">
               <a:rPr lang="en-US" smtClean="0"/>
-              <a:t>2/5/2020</a:t>
+              <a:t>2/19/2020</a:t>
             </a:fld>
             <a:endParaRPr lang="en-US"/>
           </a:p>
@@ -2358,7 +2361,7 @@
           <a:p>
             <a:fld id="{3C68F153-927F-4ADA-A90F-AFD816292B90}" type="datetimeFigureOut">
               <a:rPr lang="en-US" smtClean="0"/>
-              <a:t>2/5/2020</a:t>
+              <a:t>2/19/2020</a:t>
             </a:fld>
             <a:endParaRPr lang="en-US"/>
           </a:p>
@@ -2571,7 +2574,7 @@
           <a:p>
             <a:fld id="{3C68F153-927F-4ADA-A90F-AFD816292B90}" type="datetimeFigureOut">
               <a:rPr lang="en-US" smtClean="0"/>
-              <a:t>2/5/2020</a:t>
+              <a:t>2/19/2020</a:t>
             </a:fld>
             <a:endParaRPr lang="en-US"/>
           </a:p>
@@ -3294,7 +3297,7 @@
 </p:sld>
 </file>
 
-<file path=ppt/slides/slide2.xml><?xml version="1.0" encoding="utf-8"?>
+<file path=ppt/slides/slide10.xml><?xml version="1.0" encoding="utf-8"?>
 <p:sld xmlns:a="http://schemas.openxmlformats.org/drawingml/2006/main" xmlns:r="http://schemas.openxmlformats.org/officeDocument/2006/relationships" xmlns:p="http://schemas.openxmlformats.org/presentationml/2006/main">
   <p:cSld>
     <p:spTree>
@@ -3365,8 +3368,8 @@
         </p:nvSpPr>
         <p:spPr>
           <a:xfrm>
-            <a:off x="4003824" y="1483154"/>
-            <a:ext cx="5712369" cy="1754326"/>
+            <a:off x="3840385" y="1213849"/>
+            <a:ext cx="5712369" cy="923330"/>
           </a:xfrm>
           <a:prstGeom prst="rect">
             <a:avLst/>
@@ -3381,7 +3384,7 @@
           <a:p>
             <a:r>
               <a:rPr lang="en-US" sz="5400" dirty="0" smtClean="0"/>
-              <a:t>OUT-OF-CLASS LECTURES</a:t>
+              <a:t>INCLASS LECTURES</a:t>
             </a:r>
             <a:endParaRPr lang="en-US" sz="5400" dirty="0"/>
           </a:p>
@@ -3412,7 +3415,7 @@
             <a:pPr algn="ctr"/>
             <a:r>
               <a:rPr lang="en-US" dirty="0" smtClean="0"/>
-              <a:t>Jan. 24, 2020</a:t>
+              <a:t>Jan. 15, 2020</a:t>
             </a:r>
             <a:endParaRPr lang="en-US" dirty="0"/>
           </a:p>
@@ -3426,8 +3429,8 @@
         </p:nvSpPr>
         <p:spPr>
           <a:xfrm>
-            <a:off x="2000886" y="3743671"/>
-            <a:ext cx="5005769" cy="923330"/>
+            <a:off x="2318419" y="3043759"/>
+            <a:ext cx="4212906" cy="2585323"/>
           </a:xfrm>
           <a:prstGeom prst="rect">
             <a:avLst/>
@@ -3443,24 +3446,67 @@
             <a:pPr algn="ctr"/>
             <a:r>
               <a:rPr lang="en-US" dirty="0" smtClean="0"/>
-              <a:t>Chapter 4</a:t>
-            </a:r>
-            <a:endParaRPr lang="en-US" dirty="0"/>
+              <a:t>Chapter 1</a:t>
+            </a:r>
           </a:p>
           <a:p>
             <a:pPr algn="ctr"/>
             <a:r>
               <a:rPr lang="en-US" b="1" u="sng" dirty="0" smtClean="0"/>
-              <a:t>Standardized Scores &amp; the Normal Distribution</a:t>
-            </a:r>
-            <a:endParaRPr lang="en-US" b="1" u="sng" dirty="0"/>
+              <a:t>Variable/Scale, Rounding &amp; Summation</a:t>
+            </a:r>
           </a:p>
           <a:p>
             <a:pPr algn="ctr"/>
             <a:r>
               <a:rPr lang="en-US" i="1" dirty="0" smtClean="0"/>
-              <a:t>Lecture Slide Examples Worked</a:t>
-            </a:r>
+              <a:t>Finish discussion</a:t>
+            </a:r>
+          </a:p>
+          <a:p>
+            <a:pPr algn="ctr"/>
+            <a:r>
+              <a:rPr lang="en-US" i="1" dirty="0" smtClean="0"/>
+              <a:t>Homework questions</a:t>
+            </a:r>
+          </a:p>
+          <a:p>
+            <a:pPr algn="ctr"/>
+            <a:endParaRPr lang="en-US" i="1" dirty="0" smtClean="0"/>
+          </a:p>
+          <a:p>
+            <a:pPr algn="ctr"/>
+            <a:r>
+              <a:rPr lang="en-US" dirty="0"/>
+              <a:t>Chapter 2 </a:t>
+            </a:r>
+          </a:p>
+          <a:p>
+            <a:pPr algn="ctr"/>
+            <a:r>
+              <a:rPr lang="en-US" b="1" u="sng" dirty="0"/>
+              <a:t>Exploring Data with Plots</a:t>
+            </a:r>
+          </a:p>
+          <a:p>
+            <a:pPr algn="ctr"/>
+            <a:r>
+              <a:rPr lang="en-US" i="1" dirty="0" smtClean="0"/>
+              <a:t>Lecture slides</a:t>
+            </a:r>
+            <a:endParaRPr lang="en-US" i="1" dirty="0"/>
+          </a:p>
+          <a:p>
+            <a:pPr algn="ctr"/>
+            <a:r>
+              <a:rPr lang="en-US" i="1" dirty="0"/>
+              <a:t>Homework </a:t>
+            </a:r>
+            <a:r>
+              <a:rPr lang="en-US" i="1" dirty="0" smtClean="0"/>
+              <a:t>questions</a:t>
+            </a:r>
+            <a:endParaRPr lang="en-US" i="1" dirty="0"/>
           </a:p>
         </p:txBody>
       </p:sp>
@@ -3602,7 +3648,7 @@
     </p:spTree>
     <p:extLst>
       <p:ext uri="{BB962C8B-B14F-4D97-AF65-F5344CB8AC3E}">
-        <p14:creationId xmlns:p14="http://schemas.microsoft.com/office/powerpoint/2010/main" val="267042058"/>
+        <p14:creationId xmlns:p14="http://schemas.microsoft.com/office/powerpoint/2010/main" val="3290463226"/>
       </p:ext>
     </p:extLst>
   </p:cSld>
@@ -3612,7 +3658,7 @@
 </p:sld>
 </file>
 
-<file path=ppt/slides/slide3.xml><?xml version="1.0" encoding="utf-8"?>
+<file path=ppt/slides/slide11.xml><?xml version="1.0" encoding="utf-8"?>
 <p:sld xmlns:a="http://schemas.openxmlformats.org/drawingml/2006/main" xmlns:r="http://schemas.openxmlformats.org/officeDocument/2006/relationships" xmlns:p="http://schemas.openxmlformats.org/presentationml/2006/main">
   <p:cSld>
     <p:spTree>
@@ -3629,26 +3675,51 @@
           <a:chExt cx="0" cy="0"/>
         </a:xfrm>
       </p:grpSpPr>
-      <p:sp>
-        <p:nvSpPr>
-          <p:cNvPr id="4" name="Rectangle 3"/>
-          <p:cNvSpPr/>
+      <p:pic>
+        <p:nvPicPr>
+          <p:cNvPr id="2" name="Picture 1"/>
+          <p:cNvPicPr>
+            <a:picLocks noChangeAspect="1"/>
+          </p:cNvPicPr>
           <p:nvPr/>
-        </p:nvSpPr>
-        <p:spPr>
-          <a:xfrm>
-            <a:off x="1808702" y="824230"/>
-            <a:ext cx="8778240" cy="5010912"/>
+        </p:nvPicPr>
+        <p:blipFill>
+          <a:blip r:embed="rId2" cstate="print">
+            <a:extLst>
+              <a:ext uri="{28A0092B-C50C-407E-A947-70E740481C1C}">
+                <a14:useLocalDpi xmlns:a14="http://schemas.microsoft.com/office/drawing/2010/main" val="0"/>
+              </a:ext>
+            </a:extLst>
+          </a:blip>
+          <a:stretch>
+            <a:fillRect/>
+          </a:stretch>
+        </p:blipFill>
+        <p:spPr>
+          <a:xfrm>
+            <a:off x="5306566" y="2514598"/>
+            <a:ext cx="1578867" cy="1828804"/>
           </a:xfrm>
           <a:prstGeom prst="rect">
             <a:avLst/>
           </a:prstGeom>
-          <a:solidFill>
-            <a:schemeClr val="bg1">
-              <a:lumMod val="95000"/>
-            </a:schemeClr>
-          </a:solidFill>
-          <a:ln w="38100"/>
+        </p:spPr>
+      </p:pic>
+      <p:sp>
+        <p:nvSpPr>
+          <p:cNvPr id="3" name="Rectangle 2"/>
+          <p:cNvSpPr/>
+          <p:nvPr/>
+        </p:nvSpPr>
+        <p:spPr>
+          <a:xfrm>
+            <a:off x="5054138" y="2394066"/>
+            <a:ext cx="2094807" cy="2078182"/>
+          </a:xfrm>
+          <a:prstGeom prst="rect">
+            <a:avLst/>
+          </a:prstGeom>
+          <a:noFill/>
         </p:spPr>
         <p:style>
           <a:lnRef idx="2">
@@ -3675,6 +3746,82 @@
           </a:p>
         </p:txBody>
       </p:sp>
+    </p:spTree>
+    <p:extLst>
+      <p:ext uri="{BB962C8B-B14F-4D97-AF65-F5344CB8AC3E}">
+        <p14:creationId xmlns:p14="http://schemas.microsoft.com/office/powerpoint/2010/main" val="2048573925"/>
+      </p:ext>
+    </p:extLst>
+  </p:cSld>
+  <p:clrMapOvr>
+    <a:masterClrMapping/>
+  </p:clrMapOvr>
+</p:sld>
+</file>
+
+<file path=ppt/slides/slide2.xml><?xml version="1.0" encoding="utf-8"?>
+<p:sld xmlns:a="http://schemas.openxmlformats.org/drawingml/2006/main" xmlns:r="http://schemas.openxmlformats.org/officeDocument/2006/relationships" xmlns:p="http://schemas.openxmlformats.org/presentationml/2006/main">
+  <p:cSld>
+    <p:spTree>
+      <p:nvGrpSpPr>
+        <p:cNvPr id="1" name=""/>
+        <p:cNvGrpSpPr/>
+        <p:nvPr/>
+      </p:nvGrpSpPr>
+      <p:grpSpPr>
+        <a:xfrm>
+          <a:off x="0" y="0"/>
+          <a:ext cx="0" cy="0"/>
+          <a:chOff x="0" y="0"/>
+          <a:chExt cx="0" cy="0"/>
+        </a:xfrm>
+      </p:grpSpPr>
+      <p:sp>
+        <p:nvSpPr>
+          <p:cNvPr id="4" name="Rectangle 3"/>
+          <p:cNvSpPr/>
+          <p:nvPr/>
+        </p:nvSpPr>
+        <p:spPr>
+          <a:xfrm>
+            <a:off x="1808702" y="824230"/>
+            <a:ext cx="8778240" cy="5010912"/>
+          </a:xfrm>
+          <a:prstGeom prst="rect">
+            <a:avLst/>
+          </a:prstGeom>
+          <a:solidFill>
+            <a:schemeClr val="bg1">
+              <a:lumMod val="95000"/>
+            </a:schemeClr>
+          </a:solidFill>
+          <a:ln w="38100"/>
+        </p:spPr>
+        <p:style>
+          <a:lnRef idx="2">
+            <a:schemeClr val="accent1">
+              <a:shade val="50000"/>
+            </a:schemeClr>
+          </a:lnRef>
+          <a:fillRef idx="1">
+            <a:schemeClr val="accent1"/>
+          </a:fillRef>
+          <a:effectRef idx="0">
+            <a:schemeClr val="accent1"/>
+          </a:effectRef>
+          <a:fontRef idx="minor">
+            <a:schemeClr val="lt1"/>
+          </a:fontRef>
+        </p:style>
+        <p:txBody>
+          <a:bodyPr rtlCol="0" anchor="ctr"/>
+          <a:lstStyle/>
+          <a:p>
+            <a:pPr algn="ctr"/>
+            <a:endParaRPr lang="en-US"/>
+          </a:p>
+        </p:txBody>
+      </p:sp>
       <p:sp>
         <p:nvSpPr>
           <p:cNvPr id="7" name="TextBox 6"/>
@@ -3683,7 +3830,7 @@
         </p:nvSpPr>
         <p:spPr>
           <a:xfrm>
-            <a:off x="4184694" y="1065121"/>
+            <a:off x="4003824" y="1483154"/>
             <a:ext cx="5712369" cy="1754326"/>
           </a:xfrm>
           <a:prstGeom prst="rect">
@@ -3744,8 +3891,8 @@
         </p:nvSpPr>
         <p:spPr>
           <a:xfrm>
-            <a:off x="2035110" y="3043759"/>
-            <a:ext cx="5005769" cy="1200329"/>
+            <a:off x="2000886" y="3743671"/>
+            <a:ext cx="5005769" cy="923330"/>
           </a:xfrm>
           <a:prstGeom prst="rect">
             <a:avLst/>
@@ -3777,17 +3924,8 @@
             <a:pPr algn="ctr"/>
             <a:r>
               <a:rPr lang="en-US" i="1" dirty="0" smtClean="0"/>
-              <a:t>Lecture slides 25-43</a:t>
-            </a:r>
-            <a:endParaRPr lang="en-US" i="1" dirty="0"/>
-          </a:p>
-          <a:p>
-            <a:pPr algn="ctr"/>
-            <a:r>
-              <a:rPr lang="en-US" i="1" dirty="0" smtClean="0"/>
-              <a:t>(Second half)</a:t>
-            </a:r>
-            <a:endParaRPr lang="en-US" i="1" dirty="0"/>
+              <a:t>Lecture Slide Examples Worked</a:t>
+            </a:r>
           </a:p>
         </p:txBody>
       </p:sp>
@@ -3929,7 +4067,7 @@
     </p:spTree>
     <p:extLst>
       <p:ext uri="{BB962C8B-B14F-4D97-AF65-F5344CB8AC3E}">
-        <p14:creationId xmlns:p14="http://schemas.microsoft.com/office/powerpoint/2010/main" val="1429724622"/>
+        <p14:creationId xmlns:p14="http://schemas.microsoft.com/office/powerpoint/2010/main" val="267042058"/>
       </p:ext>
     </p:extLst>
   </p:cSld>
@@ -3939,7 +4077,7 @@
 </p:sld>
 </file>
 
-<file path=ppt/slides/slide4.xml><?xml version="1.0" encoding="utf-8"?>
+<file path=ppt/slides/slide3.xml><?xml version="1.0" encoding="utf-8"?>
 <p:sld xmlns:a="http://schemas.openxmlformats.org/drawingml/2006/main" xmlns:r="http://schemas.openxmlformats.org/officeDocument/2006/relationships" xmlns:p="http://schemas.openxmlformats.org/presentationml/2006/main">
   <p:cSld>
     <p:spTree>
@@ -4010,8 +4148,8 @@
         </p:nvSpPr>
         <p:spPr>
           <a:xfrm>
-            <a:off x="3840385" y="1213849"/>
-            <a:ext cx="5712369" cy="923330"/>
+            <a:off x="4184694" y="1065121"/>
+            <a:ext cx="5712369" cy="1754326"/>
           </a:xfrm>
           <a:prstGeom prst="rect">
             <a:avLst/>
@@ -4026,7 +4164,7 @@
           <a:p>
             <a:r>
               <a:rPr lang="en-US" sz="5400" dirty="0" smtClean="0"/>
-              <a:t>INCLASS LECTURES</a:t>
+              <a:t>OUT-OF-CLASS LECTURES</a:t>
             </a:r>
             <a:endParaRPr lang="en-US" sz="5400" dirty="0"/>
           </a:p>
@@ -4057,15 +4195,7 @@
             <a:pPr algn="ctr"/>
             <a:r>
               <a:rPr lang="en-US" dirty="0" smtClean="0"/>
-              <a:t>Feb. </a:t>
-            </a:r>
-            <a:r>
-              <a:rPr lang="en-US" dirty="0" smtClean="0"/>
-              <a:t>5, </a:t>
-            </a:r>
-            <a:r>
-              <a:rPr lang="en-US" dirty="0" smtClean="0"/>
-              <a:t>2020</a:t>
+              <a:t>Jan. 24, 2020</a:t>
             </a:r>
             <a:endParaRPr lang="en-US" dirty="0"/>
           </a:p>
@@ -4080,7 +4210,7 @@
         <p:spPr>
           <a:xfrm>
             <a:off x="2035110" y="3043759"/>
-            <a:ext cx="5005769" cy="1477328"/>
+            <a:ext cx="5005769" cy="1200329"/>
           </a:xfrm>
           <a:prstGeom prst="rect">
             <a:avLst/>
@@ -4096,18 +4226,15 @@
             <a:pPr algn="ctr"/>
             <a:r>
               <a:rPr lang="en-US" dirty="0" smtClean="0"/>
-              <a:t>Chapter </a:t>
-            </a:r>
-            <a:r>
-              <a:rPr lang="en-US" dirty="0"/>
-              <a:t>6</a:t>
-            </a:r>
+              <a:t>Chapter 4</a:t>
+            </a:r>
+            <a:endParaRPr lang="en-US" dirty="0"/>
           </a:p>
           <a:p>
             <a:pPr algn="ctr"/>
             <a:r>
               <a:rPr lang="en-US" b="1" u="sng" dirty="0" smtClean="0"/>
-              <a:t>Confidence Interval Estimation: The t Distribution</a:t>
+              <a:t>Standardized Scores &amp; the Normal Distribution</a:t>
             </a:r>
             <a:endParaRPr lang="en-US" b="1" u="sng" dirty="0"/>
           </a:p>
@@ -4115,7 +4242,7 @@
             <a:pPr algn="ctr"/>
             <a:r>
               <a:rPr lang="en-US" i="1" dirty="0" smtClean="0"/>
-              <a:t>Lecture slides</a:t>
+              <a:t>Lecture slides 25-43</a:t>
             </a:r>
             <a:endParaRPr lang="en-US" i="1" dirty="0"/>
           </a:p>
@@ -4123,22 +4250,7 @@
             <a:pPr algn="ctr"/>
             <a:r>
               <a:rPr lang="en-US" i="1" dirty="0" smtClean="0"/>
-              <a:t>(second </a:t>
-            </a:r>
-            <a:r>
-              <a:rPr lang="en-US" i="1" dirty="0" smtClean="0"/>
-              <a:t>half</a:t>
-            </a:r>
-            <a:r>
-              <a:rPr lang="en-US" i="1" dirty="0" smtClean="0"/>
-              <a:t>)</a:t>
-            </a:r>
-          </a:p>
-          <a:p>
-            <a:pPr algn="ctr"/>
-            <a:r>
-              <a:rPr lang="en-US" i="1" dirty="0" smtClean="0"/>
-              <a:t>Homework Helps</a:t>
+              <a:t>(Second half)</a:t>
             </a:r>
             <a:endParaRPr lang="en-US" i="1" dirty="0"/>
           </a:p>
@@ -4282,7 +4394,7 @@
     </p:spTree>
     <p:extLst>
       <p:ext uri="{BB962C8B-B14F-4D97-AF65-F5344CB8AC3E}">
-        <p14:creationId xmlns:p14="http://schemas.microsoft.com/office/powerpoint/2010/main" val="4154058086"/>
+        <p14:creationId xmlns:p14="http://schemas.microsoft.com/office/powerpoint/2010/main" val="1429724622"/>
       </p:ext>
     </p:extLst>
   </p:cSld>
@@ -4292,7 +4404,7 @@
 </p:sld>
 </file>
 
-<file path=ppt/slides/slide5.xml><?xml version="1.0" encoding="utf-8"?>
+<file path=ppt/slides/slide4.xml><?xml version="1.0" encoding="utf-8"?>
 <p:sld xmlns:a="http://schemas.openxmlformats.org/drawingml/2006/main" xmlns:r="http://schemas.openxmlformats.org/officeDocument/2006/relationships" xmlns:p="http://schemas.openxmlformats.org/presentationml/2006/main">
   <p:cSld>
     <p:spTree>
@@ -4410,7 +4522,15 @@
             <a:pPr algn="ctr"/>
             <a:r>
               <a:rPr lang="en-US" dirty="0" smtClean="0"/>
-              <a:t>Feb. 3, 2020</a:t>
+              <a:t>Feb. </a:t>
+            </a:r>
+            <a:r>
+              <a:rPr lang="en-US" dirty="0" smtClean="0"/>
+              <a:t>12, </a:t>
+            </a:r>
+            <a:r>
+              <a:rPr lang="en-US" dirty="0" smtClean="0"/>
+              <a:t>2020</a:t>
             </a:r>
             <a:endParaRPr lang="en-US" dirty="0"/>
           </a:p>
@@ -4424,8 +4544,8 @@
         </p:nvSpPr>
         <p:spPr>
           <a:xfrm>
-            <a:off x="2035110" y="3043759"/>
-            <a:ext cx="5005769" cy="2585323"/>
+            <a:off x="2175357" y="4235713"/>
+            <a:ext cx="5005769" cy="923330"/>
           </a:xfrm>
           <a:prstGeom prst="rect">
             <a:avLst/>
@@ -4440,12 +4560,12 @@
           <a:p>
             <a:pPr algn="ctr"/>
             <a:r>
+              <a:rPr lang="en-US" dirty="0" smtClean="0"/>
+              <a:t>Chapter </a:t>
+            </a:r>
+            <a:r>
               <a:rPr lang="en-US" dirty="0"/>
-              <a:t>Chapter </a:t>
-            </a:r>
-            <a:r>
-              <a:rPr lang="en-US" dirty="0" smtClean="0"/>
-              <a:t>5</a:t>
+              <a:t>9</a:t>
             </a:r>
             <a:endParaRPr lang="en-US" dirty="0"/>
           </a:p>
@@ -4453,62 +4573,17 @@
             <a:pPr algn="ctr"/>
             <a:r>
               <a:rPr lang="en-US" b="1" u="sng" dirty="0" smtClean="0"/>
-              <a:t>Intro to Hypothesis Testing: 1 sample z-Test</a:t>
-            </a:r>
-            <a:endParaRPr lang="en-US" b="1" u="sng" dirty="0"/>
+              <a:t>Correlation</a:t>
+            </a:r>
+            <a:endParaRPr lang="en-US" dirty="0" smtClean="0"/>
           </a:p>
           <a:p>
             <a:pPr algn="ctr"/>
             <a:r>
               <a:rPr lang="en-US" i="1" dirty="0" smtClean="0"/>
-              <a:t>Finish </a:t>
-            </a:r>
-            <a:r>
-              <a:rPr lang="en-US" i="1" dirty="0"/>
-              <a:t>discussion</a:t>
-            </a:r>
-          </a:p>
-          <a:p>
-            <a:pPr algn="ctr"/>
-            <a:r>
-              <a:rPr lang="en-US" i="1" dirty="0"/>
-              <a:t>Homework questions</a:t>
-            </a:r>
-          </a:p>
-          <a:p>
-            <a:pPr algn="ctr"/>
-            <a:endParaRPr lang="en-US" i="1" dirty="0"/>
-          </a:p>
-          <a:p>
-            <a:pPr algn="ctr"/>
-            <a:r>
-              <a:rPr lang="en-US" dirty="0"/>
-              <a:t>Chapter 6</a:t>
-            </a:r>
-          </a:p>
-          <a:p>
-            <a:pPr algn="ctr"/>
-            <a:r>
-              <a:rPr lang="en-US" b="1" u="sng" dirty="0" smtClean="0"/>
-              <a:t>Confidence Interval Estimation: The t Distribution</a:t>
-            </a:r>
-            <a:endParaRPr lang="en-US" b="1" u="sng" dirty="0"/>
-          </a:p>
-          <a:p>
-            <a:pPr algn="ctr"/>
-            <a:r>
-              <a:rPr lang="en-US" i="1" dirty="0" smtClean="0"/>
-              <a:t>Lecture slides</a:t>
-            </a:r>
-            <a:endParaRPr lang="en-US" i="1" dirty="0"/>
-          </a:p>
-          <a:p>
-            <a:pPr algn="ctr"/>
-            <a:r>
-              <a:rPr lang="en-US" i="1" dirty="0" smtClean="0"/>
-              <a:t>(first half)</a:t>
-            </a:r>
-            <a:endParaRPr lang="en-US" i="1" dirty="0"/>
+              <a:t>First half, chapter slides</a:t>
+            </a:r>
+            <a:endParaRPr lang="en-US" i="1" dirty="0" smtClean="0"/>
           </a:p>
         </p:txBody>
       </p:sp>
@@ -4647,10 +4722,74 @@
           </a:prstGeom>
         </p:spPr>
       </p:pic>
+      <p:sp>
+        <p:nvSpPr>
+          <p:cNvPr id="13" name="TextBox 12"/>
+          <p:cNvSpPr txBox="1"/>
+          <p:nvPr/>
+        </p:nvSpPr>
+        <p:spPr>
+          <a:xfrm>
+            <a:off x="2175358" y="2646127"/>
+            <a:ext cx="5005769" cy="1477328"/>
+          </a:xfrm>
+          <a:prstGeom prst="rect">
+            <a:avLst/>
+          </a:prstGeom>
+          <a:noFill/>
+        </p:spPr>
+        <p:txBody>
+          <a:bodyPr wrap="square" rtlCol="0">
+            <a:spAutoFit/>
+          </a:bodyPr>
+          <a:lstStyle/>
+          <a:p>
+            <a:pPr algn="ctr"/>
+            <a:r>
+              <a:rPr lang="en-US" dirty="0" smtClean="0"/>
+              <a:t>Chapter </a:t>
+            </a:r>
+            <a:r>
+              <a:rPr lang="en-US" dirty="0"/>
+              <a:t>8</a:t>
+            </a:r>
+          </a:p>
+          <a:p>
+            <a:pPr algn="ctr"/>
+            <a:r>
+              <a:rPr lang="en-US" b="1" u="sng" dirty="0" smtClean="0"/>
+              <a:t>Effect Size &amp; Power Analysis</a:t>
+            </a:r>
+            <a:endParaRPr lang="en-US" dirty="0" smtClean="0"/>
+          </a:p>
+          <a:p>
+            <a:pPr algn="ctr"/>
+            <a:r>
+              <a:rPr lang="en-US" i="1" dirty="0" smtClean="0"/>
+              <a:t>Chapter slides</a:t>
+            </a:r>
+          </a:p>
+          <a:p>
+            <a:pPr algn="ctr"/>
+            <a:r>
+              <a:rPr lang="en-US" i="1" dirty="0" smtClean="0"/>
+              <a:t>Demo G*Power software</a:t>
+            </a:r>
+          </a:p>
+          <a:p>
+            <a:pPr algn="ctr"/>
+            <a:r>
+              <a:rPr lang="en-US" i="1" dirty="0" smtClean="0"/>
+              <a:t>Homework Help</a:t>
+            </a:r>
+            <a:endParaRPr lang="en-US" i="1" dirty="0" smtClean="0"/>
+          </a:p>
+        </p:txBody>
+      </p:sp>
     </p:spTree>
     <p:extLst>
       <p:ext uri="{BB962C8B-B14F-4D97-AF65-F5344CB8AC3E}">
-        <p14:creationId xmlns:p14="http://schemas.microsoft.com/office/powerpoint/2010/main" val="1136618621"/>
+        <p14:creationId xmlns:p14="http://schemas.microsoft.com/office/powerpoint/2010/main" val="3221510669"/>
       </p:ext>
     </p:extLst>
   </p:cSld>
@@ -4660,7 +4799,7 @@
 </p:sld>
 </file>
 
-<file path=ppt/slides/slide6.xml><?xml version="1.0" encoding="utf-8"?>
+<file path=ppt/slides/slide5.xml><?xml version="1.0" encoding="utf-8"?>
 <p:sld xmlns:a="http://schemas.openxmlformats.org/drawingml/2006/main" xmlns:r="http://schemas.openxmlformats.org/officeDocument/2006/relationships" xmlns:p="http://schemas.openxmlformats.org/presentationml/2006/main">
   <p:cSld>
     <p:spTree>
@@ -4778,7 +4917,15 @@
             <a:pPr algn="ctr"/>
             <a:r>
               <a:rPr lang="en-US" dirty="0" smtClean="0"/>
-              <a:t>Jan. 22, 2020</a:t>
+              <a:t>Feb. </a:t>
+            </a:r>
+            <a:r>
+              <a:rPr lang="en-US" dirty="0" smtClean="0"/>
+              <a:t>10, </a:t>
+            </a:r>
+            <a:r>
+              <a:rPr lang="en-US" dirty="0" smtClean="0"/>
+              <a:t>2020</a:t>
             </a:r>
             <a:endParaRPr lang="en-US" dirty="0"/>
           </a:p>
@@ -4793,7 +4940,7 @@
         <p:spPr>
           <a:xfrm>
             <a:off x="2035110" y="3043759"/>
-            <a:ext cx="5005769" cy="2585323"/>
+            <a:ext cx="5005769" cy="923330"/>
           </a:xfrm>
           <a:prstGeom prst="rect">
             <a:avLst/>
@@ -4808,72 +4955,35 @@
           <a:p>
             <a:pPr algn="ctr"/>
             <a:r>
+              <a:rPr lang="en-US" dirty="0" smtClean="0"/>
+              <a:t>Chapter </a:t>
+            </a:r>
+            <a:r>
               <a:rPr lang="en-US" dirty="0"/>
-              <a:t>Chapter 3</a:t>
-            </a:r>
+              <a:t>7</a:t>
+            </a:r>
+            <a:endParaRPr lang="en-US" dirty="0"/>
           </a:p>
           <a:p>
             <a:pPr algn="ctr"/>
             <a:r>
               <a:rPr lang="en-US" b="1" u="sng" dirty="0"/>
-              <a:t>Variable/Scale, Rounding &amp; Summation</a:t>
+              <a:t>Independent Samples t-Test for </a:t>
+            </a:r>
+            <a:r>
+              <a:rPr lang="en-US" b="1" u="sng" dirty="0" smtClean="0"/>
+              <a:t>Means</a:t>
             </a:r>
           </a:p>
           <a:p>
             <a:pPr algn="ctr"/>
             <a:r>
               <a:rPr lang="en-US" i="1" dirty="0" smtClean="0"/>
-              <a:t>Finish </a:t>
-            </a:r>
-            <a:r>
-              <a:rPr lang="en-US" i="1" dirty="0"/>
-              <a:t>discussion</a:t>
-            </a:r>
-          </a:p>
-          <a:p>
-            <a:pPr algn="ctr"/>
-            <a:r>
-              <a:rPr lang="en-US" i="1" dirty="0"/>
-              <a:t>Homework questions</a:t>
-            </a:r>
-          </a:p>
-          <a:p>
-            <a:pPr algn="ctr"/>
-            <a:endParaRPr lang="en-US" i="1" dirty="0"/>
-          </a:p>
-          <a:p>
-            <a:pPr algn="ctr"/>
-            <a:r>
-              <a:rPr lang="en-US" dirty="0"/>
-              <a:t>Chapter </a:t>
-            </a:r>
-            <a:r>
-              <a:rPr lang="en-US" dirty="0" smtClean="0"/>
-              <a:t>4</a:t>
-            </a:r>
-            <a:endParaRPr lang="en-US" dirty="0"/>
-          </a:p>
-          <a:p>
-            <a:pPr algn="ctr"/>
-            <a:r>
-              <a:rPr lang="en-US" b="1" u="sng" dirty="0" smtClean="0"/>
-              <a:t>Standardized Scores &amp; the Normal Distribution</a:t>
-            </a:r>
-            <a:endParaRPr lang="en-US" b="1" u="sng" dirty="0"/>
-          </a:p>
-          <a:p>
-            <a:pPr algn="ctr"/>
+              <a:t>Mostly Homework </a:t>
+            </a:r>
             <a:r>
               <a:rPr lang="en-US" i="1" dirty="0" smtClean="0"/>
-              <a:t>Lecture slides</a:t>
-            </a:r>
-            <a:endParaRPr lang="en-US" i="1" dirty="0"/>
-          </a:p>
-          <a:p>
-            <a:pPr algn="ctr"/>
-            <a:r>
-              <a:rPr lang="en-US" i="1" dirty="0" smtClean="0"/>
-              <a:t>(first half)</a:t>
+              <a:t>Helps</a:t>
             </a:r>
             <a:endParaRPr lang="en-US" i="1" dirty="0"/>
           </a:p>
@@ -5017,7 +5127,7 @@
     </p:spTree>
     <p:extLst>
       <p:ext uri="{BB962C8B-B14F-4D97-AF65-F5344CB8AC3E}">
-        <p14:creationId xmlns:p14="http://schemas.microsoft.com/office/powerpoint/2010/main" val="2900019700"/>
+        <p14:creationId xmlns:p14="http://schemas.microsoft.com/office/powerpoint/2010/main" val="2916572011"/>
       </p:ext>
     </p:extLst>
   </p:cSld>
@@ -5027,7 +5137,7 @@
 </p:sld>
 </file>
 
-<file path=ppt/slides/slide7.xml><?xml version="1.0" encoding="utf-8"?>
+<file path=ppt/slides/slide6.xml><?xml version="1.0" encoding="utf-8"?>
 <p:sld xmlns:a="http://schemas.openxmlformats.org/drawingml/2006/main" xmlns:r="http://schemas.openxmlformats.org/officeDocument/2006/relationships" xmlns:p="http://schemas.openxmlformats.org/presentationml/2006/main">
   <p:cSld>
     <p:spTree>
@@ -5145,7 +5255,7 @@
             <a:pPr algn="ctr"/>
             <a:r>
               <a:rPr lang="en-US" dirty="0" smtClean="0"/>
-              <a:t>Jan. 15, 2020</a:t>
+              <a:t>Feb. 5, 2020</a:t>
             </a:r>
             <a:endParaRPr lang="en-US" dirty="0"/>
           </a:p>
@@ -5159,8 +5269,8 @@
         </p:nvSpPr>
         <p:spPr>
           <a:xfrm>
-            <a:off x="2318419" y="3043759"/>
-            <a:ext cx="4212906" cy="2585323"/>
+            <a:off x="2035110" y="3043759"/>
+            <a:ext cx="5005769" cy="1477328"/>
           </a:xfrm>
           <a:prstGeom prst="rect">
             <a:avLst/>
@@ -5176,47 +5286,20 @@
             <a:pPr algn="ctr"/>
             <a:r>
               <a:rPr lang="en-US" dirty="0" smtClean="0"/>
-              <a:t>Chapter 1</a:t>
+              <a:t>Chapter </a:t>
+            </a:r>
+            <a:r>
+              <a:rPr lang="en-US" dirty="0"/>
+              <a:t>6</a:t>
             </a:r>
           </a:p>
           <a:p>
             <a:pPr algn="ctr"/>
             <a:r>
               <a:rPr lang="en-US" b="1" u="sng" dirty="0" smtClean="0"/>
-              <a:t>Variable/Scale, Rounding &amp; Summation</a:t>
-            </a:r>
-          </a:p>
-          <a:p>
-            <a:pPr algn="ctr"/>
-            <a:r>
-              <a:rPr lang="en-US" i="1" dirty="0" smtClean="0"/>
-              <a:t>Finish discussion</a:t>
-            </a:r>
-          </a:p>
-          <a:p>
-            <a:pPr algn="ctr"/>
-            <a:r>
-              <a:rPr lang="en-US" i="1" dirty="0" smtClean="0"/>
-              <a:t>Homework questions</a:t>
-            </a:r>
-          </a:p>
-          <a:p>
-            <a:pPr algn="ctr"/>
-            <a:endParaRPr lang="en-US" i="1" dirty="0" smtClean="0"/>
-          </a:p>
-          <a:p>
-            <a:pPr algn="ctr"/>
-            <a:r>
-              <a:rPr lang="en-US" dirty="0"/>
-              <a:t>Chapter 2 </a:t>
-            </a:r>
-          </a:p>
-          <a:p>
-            <a:pPr algn="ctr"/>
-            <a:r>
-              <a:rPr lang="en-US" b="1" u="sng" dirty="0"/>
-              <a:t>Exploring Data with Plots</a:t>
-            </a:r>
+              <a:t>Confidence Interval Estimation: The t Distribution</a:t>
+            </a:r>
+            <a:endParaRPr lang="en-US" b="1" u="sng" dirty="0"/>
           </a:p>
           <a:p>
             <a:pPr algn="ctr"/>
@@ -5229,12 +5312,15 @@
           <a:p>
             <a:pPr algn="ctr"/>
             <a:r>
-              <a:rPr lang="en-US" i="1" dirty="0"/>
-              <a:t>Homework </a:t>
-            </a:r>
-            <a:r>
               <a:rPr lang="en-US" i="1" dirty="0" smtClean="0"/>
-              <a:t>questions</a:t>
+              <a:t>(second half)</a:t>
+            </a:r>
+          </a:p>
+          <a:p>
+            <a:pPr algn="ctr"/>
+            <a:r>
+              <a:rPr lang="en-US" i="1" dirty="0" smtClean="0"/>
+              <a:t>Homework Helps</a:t>
             </a:r>
             <a:endParaRPr lang="en-US" i="1" dirty="0"/>
           </a:p>
@@ -5378,7 +5464,344 @@
     </p:spTree>
     <p:extLst>
       <p:ext uri="{BB962C8B-B14F-4D97-AF65-F5344CB8AC3E}">
-        <p14:creationId xmlns:p14="http://schemas.microsoft.com/office/powerpoint/2010/main" val="3290463226"/>
+        <p14:creationId xmlns:p14="http://schemas.microsoft.com/office/powerpoint/2010/main" val="3019460125"/>
+      </p:ext>
+    </p:extLst>
+  </p:cSld>
+  <p:clrMapOvr>
+    <a:masterClrMapping/>
+  </p:clrMapOvr>
+</p:sld>
+</file>
+
+<file path=ppt/slides/slide7.xml><?xml version="1.0" encoding="utf-8"?>
+<p:sld xmlns:a="http://schemas.openxmlformats.org/drawingml/2006/main" xmlns:r="http://schemas.openxmlformats.org/officeDocument/2006/relationships" xmlns:p="http://schemas.openxmlformats.org/presentationml/2006/main">
+  <p:cSld>
+    <p:spTree>
+      <p:nvGrpSpPr>
+        <p:cNvPr id="1" name=""/>
+        <p:cNvGrpSpPr/>
+        <p:nvPr/>
+      </p:nvGrpSpPr>
+      <p:grpSpPr>
+        <a:xfrm>
+          <a:off x="0" y="0"/>
+          <a:ext cx="0" cy="0"/>
+          <a:chOff x="0" y="0"/>
+          <a:chExt cx="0" cy="0"/>
+        </a:xfrm>
+      </p:grpSpPr>
+      <p:sp>
+        <p:nvSpPr>
+          <p:cNvPr id="4" name="Rectangle 3"/>
+          <p:cNvSpPr/>
+          <p:nvPr/>
+        </p:nvSpPr>
+        <p:spPr>
+          <a:xfrm>
+            <a:off x="1808702" y="824230"/>
+            <a:ext cx="8778240" cy="5010912"/>
+          </a:xfrm>
+          <a:prstGeom prst="rect">
+            <a:avLst/>
+          </a:prstGeom>
+          <a:solidFill>
+            <a:schemeClr val="bg1">
+              <a:lumMod val="95000"/>
+            </a:schemeClr>
+          </a:solidFill>
+          <a:ln w="38100"/>
+        </p:spPr>
+        <p:style>
+          <a:lnRef idx="2">
+            <a:schemeClr val="accent1">
+              <a:shade val="50000"/>
+            </a:schemeClr>
+          </a:lnRef>
+          <a:fillRef idx="1">
+            <a:schemeClr val="accent1"/>
+          </a:fillRef>
+          <a:effectRef idx="0">
+            <a:schemeClr val="accent1"/>
+          </a:effectRef>
+          <a:fontRef idx="minor">
+            <a:schemeClr val="lt1"/>
+          </a:fontRef>
+        </p:style>
+        <p:txBody>
+          <a:bodyPr rtlCol="0" anchor="ctr"/>
+          <a:lstStyle/>
+          <a:p>
+            <a:pPr algn="ctr"/>
+            <a:endParaRPr lang="en-US"/>
+          </a:p>
+        </p:txBody>
+      </p:sp>
+      <p:sp>
+        <p:nvSpPr>
+          <p:cNvPr id="7" name="TextBox 6"/>
+          <p:cNvSpPr txBox="1"/>
+          <p:nvPr/>
+        </p:nvSpPr>
+        <p:spPr>
+          <a:xfrm>
+            <a:off x="3840385" y="1213849"/>
+            <a:ext cx="5712369" cy="923330"/>
+          </a:xfrm>
+          <a:prstGeom prst="rect">
+            <a:avLst/>
+          </a:prstGeom>
+          <a:noFill/>
+        </p:spPr>
+        <p:txBody>
+          <a:bodyPr wrap="square" rtlCol="0">
+            <a:spAutoFit/>
+          </a:bodyPr>
+          <a:lstStyle/>
+          <a:p>
+            <a:r>
+              <a:rPr lang="en-US" sz="5400" dirty="0" smtClean="0"/>
+              <a:t>INCLASS LECTURES</a:t>
+            </a:r>
+            <a:endParaRPr lang="en-US" sz="5400" dirty="0"/>
+          </a:p>
+        </p:txBody>
+      </p:sp>
+      <p:sp>
+        <p:nvSpPr>
+          <p:cNvPr id="8" name="TextBox 7"/>
+          <p:cNvSpPr txBox="1"/>
+          <p:nvPr/>
+        </p:nvSpPr>
+        <p:spPr>
+          <a:xfrm>
+            <a:off x="7731444" y="5278932"/>
+            <a:ext cx="2076450" cy="369332"/>
+          </a:xfrm>
+          <a:prstGeom prst="rect">
+            <a:avLst/>
+          </a:prstGeom>
+          <a:noFill/>
+        </p:spPr>
+        <p:txBody>
+          <a:bodyPr wrap="square" rtlCol="0">
+            <a:spAutoFit/>
+          </a:bodyPr>
+          <a:lstStyle/>
+          <a:p>
+            <a:pPr algn="ctr"/>
+            <a:r>
+              <a:rPr lang="en-US" dirty="0" smtClean="0"/>
+              <a:t>Feb. 5, 2020</a:t>
+            </a:r>
+            <a:endParaRPr lang="en-US" dirty="0"/>
+          </a:p>
+        </p:txBody>
+      </p:sp>
+      <p:sp>
+        <p:nvSpPr>
+          <p:cNvPr id="9" name="TextBox 8"/>
+          <p:cNvSpPr txBox="1"/>
+          <p:nvPr/>
+        </p:nvSpPr>
+        <p:spPr>
+          <a:xfrm>
+            <a:off x="2035110" y="3043759"/>
+            <a:ext cx="5005769" cy="1477328"/>
+          </a:xfrm>
+          <a:prstGeom prst="rect">
+            <a:avLst/>
+          </a:prstGeom>
+          <a:noFill/>
+        </p:spPr>
+        <p:txBody>
+          <a:bodyPr wrap="square" rtlCol="0">
+            <a:spAutoFit/>
+          </a:bodyPr>
+          <a:lstStyle/>
+          <a:p>
+            <a:pPr algn="ctr"/>
+            <a:r>
+              <a:rPr lang="en-US" dirty="0" smtClean="0"/>
+              <a:t>Chapter </a:t>
+            </a:r>
+            <a:r>
+              <a:rPr lang="en-US" dirty="0"/>
+              <a:t>6</a:t>
+            </a:r>
+          </a:p>
+          <a:p>
+            <a:pPr algn="ctr"/>
+            <a:r>
+              <a:rPr lang="en-US" b="1" u="sng" dirty="0" smtClean="0"/>
+              <a:t>Confidence Interval Estimation: The t Distribution</a:t>
+            </a:r>
+            <a:endParaRPr lang="en-US" b="1" u="sng" dirty="0"/>
+          </a:p>
+          <a:p>
+            <a:pPr algn="ctr"/>
+            <a:r>
+              <a:rPr lang="en-US" i="1" dirty="0" smtClean="0"/>
+              <a:t>Lecture slides</a:t>
+            </a:r>
+            <a:endParaRPr lang="en-US" i="1" dirty="0"/>
+          </a:p>
+          <a:p>
+            <a:pPr algn="ctr"/>
+            <a:r>
+              <a:rPr lang="en-US" i="1" dirty="0" smtClean="0"/>
+              <a:t>(second half)</a:t>
+            </a:r>
+          </a:p>
+          <a:p>
+            <a:pPr algn="ctr"/>
+            <a:r>
+              <a:rPr lang="en-US" i="1" dirty="0" smtClean="0"/>
+              <a:t>Homework Helps</a:t>
+            </a:r>
+            <a:endParaRPr lang="en-US" i="1" dirty="0"/>
+          </a:p>
+        </p:txBody>
+      </p:sp>
+      <p:grpSp>
+        <p:nvGrpSpPr>
+          <p:cNvPr id="14" name="Group 13"/>
+          <p:cNvGrpSpPr/>
+          <p:nvPr/>
+        </p:nvGrpSpPr>
+        <p:grpSpPr>
+          <a:xfrm>
+            <a:off x="7198839" y="2137179"/>
+            <a:ext cx="3141660" cy="3193339"/>
+            <a:chOff x="7047391" y="1961976"/>
+            <a:chExt cx="3141660" cy="3193339"/>
+          </a:xfrm>
+        </p:grpSpPr>
+        <p:pic>
+          <p:nvPicPr>
+            <p:cNvPr id="2" name="Picture 1"/>
+            <p:cNvPicPr>
+              <a:picLocks noChangeAspect="1"/>
+            </p:cNvPicPr>
+            <p:nvPr/>
+          </p:nvPicPr>
+          <p:blipFill>
+            <a:blip r:embed="rId2" cstate="print">
+              <a:extLst>
+                <a:ext uri="{28A0092B-C50C-407E-A947-70E740481C1C}">
+                  <a14:useLocalDpi xmlns:a14="http://schemas.microsoft.com/office/drawing/2010/main" val="0"/>
+                </a:ext>
+              </a:extLst>
+            </a:blip>
+            <a:stretch>
+              <a:fillRect/>
+            </a:stretch>
+          </p:blipFill>
+          <p:spPr>
+            <a:xfrm>
+              <a:off x="7047391" y="3320161"/>
+              <a:ext cx="1578867" cy="1828804"/>
+            </a:xfrm>
+            <a:prstGeom prst="rect">
+              <a:avLst/>
+            </a:prstGeom>
+          </p:spPr>
+        </p:pic>
+        <p:pic>
+          <p:nvPicPr>
+            <p:cNvPr id="3" name="Picture 2"/>
+            <p:cNvPicPr>
+              <a:picLocks noChangeAspect="1"/>
+            </p:cNvPicPr>
+            <p:nvPr/>
+          </p:nvPicPr>
+          <p:blipFill>
+            <a:blip r:embed="rId3" cstate="print">
+              <a:extLst>
+                <a:ext uri="{28A0092B-C50C-407E-A947-70E740481C1C}">
+                  <a14:useLocalDpi xmlns:a14="http://schemas.microsoft.com/office/drawing/2010/main" val="0"/>
+                </a:ext>
+              </a:extLst>
+            </a:blip>
+            <a:stretch>
+              <a:fillRect/>
+            </a:stretch>
+          </p:blipFill>
+          <p:spPr>
+            <a:xfrm>
+              <a:off x="7830475" y="1961976"/>
+              <a:ext cx="1578867" cy="1828804"/>
+            </a:xfrm>
+            <a:prstGeom prst="rect">
+              <a:avLst/>
+            </a:prstGeom>
+          </p:spPr>
+        </p:pic>
+        <p:pic>
+          <p:nvPicPr>
+            <p:cNvPr id="11" name="Picture 10"/>
+            <p:cNvPicPr>
+              <a:picLocks noChangeAspect="1"/>
+            </p:cNvPicPr>
+            <p:nvPr/>
+          </p:nvPicPr>
+          <p:blipFill>
+            <a:blip r:embed="rId4" cstate="print">
+              <a:extLst>
+                <a:ext uri="{28A0092B-C50C-407E-A947-70E740481C1C}">
+                  <a14:useLocalDpi xmlns:a14="http://schemas.microsoft.com/office/drawing/2010/main" val="0"/>
+                </a:ext>
+              </a:extLst>
+            </a:blip>
+            <a:stretch>
+              <a:fillRect/>
+            </a:stretch>
+          </p:blipFill>
+          <p:spPr>
+            <a:xfrm>
+              <a:off x="8610184" y="3326511"/>
+              <a:ext cx="1578867" cy="1828804"/>
+            </a:xfrm>
+            <a:prstGeom prst="rect">
+              <a:avLst/>
+            </a:prstGeom>
+          </p:spPr>
+        </p:pic>
+      </p:grpSp>
+      <p:pic>
+        <p:nvPicPr>
+          <p:cNvPr id="12" name="Picture 11"/>
+          <p:cNvPicPr>
+            <a:picLocks noChangeAspect="1"/>
+          </p:cNvPicPr>
+          <p:nvPr/>
+        </p:nvPicPr>
+        <p:blipFill>
+          <a:blip r:embed="rId5" cstate="print">
+            <a:extLst>
+              <a:ext uri="{28A0092B-C50C-407E-A947-70E740481C1C}">
+                <a14:useLocalDpi xmlns:a14="http://schemas.microsoft.com/office/drawing/2010/main" val="0"/>
+              </a:ext>
+            </a:extLst>
+          </a:blip>
+          <a:stretch>
+            <a:fillRect/>
+          </a:stretch>
+        </p:blipFill>
+        <p:spPr>
+          <a:xfrm>
+            <a:off x="2035110" y="1019593"/>
+            <a:ext cx="1578867" cy="1828804"/>
+          </a:xfrm>
+          <a:prstGeom prst="rect">
+            <a:avLst/>
+          </a:prstGeom>
+        </p:spPr>
+      </p:pic>
+    </p:spTree>
+    <p:extLst>
+      <p:ext uri="{BB962C8B-B14F-4D97-AF65-F5344CB8AC3E}">
+        <p14:creationId xmlns:p14="http://schemas.microsoft.com/office/powerpoint/2010/main" val="4154058086"/>
       </p:ext>
     </p:extLst>
   </p:cSld>
@@ -5405,51 +5828,26 @@
           <a:chExt cx="0" cy="0"/>
         </a:xfrm>
       </p:grpSpPr>
-      <p:pic>
-        <p:nvPicPr>
-          <p:cNvPr id="2" name="Picture 1"/>
-          <p:cNvPicPr>
-            <a:picLocks noChangeAspect="1"/>
-          </p:cNvPicPr>
+      <p:sp>
+        <p:nvSpPr>
+          <p:cNvPr id="4" name="Rectangle 3"/>
+          <p:cNvSpPr/>
           <p:nvPr/>
-        </p:nvPicPr>
-        <p:blipFill>
-          <a:blip r:embed="rId2" cstate="print">
-            <a:extLst>
-              <a:ext uri="{28A0092B-C50C-407E-A947-70E740481C1C}">
-                <a14:useLocalDpi xmlns:a14="http://schemas.microsoft.com/office/drawing/2010/main" val="0"/>
-              </a:ext>
-            </a:extLst>
-          </a:blip>
-          <a:stretch>
-            <a:fillRect/>
-          </a:stretch>
-        </p:blipFill>
-        <p:spPr>
-          <a:xfrm>
-            <a:off x="5306566" y="2514598"/>
-            <a:ext cx="1578867" cy="1828804"/>
+        </p:nvSpPr>
+        <p:spPr>
+          <a:xfrm>
+            <a:off x="1808702" y="824230"/>
+            <a:ext cx="8778240" cy="5010912"/>
           </a:xfrm>
           <a:prstGeom prst="rect">
             <a:avLst/>
           </a:prstGeom>
-        </p:spPr>
-      </p:pic>
-      <p:sp>
-        <p:nvSpPr>
-          <p:cNvPr id="3" name="Rectangle 2"/>
-          <p:cNvSpPr/>
-          <p:nvPr/>
-        </p:nvSpPr>
-        <p:spPr>
-          <a:xfrm>
-            <a:off x="5054138" y="2394066"/>
-            <a:ext cx="2094807" cy="2078182"/>
-          </a:xfrm>
-          <a:prstGeom prst="rect">
-            <a:avLst/>
-          </a:prstGeom>
-          <a:noFill/>
+          <a:solidFill>
+            <a:schemeClr val="bg1">
+              <a:lumMod val="95000"/>
+            </a:schemeClr>
+          </a:solidFill>
+          <a:ln w="38100"/>
         </p:spPr>
         <p:style>
           <a:lnRef idx="2">
@@ -5476,10 +5874,669 @@
           </a:p>
         </p:txBody>
       </p:sp>
+      <p:sp>
+        <p:nvSpPr>
+          <p:cNvPr id="7" name="TextBox 6"/>
+          <p:cNvSpPr txBox="1"/>
+          <p:nvPr/>
+        </p:nvSpPr>
+        <p:spPr>
+          <a:xfrm>
+            <a:off x="3840385" y="1213849"/>
+            <a:ext cx="5712369" cy="923330"/>
+          </a:xfrm>
+          <a:prstGeom prst="rect">
+            <a:avLst/>
+          </a:prstGeom>
+          <a:noFill/>
+        </p:spPr>
+        <p:txBody>
+          <a:bodyPr wrap="square" rtlCol="0">
+            <a:spAutoFit/>
+          </a:bodyPr>
+          <a:lstStyle/>
+          <a:p>
+            <a:r>
+              <a:rPr lang="en-US" sz="5400" dirty="0" smtClean="0"/>
+              <a:t>INCLASS LECTURES</a:t>
+            </a:r>
+            <a:endParaRPr lang="en-US" sz="5400" dirty="0"/>
+          </a:p>
+        </p:txBody>
+      </p:sp>
+      <p:sp>
+        <p:nvSpPr>
+          <p:cNvPr id="8" name="TextBox 7"/>
+          <p:cNvSpPr txBox="1"/>
+          <p:nvPr/>
+        </p:nvSpPr>
+        <p:spPr>
+          <a:xfrm>
+            <a:off x="7731444" y="5278932"/>
+            <a:ext cx="2076450" cy="369332"/>
+          </a:xfrm>
+          <a:prstGeom prst="rect">
+            <a:avLst/>
+          </a:prstGeom>
+          <a:noFill/>
+        </p:spPr>
+        <p:txBody>
+          <a:bodyPr wrap="square" rtlCol="0">
+            <a:spAutoFit/>
+          </a:bodyPr>
+          <a:lstStyle/>
+          <a:p>
+            <a:pPr algn="ctr"/>
+            <a:r>
+              <a:rPr lang="en-US" dirty="0" smtClean="0"/>
+              <a:t>Feb. 3, 2020</a:t>
+            </a:r>
+            <a:endParaRPr lang="en-US" dirty="0"/>
+          </a:p>
+        </p:txBody>
+      </p:sp>
+      <p:sp>
+        <p:nvSpPr>
+          <p:cNvPr id="9" name="TextBox 8"/>
+          <p:cNvSpPr txBox="1"/>
+          <p:nvPr/>
+        </p:nvSpPr>
+        <p:spPr>
+          <a:xfrm>
+            <a:off x="2035110" y="3043759"/>
+            <a:ext cx="5005769" cy="2585323"/>
+          </a:xfrm>
+          <a:prstGeom prst="rect">
+            <a:avLst/>
+          </a:prstGeom>
+          <a:noFill/>
+        </p:spPr>
+        <p:txBody>
+          <a:bodyPr wrap="square" rtlCol="0">
+            <a:spAutoFit/>
+          </a:bodyPr>
+          <a:lstStyle/>
+          <a:p>
+            <a:pPr algn="ctr"/>
+            <a:r>
+              <a:rPr lang="en-US" dirty="0"/>
+              <a:t>Chapter </a:t>
+            </a:r>
+            <a:r>
+              <a:rPr lang="en-US" dirty="0" smtClean="0"/>
+              <a:t>5</a:t>
+            </a:r>
+            <a:endParaRPr lang="en-US" dirty="0"/>
+          </a:p>
+          <a:p>
+            <a:pPr algn="ctr"/>
+            <a:r>
+              <a:rPr lang="en-US" b="1" u="sng" dirty="0" smtClean="0"/>
+              <a:t>Intro to Hypothesis Testing: 1 sample z-Test</a:t>
+            </a:r>
+            <a:endParaRPr lang="en-US" b="1" u="sng" dirty="0"/>
+          </a:p>
+          <a:p>
+            <a:pPr algn="ctr"/>
+            <a:r>
+              <a:rPr lang="en-US" i="1" dirty="0" smtClean="0"/>
+              <a:t>Finish </a:t>
+            </a:r>
+            <a:r>
+              <a:rPr lang="en-US" i="1" dirty="0"/>
+              <a:t>discussion</a:t>
+            </a:r>
+          </a:p>
+          <a:p>
+            <a:pPr algn="ctr"/>
+            <a:r>
+              <a:rPr lang="en-US" i="1" dirty="0"/>
+              <a:t>Homework questions</a:t>
+            </a:r>
+          </a:p>
+          <a:p>
+            <a:pPr algn="ctr"/>
+            <a:endParaRPr lang="en-US" i="1" dirty="0"/>
+          </a:p>
+          <a:p>
+            <a:pPr algn="ctr"/>
+            <a:r>
+              <a:rPr lang="en-US" dirty="0"/>
+              <a:t>Chapter 6</a:t>
+            </a:r>
+          </a:p>
+          <a:p>
+            <a:pPr algn="ctr"/>
+            <a:r>
+              <a:rPr lang="en-US" b="1" u="sng" dirty="0" smtClean="0"/>
+              <a:t>Confidence Interval Estimation: The t Distribution</a:t>
+            </a:r>
+            <a:endParaRPr lang="en-US" b="1" u="sng" dirty="0"/>
+          </a:p>
+          <a:p>
+            <a:pPr algn="ctr"/>
+            <a:r>
+              <a:rPr lang="en-US" i="1" dirty="0" smtClean="0"/>
+              <a:t>Lecture slides</a:t>
+            </a:r>
+            <a:endParaRPr lang="en-US" i="1" dirty="0"/>
+          </a:p>
+          <a:p>
+            <a:pPr algn="ctr"/>
+            <a:r>
+              <a:rPr lang="en-US" i="1" dirty="0" smtClean="0"/>
+              <a:t>(first half)</a:t>
+            </a:r>
+            <a:endParaRPr lang="en-US" i="1" dirty="0"/>
+          </a:p>
+        </p:txBody>
+      </p:sp>
+      <p:grpSp>
+        <p:nvGrpSpPr>
+          <p:cNvPr id="14" name="Group 13"/>
+          <p:cNvGrpSpPr/>
+          <p:nvPr/>
+        </p:nvGrpSpPr>
+        <p:grpSpPr>
+          <a:xfrm>
+            <a:off x="7198839" y="2137179"/>
+            <a:ext cx="3141660" cy="3193339"/>
+            <a:chOff x="7047391" y="1961976"/>
+            <a:chExt cx="3141660" cy="3193339"/>
+          </a:xfrm>
+        </p:grpSpPr>
+        <p:pic>
+          <p:nvPicPr>
+            <p:cNvPr id="2" name="Picture 1"/>
+            <p:cNvPicPr>
+              <a:picLocks noChangeAspect="1"/>
+            </p:cNvPicPr>
+            <p:nvPr/>
+          </p:nvPicPr>
+          <p:blipFill>
+            <a:blip r:embed="rId2" cstate="print">
+              <a:extLst>
+                <a:ext uri="{28A0092B-C50C-407E-A947-70E740481C1C}">
+                  <a14:useLocalDpi xmlns:a14="http://schemas.microsoft.com/office/drawing/2010/main" val="0"/>
+                </a:ext>
+              </a:extLst>
+            </a:blip>
+            <a:stretch>
+              <a:fillRect/>
+            </a:stretch>
+          </p:blipFill>
+          <p:spPr>
+            <a:xfrm>
+              <a:off x="7047391" y="3320161"/>
+              <a:ext cx="1578867" cy="1828804"/>
+            </a:xfrm>
+            <a:prstGeom prst="rect">
+              <a:avLst/>
+            </a:prstGeom>
+          </p:spPr>
+        </p:pic>
+        <p:pic>
+          <p:nvPicPr>
+            <p:cNvPr id="3" name="Picture 2"/>
+            <p:cNvPicPr>
+              <a:picLocks noChangeAspect="1"/>
+            </p:cNvPicPr>
+            <p:nvPr/>
+          </p:nvPicPr>
+          <p:blipFill>
+            <a:blip r:embed="rId3" cstate="print">
+              <a:extLst>
+                <a:ext uri="{28A0092B-C50C-407E-A947-70E740481C1C}">
+                  <a14:useLocalDpi xmlns:a14="http://schemas.microsoft.com/office/drawing/2010/main" val="0"/>
+                </a:ext>
+              </a:extLst>
+            </a:blip>
+            <a:stretch>
+              <a:fillRect/>
+            </a:stretch>
+          </p:blipFill>
+          <p:spPr>
+            <a:xfrm>
+              <a:off x="7830475" y="1961976"/>
+              <a:ext cx="1578867" cy="1828804"/>
+            </a:xfrm>
+            <a:prstGeom prst="rect">
+              <a:avLst/>
+            </a:prstGeom>
+          </p:spPr>
+        </p:pic>
+        <p:pic>
+          <p:nvPicPr>
+            <p:cNvPr id="11" name="Picture 10"/>
+            <p:cNvPicPr>
+              <a:picLocks noChangeAspect="1"/>
+            </p:cNvPicPr>
+            <p:nvPr/>
+          </p:nvPicPr>
+          <p:blipFill>
+            <a:blip r:embed="rId4" cstate="print">
+              <a:extLst>
+                <a:ext uri="{28A0092B-C50C-407E-A947-70E740481C1C}">
+                  <a14:useLocalDpi xmlns:a14="http://schemas.microsoft.com/office/drawing/2010/main" val="0"/>
+                </a:ext>
+              </a:extLst>
+            </a:blip>
+            <a:stretch>
+              <a:fillRect/>
+            </a:stretch>
+          </p:blipFill>
+          <p:spPr>
+            <a:xfrm>
+              <a:off x="8610184" y="3326511"/>
+              <a:ext cx="1578867" cy="1828804"/>
+            </a:xfrm>
+            <a:prstGeom prst="rect">
+              <a:avLst/>
+            </a:prstGeom>
+          </p:spPr>
+        </p:pic>
+      </p:grpSp>
+      <p:pic>
+        <p:nvPicPr>
+          <p:cNvPr id="12" name="Picture 11"/>
+          <p:cNvPicPr>
+            <a:picLocks noChangeAspect="1"/>
+          </p:cNvPicPr>
+          <p:nvPr/>
+        </p:nvPicPr>
+        <p:blipFill>
+          <a:blip r:embed="rId5" cstate="print">
+            <a:extLst>
+              <a:ext uri="{28A0092B-C50C-407E-A947-70E740481C1C}">
+                <a14:useLocalDpi xmlns:a14="http://schemas.microsoft.com/office/drawing/2010/main" val="0"/>
+              </a:ext>
+            </a:extLst>
+          </a:blip>
+          <a:stretch>
+            <a:fillRect/>
+          </a:stretch>
+        </p:blipFill>
+        <p:spPr>
+          <a:xfrm>
+            <a:off x="2035110" y="1019593"/>
+            <a:ext cx="1578867" cy="1828804"/>
+          </a:xfrm>
+          <a:prstGeom prst="rect">
+            <a:avLst/>
+          </a:prstGeom>
+        </p:spPr>
+      </p:pic>
     </p:spTree>
     <p:extLst>
       <p:ext uri="{BB962C8B-B14F-4D97-AF65-F5344CB8AC3E}">
-        <p14:creationId xmlns:p14="http://schemas.microsoft.com/office/powerpoint/2010/main" val="2048573925"/>
+        <p14:creationId xmlns:p14="http://schemas.microsoft.com/office/powerpoint/2010/main" val="1136618621"/>
+      </p:ext>
+    </p:extLst>
+  </p:cSld>
+  <p:clrMapOvr>
+    <a:masterClrMapping/>
+  </p:clrMapOvr>
+</p:sld>
+</file>
+
+<file path=ppt/slides/slide9.xml><?xml version="1.0" encoding="utf-8"?>
+<p:sld xmlns:a="http://schemas.openxmlformats.org/drawingml/2006/main" xmlns:r="http://schemas.openxmlformats.org/officeDocument/2006/relationships" xmlns:p="http://schemas.openxmlformats.org/presentationml/2006/main">
+  <p:cSld>
+    <p:spTree>
+      <p:nvGrpSpPr>
+        <p:cNvPr id="1" name=""/>
+        <p:cNvGrpSpPr/>
+        <p:nvPr/>
+      </p:nvGrpSpPr>
+      <p:grpSpPr>
+        <a:xfrm>
+          <a:off x="0" y="0"/>
+          <a:ext cx="0" cy="0"/>
+          <a:chOff x="0" y="0"/>
+          <a:chExt cx="0" cy="0"/>
+        </a:xfrm>
+      </p:grpSpPr>
+      <p:sp>
+        <p:nvSpPr>
+          <p:cNvPr id="4" name="Rectangle 3"/>
+          <p:cNvSpPr/>
+          <p:nvPr/>
+        </p:nvSpPr>
+        <p:spPr>
+          <a:xfrm>
+            <a:off x="1808702" y="824230"/>
+            <a:ext cx="8778240" cy="5010912"/>
+          </a:xfrm>
+          <a:prstGeom prst="rect">
+            <a:avLst/>
+          </a:prstGeom>
+          <a:solidFill>
+            <a:schemeClr val="bg1">
+              <a:lumMod val="95000"/>
+            </a:schemeClr>
+          </a:solidFill>
+          <a:ln w="38100"/>
+        </p:spPr>
+        <p:style>
+          <a:lnRef idx="2">
+            <a:schemeClr val="accent1">
+              <a:shade val="50000"/>
+            </a:schemeClr>
+          </a:lnRef>
+          <a:fillRef idx="1">
+            <a:schemeClr val="accent1"/>
+          </a:fillRef>
+          <a:effectRef idx="0">
+            <a:schemeClr val="accent1"/>
+          </a:effectRef>
+          <a:fontRef idx="minor">
+            <a:schemeClr val="lt1"/>
+          </a:fontRef>
+        </p:style>
+        <p:txBody>
+          <a:bodyPr rtlCol="0" anchor="ctr"/>
+          <a:lstStyle/>
+          <a:p>
+            <a:pPr algn="ctr"/>
+            <a:endParaRPr lang="en-US"/>
+          </a:p>
+        </p:txBody>
+      </p:sp>
+      <p:sp>
+        <p:nvSpPr>
+          <p:cNvPr id="7" name="TextBox 6"/>
+          <p:cNvSpPr txBox="1"/>
+          <p:nvPr/>
+        </p:nvSpPr>
+        <p:spPr>
+          <a:xfrm>
+            <a:off x="3840385" y="1213849"/>
+            <a:ext cx="5712369" cy="923330"/>
+          </a:xfrm>
+          <a:prstGeom prst="rect">
+            <a:avLst/>
+          </a:prstGeom>
+          <a:noFill/>
+        </p:spPr>
+        <p:txBody>
+          <a:bodyPr wrap="square" rtlCol="0">
+            <a:spAutoFit/>
+          </a:bodyPr>
+          <a:lstStyle/>
+          <a:p>
+            <a:r>
+              <a:rPr lang="en-US" sz="5400" dirty="0" smtClean="0"/>
+              <a:t>INCLASS LECTURES</a:t>
+            </a:r>
+            <a:endParaRPr lang="en-US" sz="5400" dirty="0"/>
+          </a:p>
+        </p:txBody>
+      </p:sp>
+      <p:sp>
+        <p:nvSpPr>
+          <p:cNvPr id="8" name="TextBox 7"/>
+          <p:cNvSpPr txBox="1"/>
+          <p:nvPr/>
+        </p:nvSpPr>
+        <p:spPr>
+          <a:xfrm>
+            <a:off x="7731444" y="5278932"/>
+            <a:ext cx="2076450" cy="369332"/>
+          </a:xfrm>
+          <a:prstGeom prst="rect">
+            <a:avLst/>
+          </a:prstGeom>
+          <a:noFill/>
+        </p:spPr>
+        <p:txBody>
+          <a:bodyPr wrap="square" rtlCol="0">
+            <a:spAutoFit/>
+          </a:bodyPr>
+          <a:lstStyle/>
+          <a:p>
+            <a:pPr algn="ctr"/>
+            <a:r>
+              <a:rPr lang="en-US" dirty="0" smtClean="0"/>
+              <a:t>Jan. 22, 2020</a:t>
+            </a:r>
+            <a:endParaRPr lang="en-US" dirty="0"/>
+          </a:p>
+        </p:txBody>
+      </p:sp>
+      <p:sp>
+        <p:nvSpPr>
+          <p:cNvPr id="9" name="TextBox 8"/>
+          <p:cNvSpPr txBox="1"/>
+          <p:nvPr/>
+        </p:nvSpPr>
+        <p:spPr>
+          <a:xfrm>
+            <a:off x="2035110" y="3043759"/>
+            <a:ext cx="5005769" cy="2585323"/>
+          </a:xfrm>
+          <a:prstGeom prst="rect">
+            <a:avLst/>
+          </a:prstGeom>
+          <a:noFill/>
+        </p:spPr>
+        <p:txBody>
+          <a:bodyPr wrap="square" rtlCol="0">
+            <a:spAutoFit/>
+          </a:bodyPr>
+          <a:lstStyle/>
+          <a:p>
+            <a:pPr algn="ctr"/>
+            <a:r>
+              <a:rPr lang="en-US" dirty="0"/>
+              <a:t>Chapter 3</a:t>
+            </a:r>
+          </a:p>
+          <a:p>
+            <a:pPr algn="ctr"/>
+            <a:r>
+              <a:rPr lang="en-US" b="1" u="sng" dirty="0"/>
+              <a:t>Variable/Scale, Rounding &amp; Summation</a:t>
+            </a:r>
+          </a:p>
+          <a:p>
+            <a:pPr algn="ctr"/>
+            <a:r>
+              <a:rPr lang="en-US" i="1" dirty="0" smtClean="0"/>
+              <a:t>Finish </a:t>
+            </a:r>
+            <a:r>
+              <a:rPr lang="en-US" i="1" dirty="0"/>
+              <a:t>discussion</a:t>
+            </a:r>
+          </a:p>
+          <a:p>
+            <a:pPr algn="ctr"/>
+            <a:r>
+              <a:rPr lang="en-US" i="1" dirty="0"/>
+              <a:t>Homework questions</a:t>
+            </a:r>
+          </a:p>
+          <a:p>
+            <a:pPr algn="ctr"/>
+            <a:endParaRPr lang="en-US" i="1" dirty="0"/>
+          </a:p>
+          <a:p>
+            <a:pPr algn="ctr"/>
+            <a:r>
+              <a:rPr lang="en-US" dirty="0"/>
+              <a:t>Chapter </a:t>
+            </a:r>
+            <a:r>
+              <a:rPr lang="en-US" dirty="0" smtClean="0"/>
+              <a:t>4</a:t>
+            </a:r>
+            <a:endParaRPr lang="en-US" dirty="0"/>
+          </a:p>
+          <a:p>
+            <a:pPr algn="ctr"/>
+            <a:r>
+              <a:rPr lang="en-US" b="1" u="sng" dirty="0" smtClean="0"/>
+              <a:t>Standardized Scores &amp; the Normal Distribution</a:t>
+            </a:r>
+            <a:endParaRPr lang="en-US" b="1" u="sng" dirty="0"/>
+          </a:p>
+          <a:p>
+            <a:pPr algn="ctr"/>
+            <a:r>
+              <a:rPr lang="en-US" i="1" dirty="0" smtClean="0"/>
+              <a:t>Lecture slides</a:t>
+            </a:r>
+            <a:endParaRPr lang="en-US" i="1" dirty="0"/>
+          </a:p>
+          <a:p>
+            <a:pPr algn="ctr"/>
+            <a:r>
+              <a:rPr lang="en-US" i="1" dirty="0" smtClean="0"/>
+              <a:t>(first half)</a:t>
+            </a:r>
+            <a:endParaRPr lang="en-US" i="1" dirty="0"/>
+          </a:p>
+        </p:txBody>
+      </p:sp>
+      <p:grpSp>
+        <p:nvGrpSpPr>
+          <p:cNvPr id="14" name="Group 13"/>
+          <p:cNvGrpSpPr/>
+          <p:nvPr/>
+        </p:nvGrpSpPr>
+        <p:grpSpPr>
+          <a:xfrm>
+            <a:off x="7198839" y="2137179"/>
+            <a:ext cx="3141660" cy="3193339"/>
+            <a:chOff x="7047391" y="1961976"/>
+            <a:chExt cx="3141660" cy="3193339"/>
+          </a:xfrm>
+        </p:grpSpPr>
+        <p:pic>
+          <p:nvPicPr>
+            <p:cNvPr id="2" name="Picture 1"/>
+            <p:cNvPicPr>
+              <a:picLocks noChangeAspect="1"/>
+            </p:cNvPicPr>
+            <p:nvPr/>
+          </p:nvPicPr>
+          <p:blipFill>
+            <a:blip r:embed="rId2" cstate="print">
+              <a:extLst>
+                <a:ext uri="{28A0092B-C50C-407E-A947-70E740481C1C}">
+                  <a14:useLocalDpi xmlns:a14="http://schemas.microsoft.com/office/drawing/2010/main" val="0"/>
+                </a:ext>
+              </a:extLst>
+            </a:blip>
+            <a:stretch>
+              <a:fillRect/>
+            </a:stretch>
+          </p:blipFill>
+          <p:spPr>
+            <a:xfrm>
+              <a:off x="7047391" y="3320161"/>
+              <a:ext cx="1578867" cy="1828804"/>
+            </a:xfrm>
+            <a:prstGeom prst="rect">
+              <a:avLst/>
+            </a:prstGeom>
+          </p:spPr>
+        </p:pic>
+        <p:pic>
+          <p:nvPicPr>
+            <p:cNvPr id="3" name="Picture 2"/>
+            <p:cNvPicPr>
+              <a:picLocks noChangeAspect="1"/>
+            </p:cNvPicPr>
+            <p:nvPr/>
+          </p:nvPicPr>
+          <p:blipFill>
+            <a:blip r:embed="rId3" cstate="print">
+              <a:extLst>
+                <a:ext uri="{28A0092B-C50C-407E-A947-70E740481C1C}">
+                  <a14:useLocalDpi xmlns:a14="http://schemas.microsoft.com/office/drawing/2010/main" val="0"/>
+                </a:ext>
+              </a:extLst>
+            </a:blip>
+            <a:stretch>
+              <a:fillRect/>
+            </a:stretch>
+          </p:blipFill>
+          <p:spPr>
+            <a:xfrm>
+              <a:off x="7830475" y="1961976"/>
+              <a:ext cx="1578867" cy="1828804"/>
+            </a:xfrm>
+            <a:prstGeom prst="rect">
+              <a:avLst/>
+            </a:prstGeom>
+          </p:spPr>
+        </p:pic>
+        <p:pic>
+          <p:nvPicPr>
+            <p:cNvPr id="11" name="Picture 10"/>
+            <p:cNvPicPr>
+              <a:picLocks noChangeAspect="1"/>
+            </p:cNvPicPr>
+            <p:nvPr/>
+          </p:nvPicPr>
+          <p:blipFill>
+            <a:blip r:embed="rId4" cstate="print">
+              <a:extLst>
+                <a:ext uri="{28A0092B-C50C-407E-A947-70E740481C1C}">
+                  <a14:useLocalDpi xmlns:a14="http://schemas.microsoft.com/office/drawing/2010/main" val="0"/>
+                </a:ext>
+              </a:extLst>
+            </a:blip>
+            <a:stretch>
+              <a:fillRect/>
+            </a:stretch>
+          </p:blipFill>
+          <p:spPr>
+            <a:xfrm>
+              <a:off x="8610184" y="3326511"/>
+              <a:ext cx="1578867" cy="1828804"/>
+            </a:xfrm>
+            <a:prstGeom prst="rect">
+              <a:avLst/>
+            </a:prstGeom>
+          </p:spPr>
+        </p:pic>
+      </p:grpSp>
+      <p:pic>
+        <p:nvPicPr>
+          <p:cNvPr id="12" name="Picture 11"/>
+          <p:cNvPicPr>
+            <a:picLocks noChangeAspect="1"/>
+          </p:cNvPicPr>
+          <p:nvPr/>
+        </p:nvPicPr>
+        <p:blipFill>
+          <a:blip r:embed="rId5" cstate="print">
+            <a:extLst>
+              <a:ext uri="{28A0092B-C50C-407E-A947-70E740481C1C}">
+                <a14:useLocalDpi xmlns:a14="http://schemas.microsoft.com/office/drawing/2010/main" val="0"/>
+              </a:ext>
+            </a:extLst>
+          </a:blip>
+          <a:stretch>
+            <a:fillRect/>
+          </a:stretch>
+        </p:blipFill>
+        <p:spPr>
+          <a:xfrm>
+            <a:off x="2035110" y="1019593"/>
+            <a:ext cx="1578867" cy="1828804"/>
+          </a:xfrm>
+          <a:prstGeom prst="rect">
+            <a:avLst/>
+          </a:prstGeom>
+        </p:spPr>
+      </p:pic>
+    </p:spTree>
+    <p:extLst>
+      <p:ext uri="{BB962C8B-B14F-4D97-AF65-F5344CB8AC3E}">
+        <p14:creationId xmlns:p14="http://schemas.microsoft.com/office/powerpoint/2010/main" val="2900019700"/>
       </p:ext>
     </p:extLst>
   </p:cSld>

</xml_diff>

<commit_message>
educ 6600 ch 14 youtube thumbnails
</commit_message>
<xml_diff>
--- a/static/img/youtube_thumbnails/video_thumbnail_building.pptx
+++ b/static/img/youtube_thumbnails/video_thumbnail_building.pptx
@@ -5,23 +5,25 @@
     <p:sldMasterId id="2147483648" r:id="rId1"/>
   </p:sldMasterIdLst>
   <p:sldIdLst>
-    <p:sldId id="272" r:id="rId2"/>
-    <p:sldId id="271" r:id="rId3"/>
-    <p:sldId id="270" r:id="rId4"/>
-    <p:sldId id="259" r:id="rId5"/>
-    <p:sldId id="261" r:id="rId6"/>
-    <p:sldId id="260" r:id="rId7"/>
-    <p:sldId id="269" r:id="rId8"/>
-    <p:sldId id="268" r:id="rId9"/>
-    <p:sldId id="267" r:id="rId10"/>
-    <p:sldId id="266" r:id="rId11"/>
-    <p:sldId id="265" r:id="rId12"/>
-    <p:sldId id="264" r:id="rId13"/>
-    <p:sldId id="263" r:id="rId14"/>
-    <p:sldId id="262" r:id="rId15"/>
-    <p:sldId id="257" r:id="rId16"/>
-    <p:sldId id="256" r:id="rId17"/>
-    <p:sldId id="258" r:id="rId18"/>
+    <p:sldId id="273" r:id="rId2"/>
+    <p:sldId id="274" r:id="rId3"/>
+    <p:sldId id="272" r:id="rId4"/>
+    <p:sldId id="271" r:id="rId5"/>
+    <p:sldId id="270" r:id="rId6"/>
+    <p:sldId id="259" r:id="rId7"/>
+    <p:sldId id="261" r:id="rId8"/>
+    <p:sldId id="260" r:id="rId9"/>
+    <p:sldId id="269" r:id="rId10"/>
+    <p:sldId id="268" r:id="rId11"/>
+    <p:sldId id="267" r:id="rId12"/>
+    <p:sldId id="266" r:id="rId13"/>
+    <p:sldId id="265" r:id="rId14"/>
+    <p:sldId id="264" r:id="rId15"/>
+    <p:sldId id="263" r:id="rId16"/>
+    <p:sldId id="262" r:id="rId17"/>
+    <p:sldId id="257" r:id="rId18"/>
+    <p:sldId id="256" r:id="rId19"/>
+    <p:sldId id="258" r:id="rId20"/>
   </p:sldIdLst>
   <p:sldSz cx="12192000" cy="6858000"/>
   <p:notesSz cx="6858000" cy="9144000"/>
@@ -259,7 +261,7 @@
           <a:p>
             <a:fld id="{3C68F153-927F-4ADA-A90F-AFD816292B90}" type="datetimeFigureOut">
               <a:rPr lang="en-US" smtClean="0"/>
-              <a:t>3/25/2020</a:t>
+              <a:t>4/1/2020</a:t>
             </a:fld>
             <a:endParaRPr lang="en-US"/>
           </a:p>
@@ -429,7 +431,7 @@
           <a:p>
             <a:fld id="{3C68F153-927F-4ADA-A90F-AFD816292B90}" type="datetimeFigureOut">
               <a:rPr lang="en-US" smtClean="0"/>
-              <a:t>3/25/2020</a:t>
+              <a:t>4/1/2020</a:t>
             </a:fld>
             <a:endParaRPr lang="en-US"/>
           </a:p>
@@ -609,7 +611,7 @@
           <a:p>
             <a:fld id="{3C68F153-927F-4ADA-A90F-AFD816292B90}" type="datetimeFigureOut">
               <a:rPr lang="en-US" smtClean="0"/>
-              <a:t>3/25/2020</a:t>
+              <a:t>4/1/2020</a:t>
             </a:fld>
             <a:endParaRPr lang="en-US"/>
           </a:p>
@@ -779,7 +781,7 @@
           <a:p>
             <a:fld id="{3C68F153-927F-4ADA-A90F-AFD816292B90}" type="datetimeFigureOut">
               <a:rPr lang="en-US" smtClean="0"/>
-              <a:t>3/25/2020</a:t>
+              <a:t>4/1/2020</a:t>
             </a:fld>
             <a:endParaRPr lang="en-US"/>
           </a:p>
@@ -1025,7 +1027,7 @@
           <a:p>
             <a:fld id="{3C68F153-927F-4ADA-A90F-AFD816292B90}" type="datetimeFigureOut">
               <a:rPr lang="en-US" smtClean="0"/>
-              <a:t>3/25/2020</a:t>
+              <a:t>4/1/2020</a:t>
             </a:fld>
             <a:endParaRPr lang="en-US"/>
           </a:p>
@@ -1257,7 +1259,7 @@
           <a:p>
             <a:fld id="{3C68F153-927F-4ADA-A90F-AFD816292B90}" type="datetimeFigureOut">
               <a:rPr lang="en-US" smtClean="0"/>
-              <a:t>3/25/2020</a:t>
+              <a:t>4/1/2020</a:t>
             </a:fld>
             <a:endParaRPr lang="en-US"/>
           </a:p>
@@ -1624,7 +1626,7 @@
           <a:p>
             <a:fld id="{3C68F153-927F-4ADA-A90F-AFD816292B90}" type="datetimeFigureOut">
               <a:rPr lang="en-US" smtClean="0"/>
-              <a:t>3/25/2020</a:t>
+              <a:t>4/1/2020</a:t>
             </a:fld>
             <a:endParaRPr lang="en-US"/>
           </a:p>
@@ -1742,7 +1744,7 @@
           <a:p>
             <a:fld id="{3C68F153-927F-4ADA-A90F-AFD816292B90}" type="datetimeFigureOut">
               <a:rPr lang="en-US" smtClean="0"/>
-              <a:t>3/25/2020</a:t>
+              <a:t>4/1/2020</a:t>
             </a:fld>
             <a:endParaRPr lang="en-US"/>
           </a:p>
@@ -1837,7 +1839,7 @@
           <a:p>
             <a:fld id="{3C68F153-927F-4ADA-A90F-AFD816292B90}" type="datetimeFigureOut">
               <a:rPr lang="en-US" smtClean="0"/>
-              <a:t>3/25/2020</a:t>
+              <a:t>4/1/2020</a:t>
             </a:fld>
             <a:endParaRPr lang="en-US"/>
           </a:p>
@@ -2114,7 +2116,7 @@
           <a:p>
             <a:fld id="{3C68F153-927F-4ADA-A90F-AFD816292B90}" type="datetimeFigureOut">
               <a:rPr lang="en-US" smtClean="0"/>
-              <a:t>3/25/2020</a:t>
+              <a:t>4/1/2020</a:t>
             </a:fld>
             <a:endParaRPr lang="en-US"/>
           </a:p>
@@ -2367,7 +2369,7 @@
           <a:p>
             <a:fld id="{3C68F153-927F-4ADA-A90F-AFD816292B90}" type="datetimeFigureOut">
               <a:rPr lang="en-US" smtClean="0"/>
-              <a:t>3/25/2020</a:t>
+              <a:t>4/1/2020</a:t>
             </a:fld>
             <a:endParaRPr lang="en-US"/>
           </a:p>
@@ -2580,7 +2582,7 @@
           <a:p>
             <a:fld id="{3C68F153-927F-4ADA-A90F-AFD816292B90}" type="datetimeFigureOut">
               <a:rPr lang="en-US" smtClean="0"/>
-              <a:t>3/25/2020</a:t>
+              <a:t>4/1/2020</a:t>
             </a:fld>
             <a:endParaRPr lang="en-US"/>
           </a:p>
@@ -2993,7 +2995,7 @@
         </p:nvSpPr>
         <p:spPr>
           <a:xfrm>
-            <a:off x="1853580" y="824230"/>
+            <a:off x="1808702" y="824230"/>
             <a:ext cx="8778240" cy="5010912"/>
           </a:xfrm>
           <a:prstGeom prst="rect">
@@ -3039,7 +3041,7 @@
         </p:nvSpPr>
         <p:spPr>
           <a:xfrm>
-            <a:off x="3838696" y="1056832"/>
+            <a:off x="4184694" y="1065121"/>
             <a:ext cx="5712369" cy="1754326"/>
           </a:xfrm>
           <a:prstGeom prst="rect">
@@ -3055,14 +3057,7 @@
           <a:p>
             <a:r>
               <a:rPr lang="en-US" sz="5400" dirty="0" smtClean="0"/>
-              <a:t>Virtual </a:t>
-            </a:r>
-            <a:endParaRPr lang="en-US" sz="5400" dirty="0" smtClean="0"/>
-          </a:p>
-          <a:p>
-            <a:r>
-              <a:rPr lang="en-US" sz="5400" dirty="0" smtClean="0"/>
-              <a:t>Office Hours</a:t>
+              <a:t>OUT-OF-CLASS LECTURES</a:t>
             </a:r>
             <a:endParaRPr lang="en-US" sz="5400" dirty="0"/>
           </a:p>
@@ -3093,11 +3088,15 @@
             <a:pPr algn="ctr"/>
             <a:r>
               <a:rPr lang="en-US" dirty="0" smtClean="0"/>
-              <a:t>March</a:t>
+              <a:t>March </a:t>
             </a:r>
             <a:r>
               <a:rPr lang="en-US" dirty="0" smtClean="0"/>
-              <a:t> 25, </a:t>
+              <a:t>31</a:t>
+            </a:r>
+            <a:r>
+              <a:rPr lang="en-US" dirty="0" smtClean="0"/>
+              <a:t>, </a:t>
             </a:r>
             <a:r>
               <a:rPr lang="en-US" dirty="0" smtClean="0"/>
@@ -3115,7 +3114,7 @@
         </p:nvSpPr>
         <p:spPr>
           <a:xfrm>
-            <a:off x="2023325" y="2848397"/>
+            <a:off x="2035110" y="3043759"/>
             <a:ext cx="5005769" cy="1200329"/>
           </a:xfrm>
           <a:prstGeom prst="rect">
@@ -3131,34 +3130,40 @@
           <a:p>
             <a:pPr algn="ctr"/>
             <a:r>
-              <a:rPr lang="en-US" dirty="0" smtClean="0"/>
-              <a:t>HW 13</a:t>
-            </a:r>
-            <a:r>
-              <a:rPr lang="en-US" dirty="0" smtClean="0"/>
+              <a:rPr lang="en-US" dirty="0"/>
+              <a:t>Chapter 14</a:t>
+            </a:r>
+          </a:p>
+          <a:p>
+            <a:pPr algn="ctr"/>
+            <a:r>
+              <a:rPr lang="en-US" b="1" u="sng" dirty="0"/>
+              <a:t>2-way Factorial ANOVA</a:t>
+            </a:r>
+          </a:p>
+          <a:p>
+            <a:pPr algn="ctr"/>
+            <a:r>
+              <a:rPr lang="en-US" i="1" dirty="0"/>
+              <a:t>Sleep x Stimulant Exa</a:t>
+            </a:r>
+            <a:r>
+              <a:rPr lang="en-US" i="1" dirty="0" smtClean="0"/>
+              <a:t>mple Walk-through</a:t>
+            </a:r>
+            <a:r>
+              <a:rPr lang="en-US" i="1" dirty="0" smtClean="0"/>
               <a:t> </a:t>
             </a:r>
-            <a:endParaRPr lang="en-US" dirty="0"/>
-          </a:p>
-          <a:p>
-            <a:pPr algn="ctr"/>
-            <a:r>
-              <a:rPr lang="en-US" b="1" u="sng" dirty="0" smtClean="0"/>
-              <a:t>Multiple Comparisons: pairwise &amp; linear contrasts</a:t>
-            </a:r>
-            <a:endParaRPr lang="en-US" b="1" u="sng" dirty="0" smtClean="0"/>
-          </a:p>
-          <a:p>
-            <a:pPr algn="ctr"/>
-            <a:r>
-              <a:rPr lang="en-US" dirty="0" smtClean="0"/>
-              <a:t>Items # 5 &amp; 6</a:t>
-            </a:r>
-            <a:endParaRPr lang="en-US" dirty="0" smtClean="0"/>
-          </a:p>
-          <a:p>
-            <a:pPr algn="ctr"/>
-            <a:endParaRPr lang="en-US" b="1" dirty="0"/>
+            <a:endParaRPr lang="en-US" i="1" dirty="0" smtClean="0"/>
+          </a:p>
+          <a:p>
+            <a:pPr algn="ctr"/>
+            <a:r>
+              <a:rPr lang="en-US" i="1" dirty="0" smtClean="0"/>
+              <a:t>Barry Cohen’s Textbook Example </a:t>
+            </a:r>
+            <a:endParaRPr lang="en-US" i="1" dirty="0"/>
           </a:p>
         </p:txBody>
       </p:sp>
@@ -3297,89 +3302,94 @@
           </a:prstGeom>
         </p:spPr>
       </p:pic>
-      <p:sp>
-        <p:nvSpPr>
-          <p:cNvPr id="13" name="TextBox 12"/>
-          <p:cNvSpPr txBox="1"/>
-          <p:nvPr/>
-        </p:nvSpPr>
-        <p:spPr>
-          <a:xfrm>
-            <a:off x="2023324" y="3965983"/>
-            <a:ext cx="5005769" cy="1200329"/>
-          </a:xfrm>
-          <a:prstGeom prst="rect">
-            <a:avLst/>
-          </a:prstGeom>
-          <a:noFill/>
-        </p:spPr>
-        <p:txBody>
-          <a:bodyPr wrap="square" rtlCol="0">
-            <a:spAutoFit/>
-          </a:bodyPr>
-          <a:lstStyle/>
-          <a:p>
-            <a:pPr algn="ctr"/>
-            <a:r>
-              <a:rPr lang="en-US" dirty="0" smtClean="0"/>
-              <a:t>HW 12</a:t>
-            </a:r>
-            <a:r>
-              <a:rPr lang="en-US" dirty="0" smtClean="0"/>
-              <a:t> </a:t>
-            </a:r>
-            <a:endParaRPr lang="en-US" dirty="0"/>
-          </a:p>
-          <a:p>
-            <a:pPr algn="ctr"/>
-            <a:r>
-              <a:rPr lang="en-US" b="1" u="sng" dirty="0" smtClean="0"/>
-              <a:t>One-way, independent groups ANOVA</a:t>
-            </a:r>
-            <a:endParaRPr lang="en-US" b="1" u="sng" dirty="0" smtClean="0"/>
-          </a:p>
-          <a:p>
-            <a:pPr algn="ctr"/>
-            <a:r>
-              <a:rPr lang="en-US" dirty="0" smtClean="0"/>
-              <a:t>Items with APA methods/results</a:t>
-            </a:r>
-            <a:endParaRPr lang="en-US" dirty="0" smtClean="0"/>
-          </a:p>
-          <a:p>
-            <a:pPr algn="ctr"/>
-            <a:endParaRPr lang="en-US" b="1" dirty="0"/>
-          </a:p>
-        </p:txBody>
-      </p:sp>
       <p:pic>
         <p:nvPicPr>
-          <p:cNvPr id="5" name="Picture 4"/>
+          <p:cNvPr id="1026" name="Picture 2" descr="Image result for virus"/>
           <p:cNvPicPr>
-            <a:picLocks noChangeAspect="1"/>
+            <a:picLocks noChangeAspect="1" noChangeArrowheads="1"/>
           </p:cNvPicPr>
           <p:nvPr/>
         </p:nvPicPr>
         <p:blipFill>
-          <a:blip r:embed="rId6"/>
+          <a:blip r:embed="rId6" cstate="print">
+            <a:extLst>
+              <a:ext uri="{28A0092B-C50C-407E-A947-70E740481C1C}">
+                <a14:useLocalDpi xmlns:a14="http://schemas.microsoft.com/office/drawing/2010/main" val="0"/>
+              </a:ext>
+            </a:extLst>
+          </a:blip>
+          <a:srcRect/>
           <a:stretch>
             <a:fillRect/>
           </a:stretch>
         </p:blipFill>
-        <p:spPr>
-          <a:xfrm>
-            <a:off x="1985351" y="4872564"/>
-            <a:ext cx="1853345" cy="853514"/>
-          </a:xfrm>
-          <a:prstGeom prst="rect">
-            <a:avLst/>
-          </a:prstGeom>
+        <p:spPr bwMode="auto">
+          <a:xfrm>
+            <a:off x="1908176" y="4866721"/>
+            <a:ext cx="825034" cy="824421"/>
+          </a:xfrm>
+          <a:prstGeom prst="rect">
+            <a:avLst/>
+          </a:prstGeom>
+          <a:noFill/>
+          <a:extLst>
+            <a:ext uri="{909E8E84-426E-40DD-AFC4-6F175D3DCCD1}">
+              <a14:hiddenFill xmlns:a14="http://schemas.microsoft.com/office/drawing/2010/main">
+                <a:solidFill>
+                  <a:srgbClr val="FFFFFF"/>
+                </a:solidFill>
+              </a14:hiddenFill>
+            </a:ext>
+          </a:extLst>
         </p:spPr>
       </p:pic>
+      <p:sp>
+        <p:nvSpPr>
+          <p:cNvPr id="13" name="TextBox 12"/>
+          <p:cNvSpPr txBox="1"/>
+          <p:nvPr/>
+        </p:nvSpPr>
+        <p:spPr>
+          <a:xfrm>
+            <a:off x="2524444" y="5254195"/>
+            <a:ext cx="1238954" cy="369332"/>
+          </a:xfrm>
+          <a:prstGeom prst="rect">
+            <a:avLst/>
+          </a:prstGeom>
+          <a:noFill/>
+        </p:spPr>
+        <p:txBody>
+          <a:bodyPr wrap="square" rtlCol="0">
+            <a:spAutoFit/>
+          </a:bodyPr>
+          <a:lstStyle/>
+          <a:p>
+            <a:pPr algn="ctr"/>
+            <a:r>
+              <a:rPr lang="en-US" b="1" dirty="0" smtClean="0">
+                <a:solidFill>
+                  <a:schemeClr val="accent1">
+                    <a:lumMod val="75000"/>
+                  </a:schemeClr>
+                </a:solidFill>
+              </a:rPr>
+              <a:t>Covid-19</a:t>
+            </a:r>
+            <a:endParaRPr lang="en-US" b="1" dirty="0">
+              <a:solidFill>
+                <a:schemeClr val="accent1">
+                  <a:lumMod val="75000"/>
+                </a:schemeClr>
+              </a:solidFill>
+            </a:endParaRPr>
+          </a:p>
+        </p:txBody>
+      </p:sp>
     </p:spTree>
     <p:extLst>
       <p:ext uri="{BB962C8B-B14F-4D97-AF65-F5344CB8AC3E}">
-        <p14:creationId xmlns:p14="http://schemas.microsoft.com/office/powerpoint/2010/main" val="636154248"/>
+        <p14:creationId xmlns:p14="http://schemas.microsoft.com/office/powerpoint/2010/main" val="3068570685"/>
       </p:ext>
     </p:extLst>
   </p:cSld>
@@ -3507,7 +3517,7 @@
             <a:pPr algn="ctr"/>
             <a:r>
               <a:rPr lang="en-US" dirty="0" smtClean="0"/>
-              <a:t>Feb. 12, 2020</a:t>
+              <a:t>March 9, 2020</a:t>
             </a:r>
             <a:endParaRPr lang="en-US" dirty="0"/>
           </a:p>
@@ -3521,8 +3531,8 @@
         </p:nvSpPr>
         <p:spPr>
           <a:xfrm>
-            <a:off x="2175357" y="4235713"/>
-            <a:ext cx="5005769" cy="923330"/>
+            <a:off x="2175358" y="3486436"/>
+            <a:ext cx="5005769" cy="1200329"/>
           </a:xfrm>
           <a:prstGeom prst="rect">
             <a:avLst/>
@@ -3538,18 +3548,15 @@
             <a:pPr algn="ctr"/>
             <a:r>
               <a:rPr lang="en-US" dirty="0" smtClean="0"/>
-              <a:t>Chapter </a:t>
-            </a:r>
-            <a:r>
-              <a:rPr lang="en-US" dirty="0"/>
-              <a:t>9</a:t>
-            </a:r>
+              <a:t>Chapter 12</a:t>
+            </a:r>
+            <a:endParaRPr lang="en-US" dirty="0"/>
           </a:p>
           <a:p>
             <a:pPr algn="ctr"/>
             <a:r>
               <a:rPr lang="en-US" b="1" u="sng" dirty="0" smtClean="0"/>
-              <a:t>Correlation</a:t>
+              <a:t>One-way Independent Groups ANOVA</a:t>
             </a:r>
             <a:endParaRPr lang="en-US" dirty="0" smtClean="0"/>
           </a:p>
@@ -3558,6 +3565,13 @@
             <a:r>
               <a:rPr lang="en-US" i="1" dirty="0" smtClean="0"/>
               <a:t>First half, chapter slides</a:t>
+            </a:r>
+          </a:p>
+          <a:p>
+            <a:pPr algn="ctr"/>
+            <a:r>
+              <a:rPr lang="en-US" i="1" dirty="0" smtClean="0"/>
+              <a:t>Mostly New Material Presentation</a:t>
             </a:r>
           </a:p>
         </p:txBody>
@@ -3697,73 +3711,10 @@
           </a:prstGeom>
         </p:spPr>
       </p:pic>
-      <p:sp>
-        <p:nvSpPr>
-          <p:cNvPr id="13" name="TextBox 12"/>
-          <p:cNvSpPr txBox="1"/>
-          <p:nvPr/>
-        </p:nvSpPr>
-        <p:spPr>
-          <a:xfrm>
-            <a:off x="2175358" y="2646127"/>
-            <a:ext cx="5005769" cy="1477328"/>
-          </a:xfrm>
-          <a:prstGeom prst="rect">
-            <a:avLst/>
-          </a:prstGeom>
-          <a:noFill/>
-        </p:spPr>
-        <p:txBody>
-          <a:bodyPr wrap="square" rtlCol="0">
-            <a:spAutoFit/>
-          </a:bodyPr>
-          <a:lstStyle/>
-          <a:p>
-            <a:pPr algn="ctr"/>
-            <a:r>
-              <a:rPr lang="en-US" dirty="0" smtClean="0"/>
-              <a:t>Chapter </a:t>
-            </a:r>
-            <a:r>
-              <a:rPr lang="en-US" dirty="0"/>
-              <a:t>8</a:t>
-            </a:r>
-          </a:p>
-          <a:p>
-            <a:pPr algn="ctr"/>
-            <a:r>
-              <a:rPr lang="en-US" b="1" u="sng" dirty="0" smtClean="0"/>
-              <a:t>Effect Size &amp; Power Analysis</a:t>
-            </a:r>
-            <a:endParaRPr lang="en-US" dirty="0" smtClean="0"/>
-          </a:p>
-          <a:p>
-            <a:pPr algn="ctr"/>
-            <a:r>
-              <a:rPr lang="en-US" i="1" dirty="0" smtClean="0"/>
-              <a:t>Chapter slides</a:t>
-            </a:r>
-          </a:p>
-          <a:p>
-            <a:pPr algn="ctr"/>
-            <a:r>
-              <a:rPr lang="en-US" i="1" dirty="0" smtClean="0"/>
-              <a:t>Demo G*Power software</a:t>
-            </a:r>
-          </a:p>
-          <a:p>
-            <a:pPr algn="ctr"/>
-            <a:r>
-              <a:rPr lang="en-US" i="1" dirty="0" smtClean="0"/>
-              <a:t>Homework Help</a:t>
-            </a:r>
-          </a:p>
-        </p:txBody>
-      </p:sp>
     </p:spTree>
     <p:extLst>
       <p:ext uri="{BB962C8B-B14F-4D97-AF65-F5344CB8AC3E}">
-        <p14:creationId xmlns:p14="http://schemas.microsoft.com/office/powerpoint/2010/main" val="3221510669"/>
+        <p14:creationId xmlns:p14="http://schemas.microsoft.com/office/powerpoint/2010/main" val="2758197068"/>
       </p:ext>
     </p:extLst>
   </p:cSld>
@@ -3891,7 +3842,7 @@
             <a:pPr algn="ctr"/>
             <a:r>
               <a:rPr lang="en-US" dirty="0" smtClean="0"/>
-              <a:t>Feb. 10, 2020</a:t>
+              <a:t>Feb. 19, 2020</a:t>
             </a:r>
             <a:endParaRPr lang="en-US" dirty="0"/>
           </a:p>
@@ -3905,7 +3856,7 @@
         </p:nvSpPr>
         <p:spPr>
           <a:xfrm>
-            <a:off x="2035110" y="3043759"/>
+            <a:off x="2130478" y="2956774"/>
             <a:ext cx="5005769" cy="923330"/>
           </a:xfrm>
           <a:prstGeom prst="rect">
@@ -3926,27 +3877,23 @@
             </a:r>
             <a:r>
               <a:rPr lang="en-US" dirty="0"/>
-              <a:t>7</a:t>
-            </a:r>
-          </a:p>
-          <a:p>
-            <a:pPr algn="ctr"/>
-            <a:r>
-              <a:rPr lang="en-US" b="1" u="sng" dirty="0"/>
-              <a:t>Independent Samples t-Test for </a:t>
-            </a:r>
+              <a:t>9</a:t>
+            </a:r>
+          </a:p>
+          <a:p>
+            <a:pPr algn="ctr"/>
             <a:r>
               <a:rPr lang="en-US" b="1" u="sng" dirty="0" smtClean="0"/>
-              <a:t>Means</a:t>
-            </a:r>
+              <a:t>Correlation</a:t>
+            </a:r>
+            <a:endParaRPr lang="en-US" dirty="0" smtClean="0"/>
           </a:p>
           <a:p>
             <a:pPr algn="ctr"/>
             <a:r>
               <a:rPr lang="en-US" i="1" dirty="0" smtClean="0"/>
-              <a:t>Mostly Homework Helps</a:t>
-            </a:r>
-            <a:endParaRPr lang="en-US" i="1" dirty="0"/>
+              <a:t>Second half, chapter slides</a:t>
+            </a:r>
           </a:p>
         </p:txBody>
       </p:sp>
@@ -4085,10 +4032,56 @@
           </a:prstGeom>
         </p:spPr>
       </p:pic>
+      <p:sp>
+        <p:nvSpPr>
+          <p:cNvPr id="15" name="TextBox 14"/>
+          <p:cNvSpPr txBox="1"/>
+          <p:nvPr/>
+        </p:nvSpPr>
+        <p:spPr>
+          <a:xfrm>
+            <a:off x="2107241" y="4130160"/>
+            <a:ext cx="5005769" cy="923330"/>
+          </a:xfrm>
+          <a:prstGeom prst="rect">
+            <a:avLst/>
+          </a:prstGeom>
+          <a:noFill/>
+        </p:spPr>
+        <p:txBody>
+          <a:bodyPr wrap="square" rtlCol="0">
+            <a:spAutoFit/>
+          </a:bodyPr>
+          <a:lstStyle/>
+          <a:p>
+            <a:pPr algn="ctr"/>
+            <a:r>
+              <a:rPr lang="en-US" dirty="0" smtClean="0"/>
+              <a:t>Chapter 10</a:t>
+            </a:r>
+            <a:endParaRPr lang="en-US" dirty="0"/>
+          </a:p>
+          <a:p>
+            <a:pPr algn="ctr"/>
+            <a:r>
+              <a:rPr lang="en-US" b="1" u="sng" dirty="0" smtClean="0"/>
+              <a:t>Simple Linear Regression</a:t>
+            </a:r>
+            <a:endParaRPr lang="en-US" dirty="0" smtClean="0"/>
+          </a:p>
+          <a:p>
+            <a:pPr algn="ctr"/>
+            <a:r>
+              <a:rPr lang="en-US" i="1" dirty="0" smtClean="0"/>
+              <a:t>chapter slides (majority)</a:t>
+            </a:r>
+          </a:p>
+        </p:txBody>
+      </p:sp>
     </p:spTree>
     <p:extLst>
       <p:ext uri="{BB962C8B-B14F-4D97-AF65-F5344CB8AC3E}">
-        <p14:creationId xmlns:p14="http://schemas.microsoft.com/office/powerpoint/2010/main" val="2916572011"/>
+        <p14:creationId xmlns:p14="http://schemas.microsoft.com/office/powerpoint/2010/main" val="2730707931"/>
       </p:ext>
     </p:extLst>
   </p:cSld>
@@ -4216,7 +4209,7 @@
             <a:pPr algn="ctr"/>
             <a:r>
               <a:rPr lang="en-US" dirty="0" smtClean="0"/>
-              <a:t>Feb. 5, 2020</a:t>
+              <a:t>Feb. 12, 2020</a:t>
             </a:r>
             <a:endParaRPr lang="en-US" dirty="0"/>
           </a:p>
@@ -4230,8 +4223,8 @@
         </p:nvSpPr>
         <p:spPr>
           <a:xfrm>
-            <a:off x="2035110" y="3043759"/>
-            <a:ext cx="5005769" cy="1477328"/>
+            <a:off x="2175357" y="4235713"/>
+            <a:ext cx="5005769" cy="923330"/>
           </a:xfrm>
           <a:prstGeom prst="rect">
             <a:avLst/>
@@ -4251,39 +4244,23 @@
             </a:r>
             <a:r>
               <a:rPr lang="en-US" dirty="0"/>
-              <a:t>6</a:t>
+              <a:t>9</a:t>
             </a:r>
           </a:p>
           <a:p>
             <a:pPr algn="ctr"/>
             <a:r>
               <a:rPr lang="en-US" b="1" u="sng" dirty="0" smtClean="0"/>
-              <a:t>Confidence Interval Estimation: The t Distribution</a:t>
-            </a:r>
-            <a:endParaRPr lang="en-US" b="1" u="sng" dirty="0"/>
+              <a:t>Correlation</a:t>
+            </a:r>
+            <a:endParaRPr lang="en-US" dirty="0" smtClean="0"/>
           </a:p>
           <a:p>
             <a:pPr algn="ctr"/>
             <a:r>
               <a:rPr lang="en-US" i="1" dirty="0" smtClean="0"/>
-              <a:t>Lecture slides</a:t>
-            </a:r>
-            <a:endParaRPr lang="en-US" i="1" dirty="0"/>
-          </a:p>
-          <a:p>
-            <a:pPr algn="ctr"/>
-            <a:r>
-              <a:rPr lang="en-US" i="1" dirty="0" smtClean="0"/>
-              <a:t>(second half)</a:t>
-            </a:r>
-          </a:p>
-          <a:p>
-            <a:pPr algn="ctr"/>
-            <a:r>
-              <a:rPr lang="en-US" i="1" dirty="0" smtClean="0"/>
-              <a:t>Homework Helps</a:t>
-            </a:r>
-            <a:endParaRPr lang="en-US" i="1" dirty="0"/>
+              <a:t>First half, chapter slides</a:t>
+            </a:r>
           </a:p>
         </p:txBody>
       </p:sp>
@@ -4422,10 +4399,73 @@
           </a:prstGeom>
         </p:spPr>
       </p:pic>
+      <p:sp>
+        <p:nvSpPr>
+          <p:cNvPr id="13" name="TextBox 12"/>
+          <p:cNvSpPr txBox="1"/>
+          <p:nvPr/>
+        </p:nvSpPr>
+        <p:spPr>
+          <a:xfrm>
+            <a:off x="2175358" y="2646127"/>
+            <a:ext cx="5005769" cy="1477328"/>
+          </a:xfrm>
+          <a:prstGeom prst="rect">
+            <a:avLst/>
+          </a:prstGeom>
+          <a:noFill/>
+        </p:spPr>
+        <p:txBody>
+          <a:bodyPr wrap="square" rtlCol="0">
+            <a:spAutoFit/>
+          </a:bodyPr>
+          <a:lstStyle/>
+          <a:p>
+            <a:pPr algn="ctr"/>
+            <a:r>
+              <a:rPr lang="en-US" dirty="0" smtClean="0"/>
+              <a:t>Chapter </a:t>
+            </a:r>
+            <a:r>
+              <a:rPr lang="en-US" dirty="0"/>
+              <a:t>8</a:t>
+            </a:r>
+          </a:p>
+          <a:p>
+            <a:pPr algn="ctr"/>
+            <a:r>
+              <a:rPr lang="en-US" b="1" u="sng" dirty="0" smtClean="0"/>
+              <a:t>Effect Size &amp; Power Analysis</a:t>
+            </a:r>
+            <a:endParaRPr lang="en-US" dirty="0" smtClean="0"/>
+          </a:p>
+          <a:p>
+            <a:pPr algn="ctr"/>
+            <a:r>
+              <a:rPr lang="en-US" i="1" dirty="0" smtClean="0"/>
+              <a:t>Chapter slides</a:t>
+            </a:r>
+          </a:p>
+          <a:p>
+            <a:pPr algn="ctr"/>
+            <a:r>
+              <a:rPr lang="en-US" i="1" dirty="0" smtClean="0"/>
+              <a:t>Demo G*Power software</a:t>
+            </a:r>
+          </a:p>
+          <a:p>
+            <a:pPr algn="ctr"/>
+            <a:r>
+              <a:rPr lang="en-US" i="1" dirty="0" smtClean="0"/>
+              <a:t>Homework Help</a:t>
+            </a:r>
+          </a:p>
+        </p:txBody>
+      </p:sp>
     </p:spTree>
     <p:extLst>
       <p:ext uri="{BB962C8B-B14F-4D97-AF65-F5344CB8AC3E}">
-        <p14:creationId xmlns:p14="http://schemas.microsoft.com/office/powerpoint/2010/main" val="3019460125"/>
+        <p14:creationId xmlns:p14="http://schemas.microsoft.com/office/powerpoint/2010/main" val="3221510669"/>
       </p:ext>
     </p:extLst>
   </p:cSld>
@@ -4553,7 +4593,7 @@
             <a:pPr algn="ctr"/>
             <a:r>
               <a:rPr lang="en-US" dirty="0" smtClean="0"/>
-              <a:t>Feb. 5, 2020</a:t>
+              <a:t>Feb. 10, 2020</a:t>
             </a:r>
             <a:endParaRPr lang="en-US" dirty="0"/>
           </a:p>
@@ -4568,7 +4608,7 @@
         <p:spPr>
           <a:xfrm>
             <a:off x="2035110" y="3043759"/>
-            <a:ext cx="5005769" cy="1477328"/>
+            <a:ext cx="5005769" cy="923330"/>
           </a:xfrm>
           <a:prstGeom prst="rect">
             <a:avLst/>
@@ -4588,37 +4628,25 @@
             </a:r>
             <a:r>
               <a:rPr lang="en-US" dirty="0"/>
-              <a:t>6</a:t>
-            </a:r>
-          </a:p>
-          <a:p>
-            <a:pPr algn="ctr"/>
+              <a:t>7</a:t>
+            </a:r>
+          </a:p>
+          <a:p>
+            <a:pPr algn="ctr"/>
+            <a:r>
+              <a:rPr lang="en-US" b="1" u="sng" dirty="0"/>
+              <a:t>Independent Samples t-Test for </a:t>
+            </a:r>
             <a:r>
               <a:rPr lang="en-US" b="1" u="sng" dirty="0" smtClean="0"/>
-              <a:t>Confidence Interval Estimation: The t Distribution</a:t>
-            </a:r>
-            <a:endParaRPr lang="en-US" b="1" u="sng" dirty="0"/>
+              <a:t>Means</a:t>
+            </a:r>
           </a:p>
           <a:p>
             <a:pPr algn="ctr"/>
             <a:r>
               <a:rPr lang="en-US" i="1" dirty="0" smtClean="0"/>
-              <a:t>Lecture slides</a:t>
-            </a:r>
-            <a:endParaRPr lang="en-US" i="1" dirty="0"/>
-          </a:p>
-          <a:p>
-            <a:pPr algn="ctr"/>
-            <a:r>
-              <a:rPr lang="en-US" i="1" dirty="0" smtClean="0"/>
-              <a:t>(second half)</a:t>
-            </a:r>
-          </a:p>
-          <a:p>
-            <a:pPr algn="ctr"/>
-            <a:r>
-              <a:rPr lang="en-US" i="1" dirty="0" smtClean="0"/>
-              <a:t>Homework Helps</a:t>
+              <a:t>Mostly Homework Helps</a:t>
             </a:r>
             <a:endParaRPr lang="en-US" i="1" dirty="0"/>
           </a:p>
@@ -4762,7 +4790,7 @@
     </p:spTree>
     <p:extLst>
       <p:ext uri="{BB962C8B-B14F-4D97-AF65-F5344CB8AC3E}">
-        <p14:creationId xmlns:p14="http://schemas.microsoft.com/office/powerpoint/2010/main" val="4154058086"/>
+        <p14:creationId xmlns:p14="http://schemas.microsoft.com/office/powerpoint/2010/main" val="2916572011"/>
       </p:ext>
     </p:extLst>
   </p:cSld>
@@ -4890,7 +4918,7 @@
             <a:pPr algn="ctr"/>
             <a:r>
               <a:rPr lang="en-US" dirty="0" smtClean="0"/>
-              <a:t>Feb. 3, 2020</a:t>
+              <a:t>Feb. 5, 2020</a:t>
             </a:r>
             <a:endParaRPr lang="en-US" dirty="0"/>
           </a:p>
@@ -4905,7 +4933,7 @@
         <p:spPr>
           <a:xfrm>
             <a:off x="2035110" y="3043759"/>
-            <a:ext cx="5005769" cy="2585323"/>
+            <a:ext cx="5005769" cy="1477328"/>
           </a:xfrm>
           <a:prstGeom prst="rect">
             <a:avLst/>
@@ -4920,50 +4948,12 @@
           <a:p>
             <a:pPr algn="ctr"/>
             <a:r>
+              <a:rPr lang="en-US" dirty="0" smtClean="0"/>
+              <a:t>Chapter </a:t>
+            </a:r>
+            <a:r>
               <a:rPr lang="en-US" dirty="0"/>
-              <a:t>Chapter </a:t>
-            </a:r>
-            <a:r>
-              <a:rPr lang="en-US" dirty="0" smtClean="0"/>
-              <a:t>5</a:t>
-            </a:r>
-            <a:endParaRPr lang="en-US" dirty="0"/>
-          </a:p>
-          <a:p>
-            <a:pPr algn="ctr"/>
-            <a:r>
-              <a:rPr lang="en-US" b="1" u="sng" dirty="0" smtClean="0"/>
-              <a:t>Intro to Hypothesis Testing: 1 sample z-Test</a:t>
-            </a:r>
-            <a:endParaRPr lang="en-US" b="1" u="sng" dirty="0"/>
-          </a:p>
-          <a:p>
-            <a:pPr algn="ctr"/>
-            <a:r>
-              <a:rPr lang="en-US" i="1" dirty="0" smtClean="0"/>
-              <a:t>Finish </a:t>
-            </a:r>
-            <a:r>
-              <a:rPr lang="en-US" i="1" dirty="0"/>
-              <a:t>discussion</a:t>
-            </a:r>
-          </a:p>
-          <a:p>
-            <a:pPr algn="ctr"/>
-            <a:r>
-              <a:rPr lang="en-US" i="1" dirty="0"/>
-              <a:t>Homework questions</a:t>
-            </a:r>
-          </a:p>
-          <a:p>
-            <a:pPr algn="ctr"/>
-            <a:endParaRPr lang="en-US" i="1" dirty="0"/>
-          </a:p>
-          <a:p>
-            <a:pPr algn="ctr"/>
-            <a:r>
-              <a:rPr lang="en-US" dirty="0"/>
-              <a:t>Chapter 6</a:t>
+              <a:t>6</a:t>
             </a:r>
           </a:p>
           <a:p>
@@ -4986,7 +4976,14 @@
             <a:pPr algn="ctr"/>
             <a:r>
               <a:rPr lang="en-US" i="1" dirty="0" smtClean="0"/>
-              <a:t>(first half)</a:t>
+              <a:t>(second half)</a:t>
+            </a:r>
+          </a:p>
+          <a:p>
+            <a:pPr algn="ctr"/>
+            <a:r>
+              <a:rPr lang="en-US" i="1" dirty="0" smtClean="0"/>
+              <a:t>Homework Helps</a:t>
             </a:r>
             <a:endParaRPr lang="en-US" i="1" dirty="0"/>
           </a:p>
@@ -5130,7 +5127,7 @@
     </p:spTree>
     <p:extLst>
       <p:ext uri="{BB962C8B-B14F-4D97-AF65-F5344CB8AC3E}">
-        <p14:creationId xmlns:p14="http://schemas.microsoft.com/office/powerpoint/2010/main" val="1136618621"/>
+        <p14:creationId xmlns:p14="http://schemas.microsoft.com/office/powerpoint/2010/main" val="3019460125"/>
       </p:ext>
     </p:extLst>
   </p:cSld>
@@ -5258,7 +5255,7 @@
             <a:pPr algn="ctr"/>
             <a:r>
               <a:rPr lang="en-US" dirty="0" smtClean="0"/>
-              <a:t>Jan. 22, 2020</a:t>
+              <a:t>Feb. 5, 2020</a:t>
             </a:r>
             <a:endParaRPr lang="en-US" dirty="0"/>
           </a:p>
@@ -5273,7 +5270,7 @@
         <p:spPr>
           <a:xfrm>
             <a:off x="2035110" y="3043759"/>
-            <a:ext cx="5005769" cy="2585323"/>
+            <a:ext cx="5005769" cy="1477328"/>
           </a:xfrm>
           <a:prstGeom prst="rect">
             <a:avLst/>
@@ -5288,56 +5285,19 @@
           <a:p>
             <a:pPr algn="ctr"/>
             <a:r>
+              <a:rPr lang="en-US" dirty="0" smtClean="0"/>
+              <a:t>Chapter </a:t>
+            </a:r>
+            <a:r>
               <a:rPr lang="en-US" dirty="0"/>
-              <a:t>Chapter 3</a:t>
-            </a:r>
-          </a:p>
-          <a:p>
-            <a:pPr algn="ctr"/>
-            <a:r>
-              <a:rPr lang="en-US" b="1" u="sng" dirty="0"/>
-              <a:t>Variable/Scale, Rounding &amp; Summation</a:t>
-            </a:r>
-          </a:p>
-          <a:p>
-            <a:pPr algn="ctr"/>
-            <a:r>
-              <a:rPr lang="en-US" i="1" dirty="0" smtClean="0"/>
-              <a:t>Finish </a:t>
-            </a:r>
-            <a:r>
-              <a:rPr lang="en-US" i="1" dirty="0"/>
-              <a:t>discussion</a:t>
-            </a:r>
-          </a:p>
-          <a:p>
-            <a:pPr algn="ctr"/>
-            <a:r>
-              <a:rPr lang="en-US" i="1" dirty="0"/>
-              <a:t>Homework questions</a:t>
-            </a:r>
-          </a:p>
-          <a:p>
-            <a:pPr algn="ctr"/>
-            <a:endParaRPr lang="en-US" i="1" dirty="0"/>
-          </a:p>
-          <a:p>
-            <a:pPr algn="ctr"/>
-            <a:r>
-              <a:rPr lang="en-US" dirty="0"/>
-              <a:t>Chapter </a:t>
-            </a:r>
-            <a:r>
-              <a:rPr lang="en-US" dirty="0" smtClean="0"/>
-              <a:t>4</a:t>
-            </a:r>
-            <a:endParaRPr lang="en-US" dirty="0"/>
+              <a:t>6</a:t>
+            </a:r>
           </a:p>
           <a:p>
             <a:pPr algn="ctr"/>
             <a:r>
               <a:rPr lang="en-US" b="1" u="sng" dirty="0" smtClean="0"/>
-              <a:t>Standardized Scores &amp; the Normal Distribution</a:t>
+              <a:t>Confidence Interval Estimation: The t Distribution</a:t>
             </a:r>
             <a:endParaRPr lang="en-US" b="1" u="sng" dirty="0"/>
           </a:p>
@@ -5353,7 +5313,14 @@
             <a:pPr algn="ctr"/>
             <a:r>
               <a:rPr lang="en-US" i="1" dirty="0" smtClean="0"/>
-              <a:t>(first half)</a:t>
+              <a:t>(second half)</a:t>
+            </a:r>
+          </a:p>
+          <a:p>
+            <a:pPr algn="ctr"/>
+            <a:r>
+              <a:rPr lang="en-US" i="1" dirty="0" smtClean="0"/>
+              <a:t>Homework Helps</a:t>
             </a:r>
             <a:endParaRPr lang="en-US" i="1" dirty="0"/>
           </a:p>
@@ -5497,7 +5464,7 @@
     </p:spTree>
     <p:extLst>
       <p:ext uri="{BB962C8B-B14F-4D97-AF65-F5344CB8AC3E}">
-        <p14:creationId xmlns:p14="http://schemas.microsoft.com/office/powerpoint/2010/main" val="2900019700"/>
+        <p14:creationId xmlns:p14="http://schemas.microsoft.com/office/powerpoint/2010/main" val="4154058086"/>
       </p:ext>
     </p:extLst>
   </p:cSld>
@@ -5625,7 +5592,7 @@
             <a:pPr algn="ctr"/>
             <a:r>
               <a:rPr lang="en-US" dirty="0" smtClean="0"/>
-              <a:t>Jan. 15, 2020</a:t>
+              <a:t>Feb. 3, 2020</a:t>
             </a:r>
             <a:endParaRPr lang="en-US" dirty="0"/>
           </a:p>
@@ -5639,8 +5606,8 @@
         </p:nvSpPr>
         <p:spPr>
           <a:xfrm>
-            <a:off x="2318419" y="3043759"/>
-            <a:ext cx="4212906" cy="2585323"/>
+            <a:off x="2035110" y="3043759"/>
+            <a:ext cx="5005769" cy="2585323"/>
           </a:xfrm>
           <a:prstGeom prst="rect">
             <a:avLst/>
@@ -5655,48 +5622,59 @@
           <a:p>
             <a:pPr algn="ctr"/>
             <a:r>
+              <a:rPr lang="en-US" dirty="0"/>
+              <a:t>Chapter </a:t>
+            </a:r>
+            <a:r>
               <a:rPr lang="en-US" dirty="0" smtClean="0"/>
-              <a:t>Chapter 1</a:t>
-            </a:r>
+              <a:t>5</a:t>
+            </a:r>
+            <a:endParaRPr lang="en-US" dirty="0"/>
           </a:p>
           <a:p>
             <a:pPr algn="ctr"/>
             <a:r>
               <a:rPr lang="en-US" b="1" u="sng" dirty="0" smtClean="0"/>
-              <a:t>Variable/Scale, Rounding &amp; Summation</a:t>
-            </a:r>
+              <a:t>Intro to Hypothesis Testing: 1 sample z-Test</a:t>
+            </a:r>
+            <a:endParaRPr lang="en-US" b="1" u="sng" dirty="0"/>
           </a:p>
           <a:p>
             <a:pPr algn="ctr"/>
             <a:r>
               <a:rPr lang="en-US" i="1" dirty="0" smtClean="0"/>
-              <a:t>Finish discussion</a:t>
-            </a:r>
-          </a:p>
-          <a:p>
-            <a:pPr algn="ctr"/>
-            <a:r>
-              <a:rPr lang="en-US" i="1" dirty="0" smtClean="0"/>
+              <a:t>Finish </a:t>
+            </a:r>
+            <a:r>
+              <a:rPr lang="en-US" i="1" dirty="0"/>
+              <a:t>discussion</a:t>
+            </a:r>
+          </a:p>
+          <a:p>
+            <a:pPr algn="ctr"/>
+            <a:r>
+              <a:rPr lang="en-US" i="1" dirty="0"/>
               <a:t>Homework questions</a:t>
             </a:r>
           </a:p>
           <a:p>
             <a:pPr algn="ctr"/>
-            <a:endParaRPr lang="en-US" i="1" dirty="0" smtClean="0"/>
+            <a:endParaRPr lang="en-US" i="1" dirty="0"/>
           </a:p>
           <a:p>
             <a:pPr algn="ctr"/>
             <a:r>
               <a:rPr lang="en-US" dirty="0"/>
-              <a:t>Chapter 2 </a:t>
-            </a:r>
-          </a:p>
-          <a:p>
-            <a:pPr algn="ctr"/>
-            <a:r>
-              <a:rPr lang="en-US" b="1" u="sng" dirty="0"/>
-              <a:t>Exploring Data with Plots</a:t>
-            </a:r>
+              <a:t>Chapter 6</a:t>
+            </a:r>
+          </a:p>
+          <a:p>
+            <a:pPr algn="ctr"/>
+            <a:r>
+              <a:rPr lang="en-US" b="1" u="sng" dirty="0" smtClean="0"/>
+              <a:t>Confidence Interval Estimation: The t Distribution</a:t>
+            </a:r>
+            <a:endParaRPr lang="en-US" b="1" u="sng" dirty="0"/>
           </a:p>
           <a:p>
             <a:pPr algn="ctr"/>
@@ -5709,12 +5687,8 @@
           <a:p>
             <a:pPr algn="ctr"/>
             <a:r>
-              <a:rPr lang="en-US" i="1" dirty="0"/>
-              <a:t>Homework </a:t>
-            </a:r>
-            <a:r>
               <a:rPr lang="en-US" i="1" dirty="0" smtClean="0"/>
-              <a:t>questions</a:t>
+              <a:t>(first half)</a:t>
             </a:r>
             <a:endParaRPr lang="en-US" i="1" dirty="0"/>
           </a:p>
@@ -5858,7 +5832,7 @@
     </p:spTree>
     <p:extLst>
       <p:ext uri="{BB962C8B-B14F-4D97-AF65-F5344CB8AC3E}">
-        <p14:creationId xmlns:p14="http://schemas.microsoft.com/office/powerpoint/2010/main" val="3290463226"/>
+        <p14:creationId xmlns:p14="http://schemas.microsoft.com/office/powerpoint/2010/main" val="1136618621"/>
       </p:ext>
     </p:extLst>
   </p:cSld>
@@ -5885,51 +5859,26 @@
           <a:chExt cx="0" cy="0"/>
         </a:xfrm>
       </p:grpSpPr>
-      <p:pic>
-        <p:nvPicPr>
-          <p:cNvPr id="2" name="Picture 1"/>
-          <p:cNvPicPr>
-            <a:picLocks noChangeAspect="1"/>
-          </p:cNvPicPr>
-          <p:nvPr/>
-        </p:nvPicPr>
-        <p:blipFill>
-          <a:blip r:embed="rId2" cstate="print">
-            <a:extLst>
-              <a:ext uri="{28A0092B-C50C-407E-A947-70E740481C1C}">
-                <a14:useLocalDpi xmlns:a14="http://schemas.microsoft.com/office/drawing/2010/main" val="0"/>
-              </a:ext>
-            </a:extLst>
-          </a:blip>
-          <a:stretch>
-            <a:fillRect/>
-          </a:stretch>
-        </p:blipFill>
-        <p:spPr>
-          <a:xfrm>
-            <a:off x="5306566" y="2514598"/>
-            <a:ext cx="1578867" cy="1828804"/>
-          </a:xfrm>
-          <a:prstGeom prst="rect">
-            <a:avLst/>
-          </a:prstGeom>
-        </p:spPr>
-      </p:pic>
-      <p:sp>
-        <p:nvSpPr>
-          <p:cNvPr id="3" name="Rectangle 2"/>
+      <p:sp>
+        <p:nvSpPr>
+          <p:cNvPr id="4" name="Rectangle 3"/>
           <p:cNvSpPr/>
           <p:nvPr/>
         </p:nvSpPr>
         <p:spPr>
           <a:xfrm>
-            <a:off x="5054138" y="2394066"/>
-            <a:ext cx="2094807" cy="2078182"/>
-          </a:xfrm>
-          <a:prstGeom prst="rect">
-            <a:avLst/>
-          </a:prstGeom>
-          <a:noFill/>
+            <a:off x="1808702" y="824230"/>
+            <a:ext cx="8778240" cy="5010912"/>
+          </a:xfrm>
+          <a:prstGeom prst="rect">
+            <a:avLst/>
+          </a:prstGeom>
+          <a:solidFill>
+            <a:schemeClr val="bg1">
+              <a:lumMod val="95000"/>
+            </a:schemeClr>
+          </a:solidFill>
+          <a:ln w="38100"/>
         </p:spPr>
         <p:style>
           <a:lnRef idx="2">
@@ -5956,6 +5905,759 @@
           </a:p>
         </p:txBody>
       </p:sp>
+      <p:sp>
+        <p:nvSpPr>
+          <p:cNvPr id="7" name="TextBox 6"/>
+          <p:cNvSpPr txBox="1"/>
+          <p:nvPr/>
+        </p:nvSpPr>
+        <p:spPr>
+          <a:xfrm>
+            <a:off x="3840385" y="1213849"/>
+            <a:ext cx="5712369" cy="923330"/>
+          </a:xfrm>
+          <a:prstGeom prst="rect">
+            <a:avLst/>
+          </a:prstGeom>
+          <a:noFill/>
+        </p:spPr>
+        <p:txBody>
+          <a:bodyPr wrap="square" rtlCol="0">
+            <a:spAutoFit/>
+          </a:bodyPr>
+          <a:lstStyle/>
+          <a:p>
+            <a:r>
+              <a:rPr lang="en-US" sz="5400" dirty="0" smtClean="0"/>
+              <a:t>INCLASS LECTURES</a:t>
+            </a:r>
+            <a:endParaRPr lang="en-US" sz="5400" dirty="0"/>
+          </a:p>
+        </p:txBody>
+      </p:sp>
+      <p:sp>
+        <p:nvSpPr>
+          <p:cNvPr id="8" name="TextBox 7"/>
+          <p:cNvSpPr txBox="1"/>
+          <p:nvPr/>
+        </p:nvSpPr>
+        <p:spPr>
+          <a:xfrm>
+            <a:off x="7731444" y="5278932"/>
+            <a:ext cx="2076450" cy="369332"/>
+          </a:xfrm>
+          <a:prstGeom prst="rect">
+            <a:avLst/>
+          </a:prstGeom>
+          <a:noFill/>
+        </p:spPr>
+        <p:txBody>
+          <a:bodyPr wrap="square" rtlCol="0">
+            <a:spAutoFit/>
+          </a:bodyPr>
+          <a:lstStyle/>
+          <a:p>
+            <a:pPr algn="ctr"/>
+            <a:r>
+              <a:rPr lang="en-US" dirty="0" smtClean="0"/>
+              <a:t>Jan. 22, 2020</a:t>
+            </a:r>
+            <a:endParaRPr lang="en-US" dirty="0"/>
+          </a:p>
+        </p:txBody>
+      </p:sp>
+      <p:sp>
+        <p:nvSpPr>
+          <p:cNvPr id="9" name="TextBox 8"/>
+          <p:cNvSpPr txBox="1"/>
+          <p:nvPr/>
+        </p:nvSpPr>
+        <p:spPr>
+          <a:xfrm>
+            <a:off x="2035110" y="3043759"/>
+            <a:ext cx="5005769" cy="2585323"/>
+          </a:xfrm>
+          <a:prstGeom prst="rect">
+            <a:avLst/>
+          </a:prstGeom>
+          <a:noFill/>
+        </p:spPr>
+        <p:txBody>
+          <a:bodyPr wrap="square" rtlCol="0">
+            <a:spAutoFit/>
+          </a:bodyPr>
+          <a:lstStyle/>
+          <a:p>
+            <a:pPr algn="ctr"/>
+            <a:r>
+              <a:rPr lang="en-US" dirty="0"/>
+              <a:t>Chapter 3</a:t>
+            </a:r>
+          </a:p>
+          <a:p>
+            <a:pPr algn="ctr"/>
+            <a:r>
+              <a:rPr lang="en-US" b="1" u="sng" dirty="0"/>
+              <a:t>Variable/Scale, Rounding &amp; Summation</a:t>
+            </a:r>
+          </a:p>
+          <a:p>
+            <a:pPr algn="ctr"/>
+            <a:r>
+              <a:rPr lang="en-US" i="1" dirty="0" smtClean="0"/>
+              <a:t>Finish </a:t>
+            </a:r>
+            <a:r>
+              <a:rPr lang="en-US" i="1" dirty="0"/>
+              <a:t>discussion</a:t>
+            </a:r>
+          </a:p>
+          <a:p>
+            <a:pPr algn="ctr"/>
+            <a:r>
+              <a:rPr lang="en-US" i="1" dirty="0"/>
+              <a:t>Homework questions</a:t>
+            </a:r>
+          </a:p>
+          <a:p>
+            <a:pPr algn="ctr"/>
+            <a:endParaRPr lang="en-US" i="1" dirty="0"/>
+          </a:p>
+          <a:p>
+            <a:pPr algn="ctr"/>
+            <a:r>
+              <a:rPr lang="en-US" dirty="0"/>
+              <a:t>Chapter </a:t>
+            </a:r>
+            <a:r>
+              <a:rPr lang="en-US" dirty="0" smtClean="0"/>
+              <a:t>4</a:t>
+            </a:r>
+            <a:endParaRPr lang="en-US" dirty="0"/>
+          </a:p>
+          <a:p>
+            <a:pPr algn="ctr"/>
+            <a:r>
+              <a:rPr lang="en-US" b="1" u="sng" dirty="0" smtClean="0"/>
+              <a:t>Standardized Scores &amp; the Normal Distribution</a:t>
+            </a:r>
+            <a:endParaRPr lang="en-US" b="1" u="sng" dirty="0"/>
+          </a:p>
+          <a:p>
+            <a:pPr algn="ctr"/>
+            <a:r>
+              <a:rPr lang="en-US" i="1" dirty="0" smtClean="0"/>
+              <a:t>Lecture slides</a:t>
+            </a:r>
+            <a:endParaRPr lang="en-US" i="1" dirty="0"/>
+          </a:p>
+          <a:p>
+            <a:pPr algn="ctr"/>
+            <a:r>
+              <a:rPr lang="en-US" i="1" dirty="0" smtClean="0"/>
+              <a:t>(first half)</a:t>
+            </a:r>
+            <a:endParaRPr lang="en-US" i="1" dirty="0"/>
+          </a:p>
+        </p:txBody>
+      </p:sp>
+      <p:grpSp>
+        <p:nvGrpSpPr>
+          <p:cNvPr id="14" name="Group 13"/>
+          <p:cNvGrpSpPr/>
+          <p:nvPr/>
+        </p:nvGrpSpPr>
+        <p:grpSpPr>
+          <a:xfrm>
+            <a:off x="7198839" y="2137179"/>
+            <a:ext cx="3141660" cy="3193339"/>
+            <a:chOff x="7047391" y="1961976"/>
+            <a:chExt cx="3141660" cy="3193339"/>
+          </a:xfrm>
+        </p:grpSpPr>
+        <p:pic>
+          <p:nvPicPr>
+            <p:cNvPr id="2" name="Picture 1"/>
+            <p:cNvPicPr>
+              <a:picLocks noChangeAspect="1"/>
+            </p:cNvPicPr>
+            <p:nvPr/>
+          </p:nvPicPr>
+          <p:blipFill>
+            <a:blip r:embed="rId2" cstate="print">
+              <a:extLst>
+                <a:ext uri="{28A0092B-C50C-407E-A947-70E740481C1C}">
+                  <a14:useLocalDpi xmlns:a14="http://schemas.microsoft.com/office/drawing/2010/main" val="0"/>
+                </a:ext>
+              </a:extLst>
+            </a:blip>
+            <a:stretch>
+              <a:fillRect/>
+            </a:stretch>
+          </p:blipFill>
+          <p:spPr>
+            <a:xfrm>
+              <a:off x="7047391" y="3320161"/>
+              <a:ext cx="1578867" cy="1828804"/>
+            </a:xfrm>
+            <a:prstGeom prst="rect">
+              <a:avLst/>
+            </a:prstGeom>
+          </p:spPr>
+        </p:pic>
+        <p:pic>
+          <p:nvPicPr>
+            <p:cNvPr id="3" name="Picture 2"/>
+            <p:cNvPicPr>
+              <a:picLocks noChangeAspect="1"/>
+            </p:cNvPicPr>
+            <p:nvPr/>
+          </p:nvPicPr>
+          <p:blipFill>
+            <a:blip r:embed="rId3" cstate="print">
+              <a:extLst>
+                <a:ext uri="{28A0092B-C50C-407E-A947-70E740481C1C}">
+                  <a14:useLocalDpi xmlns:a14="http://schemas.microsoft.com/office/drawing/2010/main" val="0"/>
+                </a:ext>
+              </a:extLst>
+            </a:blip>
+            <a:stretch>
+              <a:fillRect/>
+            </a:stretch>
+          </p:blipFill>
+          <p:spPr>
+            <a:xfrm>
+              <a:off x="7830475" y="1961976"/>
+              <a:ext cx="1578867" cy="1828804"/>
+            </a:xfrm>
+            <a:prstGeom prst="rect">
+              <a:avLst/>
+            </a:prstGeom>
+          </p:spPr>
+        </p:pic>
+        <p:pic>
+          <p:nvPicPr>
+            <p:cNvPr id="11" name="Picture 10"/>
+            <p:cNvPicPr>
+              <a:picLocks noChangeAspect="1"/>
+            </p:cNvPicPr>
+            <p:nvPr/>
+          </p:nvPicPr>
+          <p:blipFill>
+            <a:blip r:embed="rId4" cstate="print">
+              <a:extLst>
+                <a:ext uri="{28A0092B-C50C-407E-A947-70E740481C1C}">
+                  <a14:useLocalDpi xmlns:a14="http://schemas.microsoft.com/office/drawing/2010/main" val="0"/>
+                </a:ext>
+              </a:extLst>
+            </a:blip>
+            <a:stretch>
+              <a:fillRect/>
+            </a:stretch>
+          </p:blipFill>
+          <p:spPr>
+            <a:xfrm>
+              <a:off x="8610184" y="3326511"/>
+              <a:ext cx="1578867" cy="1828804"/>
+            </a:xfrm>
+            <a:prstGeom prst="rect">
+              <a:avLst/>
+            </a:prstGeom>
+          </p:spPr>
+        </p:pic>
+      </p:grpSp>
+      <p:pic>
+        <p:nvPicPr>
+          <p:cNvPr id="12" name="Picture 11"/>
+          <p:cNvPicPr>
+            <a:picLocks noChangeAspect="1"/>
+          </p:cNvPicPr>
+          <p:nvPr/>
+        </p:nvPicPr>
+        <p:blipFill>
+          <a:blip r:embed="rId5" cstate="print">
+            <a:extLst>
+              <a:ext uri="{28A0092B-C50C-407E-A947-70E740481C1C}">
+                <a14:useLocalDpi xmlns:a14="http://schemas.microsoft.com/office/drawing/2010/main" val="0"/>
+              </a:ext>
+            </a:extLst>
+          </a:blip>
+          <a:stretch>
+            <a:fillRect/>
+          </a:stretch>
+        </p:blipFill>
+        <p:spPr>
+          <a:xfrm>
+            <a:off x="2035110" y="1019593"/>
+            <a:ext cx="1578867" cy="1828804"/>
+          </a:xfrm>
+          <a:prstGeom prst="rect">
+            <a:avLst/>
+          </a:prstGeom>
+        </p:spPr>
+      </p:pic>
+    </p:spTree>
+    <p:extLst>
+      <p:ext uri="{BB962C8B-B14F-4D97-AF65-F5344CB8AC3E}">
+        <p14:creationId xmlns:p14="http://schemas.microsoft.com/office/powerpoint/2010/main" val="2900019700"/>
+      </p:ext>
+    </p:extLst>
+  </p:cSld>
+  <p:clrMapOvr>
+    <a:masterClrMapping/>
+  </p:clrMapOvr>
+</p:sld>
+</file>
+
+<file path=ppt/slides/slide18.xml><?xml version="1.0" encoding="utf-8"?>
+<p:sld xmlns:a="http://schemas.openxmlformats.org/drawingml/2006/main" xmlns:r="http://schemas.openxmlformats.org/officeDocument/2006/relationships" xmlns:p="http://schemas.openxmlformats.org/presentationml/2006/main">
+  <p:cSld>
+    <p:spTree>
+      <p:nvGrpSpPr>
+        <p:cNvPr id="1" name=""/>
+        <p:cNvGrpSpPr/>
+        <p:nvPr/>
+      </p:nvGrpSpPr>
+      <p:grpSpPr>
+        <a:xfrm>
+          <a:off x="0" y="0"/>
+          <a:ext cx="0" cy="0"/>
+          <a:chOff x="0" y="0"/>
+          <a:chExt cx="0" cy="0"/>
+        </a:xfrm>
+      </p:grpSpPr>
+      <p:sp>
+        <p:nvSpPr>
+          <p:cNvPr id="4" name="Rectangle 3"/>
+          <p:cNvSpPr/>
+          <p:nvPr/>
+        </p:nvSpPr>
+        <p:spPr>
+          <a:xfrm>
+            <a:off x="1808702" y="824230"/>
+            <a:ext cx="8778240" cy="5010912"/>
+          </a:xfrm>
+          <a:prstGeom prst="rect">
+            <a:avLst/>
+          </a:prstGeom>
+          <a:solidFill>
+            <a:schemeClr val="bg1">
+              <a:lumMod val="95000"/>
+            </a:schemeClr>
+          </a:solidFill>
+          <a:ln w="38100"/>
+        </p:spPr>
+        <p:style>
+          <a:lnRef idx="2">
+            <a:schemeClr val="accent1">
+              <a:shade val="50000"/>
+            </a:schemeClr>
+          </a:lnRef>
+          <a:fillRef idx="1">
+            <a:schemeClr val="accent1"/>
+          </a:fillRef>
+          <a:effectRef idx="0">
+            <a:schemeClr val="accent1"/>
+          </a:effectRef>
+          <a:fontRef idx="minor">
+            <a:schemeClr val="lt1"/>
+          </a:fontRef>
+        </p:style>
+        <p:txBody>
+          <a:bodyPr rtlCol="0" anchor="ctr"/>
+          <a:lstStyle/>
+          <a:p>
+            <a:pPr algn="ctr"/>
+            <a:endParaRPr lang="en-US"/>
+          </a:p>
+        </p:txBody>
+      </p:sp>
+      <p:sp>
+        <p:nvSpPr>
+          <p:cNvPr id="7" name="TextBox 6"/>
+          <p:cNvSpPr txBox="1"/>
+          <p:nvPr/>
+        </p:nvSpPr>
+        <p:spPr>
+          <a:xfrm>
+            <a:off x="3840385" y="1213849"/>
+            <a:ext cx="5712369" cy="923330"/>
+          </a:xfrm>
+          <a:prstGeom prst="rect">
+            <a:avLst/>
+          </a:prstGeom>
+          <a:noFill/>
+        </p:spPr>
+        <p:txBody>
+          <a:bodyPr wrap="square" rtlCol="0">
+            <a:spAutoFit/>
+          </a:bodyPr>
+          <a:lstStyle/>
+          <a:p>
+            <a:r>
+              <a:rPr lang="en-US" sz="5400" dirty="0" smtClean="0"/>
+              <a:t>INCLASS LECTURES</a:t>
+            </a:r>
+            <a:endParaRPr lang="en-US" sz="5400" dirty="0"/>
+          </a:p>
+        </p:txBody>
+      </p:sp>
+      <p:sp>
+        <p:nvSpPr>
+          <p:cNvPr id="8" name="TextBox 7"/>
+          <p:cNvSpPr txBox="1"/>
+          <p:nvPr/>
+        </p:nvSpPr>
+        <p:spPr>
+          <a:xfrm>
+            <a:off x="7731444" y="5278932"/>
+            <a:ext cx="2076450" cy="369332"/>
+          </a:xfrm>
+          <a:prstGeom prst="rect">
+            <a:avLst/>
+          </a:prstGeom>
+          <a:noFill/>
+        </p:spPr>
+        <p:txBody>
+          <a:bodyPr wrap="square" rtlCol="0">
+            <a:spAutoFit/>
+          </a:bodyPr>
+          <a:lstStyle/>
+          <a:p>
+            <a:pPr algn="ctr"/>
+            <a:r>
+              <a:rPr lang="en-US" dirty="0" smtClean="0"/>
+              <a:t>Jan. 15, 2020</a:t>
+            </a:r>
+            <a:endParaRPr lang="en-US" dirty="0"/>
+          </a:p>
+        </p:txBody>
+      </p:sp>
+      <p:sp>
+        <p:nvSpPr>
+          <p:cNvPr id="9" name="TextBox 8"/>
+          <p:cNvSpPr txBox="1"/>
+          <p:nvPr/>
+        </p:nvSpPr>
+        <p:spPr>
+          <a:xfrm>
+            <a:off x="2318419" y="3043759"/>
+            <a:ext cx="4212906" cy="2585323"/>
+          </a:xfrm>
+          <a:prstGeom prst="rect">
+            <a:avLst/>
+          </a:prstGeom>
+          <a:noFill/>
+        </p:spPr>
+        <p:txBody>
+          <a:bodyPr wrap="square" rtlCol="0">
+            <a:spAutoFit/>
+          </a:bodyPr>
+          <a:lstStyle/>
+          <a:p>
+            <a:pPr algn="ctr"/>
+            <a:r>
+              <a:rPr lang="en-US" dirty="0" smtClean="0"/>
+              <a:t>Chapter 1</a:t>
+            </a:r>
+          </a:p>
+          <a:p>
+            <a:pPr algn="ctr"/>
+            <a:r>
+              <a:rPr lang="en-US" b="1" u="sng" dirty="0" smtClean="0"/>
+              <a:t>Variable/Scale, Rounding &amp; Summation</a:t>
+            </a:r>
+          </a:p>
+          <a:p>
+            <a:pPr algn="ctr"/>
+            <a:r>
+              <a:rPr lang="en-US" i="1" dirty="0" smtClean="0"/>
+              <a:t>Finish discussion</a:t>
+            </a:r>
+          </a:p>
+          <a:p>
+            <a:pPr algn="ctr"/>
+            <a:r>
+              <a:rPr lang="en-US" i="1" dirty="0" smtClean="0"/>
+              <a:t>Homework questions</a:t>
+            </a:r>
+          </a:p>
+          <a:p>
+            <a:pPr algn="ctr"/>
+            <a:endParaRPr lang="en-US" i="1" dirty="0" smtClean="0"/>
+          </a:p>
+          <a:p>
+            <a:pPr algn="ctr"/>
+            <a:r>
+              <a:rPr lang="en-US" dirty="0"/>
+              <a:t>Chapter 2 </a:t>
+            </a:r>
+          </a:p>
+          <a:p>
+            <a:pPr algn="ctr"/>
+            <a:r>
+              <a:rPr lang="en-US" b="1" u="sng" dirty="0"/>
+              <a:t>Exploring Data with Plots</a:t>
+            </a:r>
+          </a:p>
+          <a:p>
+            <a:pPr algn="ctr"/>
+            <a:r>
+              <a:rPr lang="en-US" i="1" dirty="0" smtClean="0"/>
+              <a:t>Lecture slides</a:t>
+            </a:r>
+            <a:endParaRPr lang="en-US" i="1" dirty="0"/>
+          </a:p>
+          <a:p>
+            <a:pPr algn="ctr"/>
+            <a:r>
+              <a:rPr lang="en-US" i="1" dirty="0"/>
+              <a:t>Homework </a:t>
+            </a:r>
+            <a:r>
+              <a:rPr lang="en-US" i="1" dirty="0" smtClean="0"/>
+              <a:t>questions</a:t>
+            </a:r>
+            <a:endParaRPr lang="en-US" i="1" dirty="0"/>
+          </a:p>
+        </p:txBody>
+      </p:sp>
+      <p:grpSp>
+        <p:nvGrpSpPr>
+          <p:cNvPr id="14" name="Group 13"/>
+          <p:cNvGrpSpPr/>
+          <p:nvPr/>
+        </p:nvGrpSpPr>
+        <p:grpSpPr>
+          <a:xfrm>
+            <a:off x="7198839" y="2137179"/>
+            <a:ext cx="3141660" cy="3193339"/>
+            <a:chOff x="7047391" y="1961976"/>
+            <a:chExt cx="3141660" cy="3193339"/>
+          </a:xfrm>
+        </p:grpSpPr>
+        <p:pic>
+          <p:nvPicPr>
+            <p:cNvPr id="2" name="Picture 1"/>
+            <p:cNvPicPr>
+              <a:picLocks noChangeAspect="1"/>
+            </p:cNvPicPr>
+            <p:nvPr/>
+          </p:nvPicPr>
+          <p:blipFill>
+            <a:blip r:embed="rId2" cstate="print">
+              <a:extLst>
+                <a:ext uri="{28A0092B-C50C-407E-A947-70E740481C1C}">
+                  <a14:useLocalDpi xmlns:a14="http://schemas.microsoft.com/office/drawing/2010/main" val="0"/>
+                </a:ext>
+              </a:extLst>
+            </a:blip>
+            <a:stretch>
+              <a:fillRect/>
+            </a:stretch>
+          </p:blipFill>
+          <p:spPr>
+            <a:xfrm>
+              <a:off x="7047391" y="3320161"/>
+              <a:ext cx="1578867" cy="1828804"/>
+            </a:xfrm>
+            <a:prstGeom prst="rect">
+              <a:avLst/>
+            </a:prstGeom>
+          </p:spPr>
+        </p:pic>
+        <p:pic>
+          <p:nvPicPr>
+            <p:cNvPr id="3" name="Picture 2"/>
+            <p:cNvPicPr>
+              <a:picLocks noChangeAspect="1"/>
+            </p:cNvPicPr>
+            <p:nvPr/>
+          </p:nvPicPr>
+          <p:blipFill>
+            <a:blip r:embed="rId3" cstate="print">
+              <a:extLst>
+                <a:ext uri="{28A0092B-C50C-407E-A947-70E740481C1C}">
+                  <a14:useLocalDpi xmlns:a14="http://schemas.microsoft.com/office/drawing/2010/main" val="0"/>
+                </a:ext>
+              </a:extLst>
+            </a:blip>
+            <a:stretch>
+              <a:fillRect/>
+            </a:stretch>
+          </p:blipFill>
+          <p:spPr>
+            <a:xfrm>
+              <a:off x="7830475" y="1961976"/>
+              <a:ext cx="1578867" cy="1828804"/>
+            </a:xfrm>
+            <a:prstGeom prst="rect">
+              <a:avLst/>
+            </a:prstGeom>
+          </p:spPr>
+        </p:pic>
+        <p:pic>
+          <p:nvPicPr>
+            <p:cNvPr id="11" name="Picture 10"/>
+            <p:cNvPicPr>
+              <a:picLocks noChangeAspect="1"/>
+            </p:cNvPicPr>
+            <p:nvPr/>
+          </p:nvPicPr>
+          <p:blipFill>
+            <a:blip r:embed="rId4" cstate="print">
+              <a:extLst>
+                <a:ext uri="{28A0092B-C50C-407E-A947-70E740481C1C}">
+                  <a14:useLocalDpi xmlns:a14="http://schemas.microsoft.com/office/drawing/2010/main" val="0"/>
+                </a:ext>
+              </a:extLst>
+            </a:blip>
+            <a:stretch>
+              <a:fillRect/>
+            </a:stretch>
+          </p:blipFill>
+          <p:spPr>
+            <a:xfrm>
+              <a:off x="8610184" y="3326511"/>
+              <a:ext cx="1578867" cy="1828804"/>
+            </a:xfrm>
+            <a:prstGeom prst="rect">
+              <a:avLst/>
+            </a:prstGeom>
+          </p:spPr>
+        </p:pic>
+      </p:grpSp>
+      <p:pic>
+        <p:nvPicPr>
+          <p:cNvPr id="12" name="Picture 11"/>
+          <p:cNvPicPr>
+            <a:picLocks noChangeAspect="1"/>
+          </p:cNvPicPr>
+          <p:nvPr/>
+        </p:nvPicPr>
+        <p:blipFill>
+          <a:blip r:embed="rId5" cstate="print">
+            <a:extLst>
+              <a:ext uri="{28A0092B-C50C-407E-A947-70E740481C1C}">
+                <a14:useLocalDpi xmlns:a14="http://schemas.microsoft.com/office/drawing/2010/main" val="0"/>
+              </a:ext>
+            </a:extLst>
+          </a:blip>
+          <a:stretch>
+            <a:fillRect/>
+          </a:stretch>
+        </p:blipFill>
+        <p:spPr>
+          <a:xfrm>
+            <a:off x="2035110" y="1019593"/>
+            <a:ext cx="1578867" cy="1828804"/>
+          </a:xfrm>
+          <a:prstGeom prst="rect">
+            <a:avLst/>
+          </a:prstGeom>
+        </p:spPr>
+      </p:pic>
+    </p:spTree>
+    <p:extLst>
+      <p:ext uri="{BB962C8B-B14F-4D97-AF65-F5344CB8AC3E}">
+        <p14:creationId xmlns:p14="http://schemas.microsoft.com/office/powerpoint/2010/main" val="3290463226"/>
+      </p:ext>
+    </p:extLst>
+  </p:cSld>
+  <p:clrMapOvr>
+    <a:masterClrMapping/>
+  </p:clrMapOvr>
+</p:sld>
+</file>
+
+<file path=ppt/slides/slide19.xml><?xml version="1.0" encoding="utf-8"?>
+<p:sld xmlns:a="http://schemas.openxmlformats.org/drawingml/2006/main" xmlns:r="http://schemas.openxmlformats.org/officeDocument/2006/relationships" xmlns:p="http://schemas.openxmlformats.org/presentationml/2006/main">
+  <p:cSld>
+    <p:spTree>
+      <p:nvGrpSpPr>
+        <p:cNvPr id="1" name=""/>
+        <p:cNvGrpSpPr/>
+        <p:nvPr/>
+      </p:nvGrpSpPr>
+      <p:grpSpPr>
+        <a:xfrm>
+          <a:off x="0" y="0"/>
+          <a:ext cx="0" cy="0"/>
+          <a:chOff x="0" y="0"/>
+          <a:chExt cx="0" cy="0"/>
+        </a:xfrm>
+      </p:grpSpPr>
+      <p:pic>
+        <p:nvPicPr>
+          <p:cNvPr id="2" name="Picture 1"/>
+          <p:cNvPicPr>
+            <a:picLocks noChangeAspect="1"/>
+          </p:cNvPicPr>
+          <p:nvPr/>
+        </p:nvPicPr>
+        <p:blipFill>
+          <a:blip r:embed="rId2" cstate="print">
+            <a:extLst>
+              <a:ext uri="{28A0092B-C50C-407E-A947-70E740481C1C}">
+                <a14:useLocalDpi xmlns:a14="http://schemas.microsoft.com/office/drawing/2010/main" val="0"/>
+              </a:ext>
+            </a:extLst>
+          </a:blip>
+          <a:stretch>
+            <a:fillRect/>
+          </a:stretch>
+        </p:blipFill>
+        <p:spPr>
+          <a:xfrm>
+            <a:off x="5306566" y="2514598"/>
+            <a:ext cx="1578867" cy="1828804"/>
+          </a:xfrm>
+          <a:prstGeom prst="rect">
+            <a:avLst/>
+          </a:prstGeom>
+        </p:spPr>
+      </p:pic>
+      <p:sp>
+        <p:nvSpPr>
+          <p:cNvPr id="3" name="Rectangle 2"/>
+          <p:cNvSpPr/>
+          <p:nvPr/>
+        </p:nvSpPr>
+        <p:spPr>
+          <a:xfrm>
+            <a:off x="5054138" y="2394066"/>
+            <a:ext cx="2094807" cy="2078182"/>
+          </a:xfrm>
+          <a:prstGeom prst="rect">
+            <a:avLst/>
+          </a:prstGeom>
+          <a:noFill/>
+        </p:spPr>
+        <p:style>
+          <a:lnRef idx="2">
+            <a:schemeClr val="accent1">
+              <a:shade val="50000"/>
+            </a:schemeClr>
+          </a:lnRef>
+          <a:fillRef idx="1">
+            <a:schemeClr val="accent1"/>
+          </a:fillRef>
+          <a:effectRef idx="0">
+            <a:schemeClr val="accent1"/>
+          </a:effectRef>
+          <a:fontRef idx="minor">
+            <a:schemeClr val="lt1"/>
+          </a:fontRef>
+        </p:style>
+        <p:txBody>
+          <a:bodyPr rtlCol="0" anchor="ctr"/>
+          <a:lstStyle/>
+          <a:p>
+            <a:pPr algn="ctr"/>
+            <a:endParaRPr lang="en-US"/>
+          </a:p>
+        </p:txBody>
+      </p:sp>
     </p:spTree>
     <p:extLst>
       <p:ext uri="{BB962C8B-B14F-4D97-AF65-F5344CB8AC3E}">
@@ -5970,6 +6672,828 @@
 </file>
 
 <file path=ppt/slides/slide2.xml><?xml version="1.0" encoding="utf-8"?>
+<p:sld xmlns:a="http://schemas.openxmlformats.org/drawingml/2006/main" xmlns:r="http://schemas.openxmlformats.org/officeDocument/2006/relationships" xmlns:p="http://schemas.openxmlformats.org/presentationml/2006/main">
+  <p:cSld>
+    <p:spTree>
+      <p:nvGrpSpPr>
+        <p:cNvPr id="1" name=""/>
+        <p:cNvGrpSpPr/>
+        <p:nvPr/>
+      </p:nvGrpSpPr>
+      <p:grpSpPr>
+        <a:xfrm>
+          <a:off x="0" y="0"/>
+          <a:ext cx="0" cy="0"/>
+          <a:chOff x="0" y="0"/>
+          <a:chExt cx="0" cy="0"/>
+        </a:xfrm>
+      </p:grpSpPr>
+      <p:sp>
+        <p:nvSpPr>
+          <p:cNvPr id="4" name="Rectangle 3"/>
+          <p:cNvSpPr/>
+          <p:nvPr/>
+        </p:nvSpPr>
+        <p:spPr>
+          <a:xfrm>
+            <a:off x="1808702" y="824230"/>
+            <a:ext cx="8778240" cy="5010912"/>
+          </a:xfrm>
+          <a:prstGeom prst="rect">
+            <a:avLst/>
+          </a:prstGeom>
+          <a:solidFill>
+            <a:schemeClr val="bg1">
+              <a:lumMod val="95000"/>
+            </a:schemeClr>
+          </a:solidFill>
+          <a:ln w="38100"/>
+        </p:spPr>
+        <p:style>
+          <a:lnRef idx="2">
+            <a:schemeClr val="accent1">
+              <a:shade val="50000"/>
+            </a:schemeClr>
+          </a:lnRef>
+          <a:fillRef idx="1">
+            <a:schemeClr val="accent1"/>
+          </a:fillRef>
+          <a:effectRef idx="0">
+            <a:schemeClr val="accent1"/>
+          </a:effectRef>
+          <a:fontRef idx="minor">
+            <a:schemeClr val="lt1"/>
+          </a:fontRef>
+        </p:style>
+        <p:txBody>
+          <a:bodyPr rtlCol="0" anchor="ctr"/>
+          <a:lstStyle/>
+          <a:p>
+            <a:pPr algn="ctr"/>
+            <a:endParaRPr lang="en-US"/>
+          </a:p>
+        </p:txBody>
+      </p:sp>
+      <p:sp>
+        <p:nvSpPr>
+          <p:cNvPr id="7" name="TextBox 6"/>
+          <p:cNvSpPr txBox="1"/>
+          <p:nvPr/>
+        </p:nvSpPr>
+        <p:spPr>
+          <a:xfrm>
+            <a:off x="4184694" y="1065121"/>
+            <a:ext cx="5712369" cy="1754326"/>
+          </a:xfrm>
+          <a:prstGeom prst="rect">
+            <a:avLst/>
+          </a:prstGeom>
+          <a:noFill/>
+        </p:spPr>
+        <p:txBody>
+          <a:bodyPr wrap="square" rtlCol="0">
+            <a:spAutoFit/>
+          </a:bodyPr>
+          <a:lstStyle/>
+          <a:p>
+            <a:r>
+              <a:rPr lang="en-US" sz="5400" dirty="0" smtClean="0"/>
+              <a:t>OUT-OF-CLASS LECTURES</a:t>
+            </a:r>
+            <a:endParaRPr lang="en-US" sz="5400" dirty="0"/>
+          </a:p>
+        </p:txBody>
+      </p:sp>
+      <p:sp>
+        <p:nvSpPr>
+          <p:cNvPr id="8" name="TextBox 7"/>
+          <p:cNvSpPr txBox="1"/>
+          <p:nvPr/>
+        </p:nvSpPr>
+        <p:spPr>
+          <a:xfrm>
+            <a:off x="7731444" y="5278932"/>
+            <a:ext cx="2076450" cy="369332"/>
+          </a:xfrm>
+          <a:prstGeom prst="rect">
+            <a:avLst/>
+          </a:prstGeom>
+          <a:noFill/>
+        </p:spPr>
+        <p:txBody>
+          <a:bodyPr wrap="square" rtlCol="0">
+            <a:spAutoFit/>
+          </a:bodyPr>
+          <a:lstStyle/>
+          <a:p>
+            <a:pPr algn="ctr"/>
+            <a:r>
+              <a:rPr lang="en-US" dirty="0" smtClean="0"/>
+              <a:t>March </a:t>
+            </a:r>
+            <a:r>
+              <a:rPr lang="en-US" dirty="0" smtClean="0"/>
+              <a:t>31, </a:t>
+            </a:r>
+            <a:r>
+              <a:rPr lang="en-US" dirty="0" smtClean="0"/>
+              <a:t>2020</a:t>
+            </a:r>
+            <a:endParaRPr lang="en-US" dirty="0"/>
+          </a:p>
+        </p:txBody>
+      </p:sp>
+      <p:sp>
+        <p:nvSpPr>
+          <p:cNvPr id="9" name="TextBox 8"/>
+          <p:cNvSpPr txBox="1"/>
+          <p:nvPr/>
+        </p:nvSpPr>
+        <p:spPr>
+          <a:xfrm>
+            <a:off x="2035110" y="3043759"/>
+            <a:ext cx="5005769" cy="1200329"/>
+          </a:xfrm>
+          <a:prstGeom prst="rect">
+            <a:avLst/>
+          </a:prstGeom>
+          <a:noFill/>
+        </p:spPr>
+        <p:txBody>
+          <a:bodyPr wrap="square" rtlCol="0">
+            <a:spAutoFit/>
+          </a:bodyPr>
+          <a:lstStyle/>
+          <a:p>
+            <a:pPr algn="ctr"/>
+            <a:r>
+              <a:rPr lang="en-US" dirty="0" smtClean="0"/>
+              <a:t>Chapter </a:t>
+            </a:r>
+            <a:r>
+              <a:rPr lang="en-US" dirty="0" smtClean="0"/>
+              <a:t>14</a:t>
+            </a:r>
+            <a:endParaRPr lang="en-US" dirty="0"/>
+          </a:p>
+          <a:p>
+            <a:pPr algn="ctr"/>
+            <a:r>
+              <a:rPr lang="en-US" b="1" u="sng" dirty="0" smtClean="0"/>
+              <a:t>2-way Factorial ANOVA</a:t>
+            </a:r>
+            <a:endParaRPr lang="en-US" b="1" u="sng" dirty="0"/>
+          </a:p>
+          <a:p>
+            <a:pPr algn="ctr"/>
+            <a:r>
+              <a:rPr lang="en-US" i="1" dirty="0" smtClean="0"/>
+              <a:t>Lecture slides </a:t>
+            </a:r>
+          </a:p>
+          <a:p>
+            <a:pPr algn="ctr"/>
+            <a:r>
+              <a:rPr lang="en-US" i="1" dirty="0" smtClean="0"/>
+              <a:t>(example in separate video)</a:t>
+            </a:r>
+            <a:endParaRPr lang="en-US" i="1" dirty="0"/>
+          </a:p>
+        </p:txBody>
+      </p:sp>
+      <p:grpSp>
+        <p:nvGrpSpPr>
+          <p:cNvPr id="14" name="Group 13"/>
+          <p:cNvGrpSpPr/>
+          <p:nvPr/>
+        </p:nvGrpSpPr>
+        <p:grpSpPr>
+          <a:xfrm>
+            <a:off x="7198839" y="2137179"/>
+            <a:ext cx="3141660" cy="3193339"/>
+            <a:chOff x="7047391" y="1961976"/>
+            <a:chExt cx="3141660" cy="3193339"/>
+          </a:xfrm>
+        </p:grpSpPr>
+        <p:pic>
+          <p:nvPicPr>
+            <p:cNvPr id="2" name="Picture 1"/>
+            <p:cNvPicPr>
+              <a:picLocks noChangeAspect="1"/>
+            </p:cNvPicPr>
+            <p:nvPr/>
+          </p:nvPicPr>
+          <p:blipFill>
+            <a:blip r:embed="rId2" cstate="print">
+              <a:extLst>
+                <a:ext uri="{28A0092B-C50C-407E-A947-70E740481C1C}">
+                  <a14:useLocalDpi xmlns:a14="http://schemas.microsoft.com/office/drawing/2010/main" val="0"/>
+                </a:ext>
+              </a:extLst>
+            </a:blip>
+            <a:stretch>
+              <a:fillRect/>
+            </a:stretch>
+          </p:blipFill>
+          <p:spPr>
+            <a:xfrm>
+              <a:off x="7047391" y="3320161"/>
+              <a:ext cx="1578867" cy="1828804"/>
+            </a:xfrm>
+            <a:prstGeom prst="rect">
+              <a:avLst/>
+            </a:prstGeom>
+          </p:spPr>
+        </p:pic>
+        <p:pic>
+          <p:nvPicPr>
+            <p:cNvPr id="3" name="Picture 2"/>
+            <p:cNvPicPr>
+              <a:picLocks noChangeAspect="1"/>
+            </p:cNvPicPr>
+            <p:nvPr/>
+          </p:nvPicPr>
+          <p:blipFill>
+            <a:blip r:embed="rId3" cstate="print">
+              <a:extLst>
+                <a:ext uri="{28A0092B-C50C-407E-A947-70E740481C1C}">
+                  <a14:useLocalDpi xmlns:a14="http://schemas.microsoft.com/office/drawing/2010/main" val="0"/>
+                </a:ext>
+              </a:extLst>
+            </a:blip>
+            <a:stretch>
+              <a:fillRect/>
+            </a:stretch>
+          </p:blipFill>
+          <p:spPr>
+            <a:xfrm>
+              <a:off x="7830475" y="1961976"/>
+              <a:ext cx="1578867" cy="1828804"/>
+            </a:xfrm>
+            <a:prstGeom prst="rect">
+              <a:avLst/>
+            </a:prstGeom>
+          </p:spPr>
+        </p:pic>
+        <p:pic>
+          <p:nvPicPr>
+            <p:cNvPr id="11" name="Picture 10"/>
+            <p:cNvPicPr>
+              <a:picLocks noChangeAspect="1"/>
+            </p:cNvPicPr>
+            <p:nvPr/>
+          </p:nvPicPr>
+          <p:blipFill>
+            <a:blip r:embed="rId4" cstate="print">
+              <a:extLst>
+                <a:ext uri="{28A0092B-C50C-407E-A947-70E740481C1C}">
+                  <a14:useLocalDpi xmlns:a14="http://schemas.microsoft.com/office/drawing/2010/main" val="0"/>
+                </a:ext>
+              </a:extLst>
+            </a:blip>
+            <a:stretch>
+              <a:fillRect/>
+            </a:stretch>
+          </p:blipFill>
+          <p:spPr>
+            <a:xfrm>
+              <a:off x="8610184" y="3326511"/>
+              <a:ext cx="1578867" cy="1828804"/>
+            </a:xfrm>
+            <a:prstGeom prst="rect">
+              <a:avLst/>
+            </a:prstGeom>
+          </p:spPr>
+        </p:pic>
+      </p:grpSp>
+      <p:pic>
+        <p:nvPicPr>
+          <p:cNvPr id="12" name="Picture 11"/>
+          <p:cNvPicPr>
+            <a:picLocks noChangeAspect="1"/>
+          </p:cNvPicPr>
+          <p:nvPr/>
+        </p:nvPicPr>
+        <p:blipFill>
+          <a:blip r:embed="rId5" cstate="print">
+            <a:extLst>
+              <a:ext uri="{28A0092B-C50C-407E-A947-70E740481C1C}">
+                <a14:useLocalDpi xmlns:a14="http://schemas.microsoft.com/office/drawing/2010/main" val="0"/>
+              </a:ext>
+            </a:extLst>
+          </a:blip>
+          <a:stretch>
+            <a:fillRect/>
+          </a:stretch>
+        </p:blipFill>
+        <p:spPr>
+          <a:xfrm>
+            <a:off x="2035110" y="1019593"/>
+            <a:ext cx="1578867" cy="1828804"/>
+          </a:xfrm>
+          <a:prstGeom prst="rect">
+            <a:avLst/>
+          </a:prstGeom>
+        </p:spPr>
+      </p:pic>
+      <p:pic>
+        <p:nvPicPr>
+          <p:cNvPr id="1026" name="Picture 2" descr="Image result for virus"/>
+          <p:cNvPicPr>
+            <a:picLocks noChangeAspect="1" noChangeArrowheads="1"/>
+          </p:cNvPicPr>
+          <p:nvPr/>
+        </p:nvPicPr>
+        <p:blipFill>
+          <a:blip r:embed="rId6" cstate="print">
+            <a:extLst>
+              <a:ext uri="{28A0092B-C50C-407E-A947-70E740481C1C}">
+                <a14:useLocalDpi xmlns:a14="http://schemas.microsoft.com/office/drawing/2010/main" val="0"/>
+              </a:ext>
+            </a:extLst>
+          </a:blip>
+          <a:srcRect/>
+          <a:stretch>
+            <a:fillRect/>
+          </a:stretch>
+        </p:blipFill>
+        <p:spPr bwMode="auto">
+          <a:xfrm>
+            <a:off x="1908176" y="4866721"/>
+            <a:ext cx="825034" cy="824421"/>
+          </a:xfrm>
+          <a:prstGeom prst="rect">
+            <a:avLst/>
+          </a:prstGeom>
+          <a:noFill/>
+          <a:extLst>
+            <a:ext uri="{909E8E84-426E-40DD-AFC4-6F175D3DCCD1}">
+              <a14:hiddenFill xmlns:a14="http://schemas.microsoft.com/office/drawing/2010/main">
+                <a:solidFill>
+                  <a:srgbClr val="FFFFFF"/>
+                </a:solidFill>
+              </a14:hiddenFill>
+            </a:ext>
+          </a:extLst>
+        </p:spPr>
+      </p:pic>
+      <p:sp>
+        <p:nvSpPr>
+          <p:cNvPr id="13" name="TextBox 12"/>
+          <p:cNvSpPr txBox="1"/>
+          <p:nvPr/>
+        </p:nvSpPr>
+        <p:spPr>
+          <a:xfrm>
+            <a:off x="2524444" y="5254195"/>
+            <a:ext cx="1238954" cy="369332"/>
+          </a:xfrm>
+          <a:prstGeom prst="rect">
+            <a:avLst/>
+          </a:prstGeom>
+          <a:noFill/>
+        </p:spPr>
+        <p:txBody>
+          <a:bodyPr wrap="square" rtlCol="0">
+            <a:spAutoFit/>
+          </a:bodyPr>
+          <a:lstStyle/>
+          <a:p>
+            <a:pPr algn="ctr"/>
+            <a:r>
+              <a:rPr lang="en-US" b="1" dirty="0" smtClean="0">
+                <a:solidFill>
+                  <a:schemeClr val="accent1">
+                    <a:lumMod val="75000"/>
+                  </a:schemeClr>
+                </a:solidFill>
+              </a:rPr>
+              <a:t>Covid-19</a:t>
+            </a:r>
+            <a:endParaRPr lang="en-US" b="1" dirty="0">
+              <a:solidFill>
+                <a:schemeClr val="accent1">
+                  <a:lumMod val="75000"/>
+                </a:schemeClr>
+              </a:solidFill>
+            </a:endParaRPr>
+          </a:p>
+        </p:txBody>
+      </p:sp>
+    </p:spTree>
+    <p:extLst>
+      <p:ext uri="{BB962C8B-B14F-4D97-AF65-F5344CB8AC3E}">
+        <p14:creationId xmlns:p14="http://schemas.microsoft.com/office/powerpoint/2010/main" val="1235567156"/>
+      </p:ext>
+    </p:extLst>
+  </p:cSld>
+  <p:clrMapOvr>
+    <a:masterClrMapping/>
+  </p:clrMapOvr>
+</p:sld>
+</file>
+
+<file path=ppt/slides/slide3.xml><?xml version="1.0" encoding="utf-8"?>
+<p:sld xmlns:a="http://schemas.openxmlformats.org/drawingml/2006/main" xmlns:r="http://schemas.openxmlformats.org/officeDocument/2006/relationships" xmlns:p="http://schemas.openxmlformats.org/presentationml/2006/main">
+  <p:cSld>
+    <p:spTree>
+      <p:nvGrpSpPr>
+        <p:cNvPr id="1" name=""/>
+        <p:cNvGrpSpPr/>
+        <p:nvPr/>
+      </p:nvGrpSpPr>
+      <p:grpSpPr>
+        <a:xfrm>
+          <a:off x="0" y="0"/>
+          <a:ext cx="0" cy="0"/>
+          <a:chOff x="0" y="0"/>
+          <a:chExt cx="0" cy="0"/>
+        </a:xfrm>
+      </p:grpSpPr>
+      <p:sp>
+        <p:nvSpPr>
+          <p:cNvPr id="4" name="Rectangle 3"/>
+          <p:cNvSpPr/>
+          <p:nvPr/>
+        </p:nvSpPr>
+        <p:spPr>
+          <a:xfrm>
+            <a:off x="1853580" y="824230"/>
+            <a:ext cx="8778240" cy="5010912"/>
+          </a:xfrm>
+          <a:prstGeom prst="rect">
+            <a:avLst/>
+          </a:prstGeom>
+          <a:solidFill>
+            <a:schemeClr val="bg1">
+              <a:lumMod val="95000"/>
+            </a:schemeClr>
+          </a:solidFill>
+          <a:ln w="38100"/>
+        </p:spPr>
+        <p:style>
+          <a:lnRef idx="2">
+            <a:schemeClr val="accent1">
+              <a:shade val="50000"/>
+            </a:schemeClr>
+          </a:lnRef>
+          <a:fillRef idx="1">
+            <a:schemeClr val="accent1"/>
+          </a:fillRef>
+          <a:effectRef idx="0">
+            <a:schemeClr val="accent1"/>
+          </a:effectRef>
+          <a:fontRef idx="minor">
+            <a:schemeClr val="lt1"/>
+          </a:fontRef>
+        </p:style>
+        <p:txBody>
+          <a:bodyPr rtlCol="0" anchor="ctr"/>
+          <a:lstStyle/>
+          <a:p>
+            <a:pPr algn="ctr"/>
+            <a:endParaRPr lang="en-US"/>
+          </a:p>
+        </p:txBody>
+      </p:sp>
+      <p:sp>
+        <p:nvSpPr>
+          <p:cNvPr id="7" name="TextBox 6"/>
+          <p:cNvSpPr txBox="1"/>
+          <p:nvPr/>
+        </p:nvSpPr>
+        <p:spPr>
+          <a:xfrm>
+            <a:off x="3838696" y="1056832"/>
+            <a:ext cx="5712369" cy="1754326"/>
+          </a:xfrm>
+          <a:prstGeom prst="rect">
+            <a:avLst/>
+          </a:prstGeom>
+          <a:noFill/>
+        </p:spPr>
+        <p:txBody>
+          <a:bodyPr wrap="square" rtlCol="0">
+            <a:spAutoFit/>
+          </a:bodyPr>
+          <a:lstStyle/>
+          <a:p>
+            <a:r>
+              <a:rPr lang="en-US" sz="5400" dirty="0" smtClean="0"/>
+              <a:t>Virtual </a:t>
+            </a:r>
+          </a:p>
+          <a:p>
+            <a:r>
+              <a:rPr lang="en-US" sz="5400" dirty="0" smtClean="0"/>
+              <a:t>Office Hours</a:t>
+            </a:r>
+            <a:endParaRPr lang="en-US" sz="5400" dirty="0"/>
+          </a:p>
+        </p:txBody>
+      </p:sp>
+      <p:sp>
+        <p:nvSpPr>
+          <p:cNvPr id="8" name="TextBox 7"/>
+          <p:cNvSpPr txBox="1"/>
+          <p:nvPr/>
+        </p:nvSpPr>
+        <p:spPr>
+          <a:xfrm>
+            <a:off x="7731444" y="5278932"/>
+            <a:ext cx="2076450" cy="369332"/>
+          </a:xfrm>
+          <a:prstGeom prst="rect">
+            <a:avLst/>
+          </a:prstGeom>
+          <a:noFill/>
+        </p:spPr>
+        <p:txBody>
+          <a:bodyPr wrap="square" rtlCol="0">
+            <a:spAutoFit/>
+          </a:bodyPr>
+          <a:lstStyle/>
+          <a:p>
+            <a:pPr algn="ctr"/>
+            <a:r>
+              <a:rPr lang="en-US" dirty="0" smtClean="0"/>
+              <a:t>March 25, 2020</a:t>
+            </a:r>
+            <a:endParaRPr lang="en-US" dirty="0"/>
+          </a:p>
+        </p:txBody>
+      </p:sp>
+      <p:sp>
+        <p:nvSpPr>
+          <p:cNvPr id="9" name="TextBox 8"/>
+          <p:cNvSpPr txBox="1"/>
+          <p:nvPr/>
+        </p:nvSpPr>
+        <p:spPr>
+          <a:xfrm>
+            <a:off x="2023325" y="2848397"/>
+            <a:ext cx="5005769" cy="1200329"/>
+          </a:xfrm>
+          <a:prstGeom prst="rect">
+            <a:avLst/>
+          </a:prstGeom>
+          <a:noFill/>
+        </p:spPr>
+        <p:txBody>
+          <a:bodyPr wrap="square" rtlCol="0">
+            <a:spAutoFit/>
+          </a:bodyPr>
+          <a:lstStyle/>
+          <a:p>
+            <a:pPr algn="ctr"/>
+            <a:r>
+              <a:rPr lang="en-US" dirty="0" smtClean="0"/>
+              <a:t>HW 13 </a:t>
+            </a:r>
+            <a:endParaRPr lang="en-US" dirty="0"/>
+          </a:p>
+          <a:p>
+            <a:pPr algn="ctr"/>
+            <a:r>
+              <a:rPr lang="en-US" b="1" u="sng" dirty="0" smtClean="0"/>
+              <a:t>Multiple Comparisons: pairwise &amp; linear contrasts</a:t>
+            </a:r>
+          </a:p>
+          <a:p>
+            <a:pPr algn="ctr"/>
+            <a:r>
+              <a:rPr lang="en-US" dirty="0" smtClean="0"/>
+              <a:t>Items # 5 &amp; 6</a:t>
+            </a:r>
+          </a:p>
+          <a:p>
+            <a:pPr algn="ctr"/>
+            <a:endParaRPr lang="en-US" b="1" dirty="0"/>
+          </a:p>
+        </p:txBody>
+      </p:sp>
+      <p:grpSp>
+        <p:nvGrpSpPr>
+          <p:cNvPr id="14" name="Group 13"/>
+          <p:cNvGrpSpPr/>
+          <p:nvPr/>
+        </p:nvGrpSpPr>
+        <p:grpSpPr>
+          <a:xfrm>
+            <a:off x="7198839" y="2137179"/>
+            <a:ext cx="3141660" cy="3193339"/>
+            <a:chOff x="7047391" y="1961976"/>
+            <a:chExt cx="3141660" cy="3193339"/>
+          </a:xfrm>
+        </p:grpSpPr>
+        <p:pic>
+          <p:nvPicPr>
+            <p:cNvPr id="2" name="Picture 1"/>
+            <p:cNvPicPr>
+              <a:picLocks noChangeAspect="1"/>
+            </p:cNvPicPr>
+            <p:nvPr/>
+          </p:nvPicPr>
+          <p:blipFill>
+            <a:blip r:embed="rId2" cstate="print">
+              <a:extLst>
+                <a:ext uri="{28A0092B-C50C-407E-A947-70E740481C1C}">
+                  <a14:useLocalDpi xmlns:a14="http://schemas.microsoft.com/office/drawing/2010/main" val="0"/>
+                </a:ext>
+              </a:extLst>
+            </a:blip>
+            <a:stretch>
+              <a:fillRect/>
+            </a:stretch>
+          </p:blipFill>
+          <p:spPr>
+            <a:xfrm>
+              <a:off x="7047391" y="3320161"/>
+              <a:ext cx="1578867" cy="1828804"/>
+            </a:xfrm>
+            <a:prstGeom prst="rect">
+              <a:avLst/>
+            </a:prstGeom>
+          </p:spPr>
+        </p:pic>
+        <p:pic>
+          <p:nvPicPr>
+            <p:cNvPr id="3" name="Picture 2"/>
+            <p:cNvPicPr>
+              <a:picLocks noChangeAspect="1"/>
+            </p:cNvPicPr>
+            <p:nvPr/>
+          </p:nvPicPr>
+          <p:blipFill>
+            <a:blip r:embed="rId3" cstate="print">
+              <a:extLst>
+                <a:ext uri="{28A0092B-C50C-407E-A947-70E740481C1C}">
+                  <a14:useLocalDpi xmlns:a14="http://schemas.microsoft.com/office/drawing/2010/main" val="0"/>
+                </a:ext>
+              </a:extLst>
+            </a:blip>
+            <a:stretch>
+              <a:fillRect/>
+            </a:stretch>
+          </p:blipFill>
+          <p:spPr>
+            <a:xfrm>
+              <a:off x="7830475" y="1961976"/>
+              <a:ext cx="1578867" cy="1828804"/>
+            </a:xfrm>
+            <a:prstGeom prst="rect">
+              <a:avLst/>
+            </a:prstGeom>
+          </p:spPr>
+        </p:pic>
+        <p:pic>
+          <p:nvPicPr>
+            <p:cNvPr id="11" name="Picture 10"/>
+            <p:cNvPicPr>
+              <a:picLocks noChangeAspect="1"/>
+            </p:cNvPicPr>
+            <p:nvPr/>
+          </p:nvPicPr>
+          <p:blipFill>
+            <a:blip r:embed="rId4" cstate="print">
+              <a:extLst>
+                <a:ext uri="{28A0092B-C50C-407E-A947-70E740481C1C}">
+                  <a14:useLocalDpi xmlns:a14="http://schemas.microsoft.com/office/drawing/2010/main" val="0"/>
+                </a:ext>
+              </a:extLst>
+            </a:blip>
+            <a:stretch>
+              <a:fillRect/>
+            </a:stretch>
+          </p:blipFill>
+          <p:spPr>
+            <a:xfrm>
+              <a:off x="8610184" y="3326511"/>
+              <a:ext cx="1578867" cy="1828804"/>
+            </a:xfrm>
+            <a:prstGeom prst="rect">
+              <a:avLst/>
+            </a:prstGeom>
+          </p:spPr>
+        </p:pic>
+      </p:grpSp>
+      <p:pic>
+        <p:nvPicPr>
+          <p:cNvPr id="12" name="Picture 11"/>
+          <p:cNvPicPr>
+            <a:picLocks noChangeAspect="1"/>
+          </p:cNvPicPr>
+          <p:nvPr/>
+        </p:nvPicPr>
+        <p:blipFill>
+          <a:blip r:embed="rId5" cstate="print">
+            <a:extLst>
+              <a:ext uri="{28A0092B-C50C-407E-A947-70E740481C1C}">
+                <a14:useLocalDpi xmlns:a14="http://schemas.microsoft.com/office/drawing/2010/main" val="0"/>
+              </a:ext>
+            </a:extLst>
+          </a:blip>
+          <a:stretch>
+            <a:fillRect/>
+          </a:stretch>
+        </p:blipFill>
+        <p:spPr>
+          <a:xfrm>
+            <a:off x="2035110" y="1019593"/>
+            <a:ext cx="1578867" cy="1828804"/>
+          </a:xfrm>
+          <a:prstGeom prst="rect">
+            <a:avLst/>
+          </a:prstGeom>
+        </p:spPr>
+      </p:pic>
+      <p:sp>
+        <p:nvSpPr>
+          <p:cNvPr id="13" name="TextBox 12"/>
+          <p:cNvSpPr txBox="1"/>
+          <p:nvPr/>
+        </p:nvSpPr>
+        <p:spPr>
+          <a:xfrm>
+            <a:off x="2023324" y="3965983"/>
+            <a:ext cx="5005769" cy="1200329"/>
+          </a:xfrm>
+          <a:prstGeom prst="rect">
+            <a:avLst/>
+          </a:prstGeom>
+          <a:noFill/>
+        </p:spPr>
+        <p:txBody>
+          <a:bodyPr wrap="square" rtlCol="0">
+            <a:spAutoFit/>
+          </a:bodyPr>
+          <a:lstStyle/>
+          <a:p>
+            <a:pPr algn="ctr"/>
+            <a:r>
+              <a:rPr lang="en-US" dirty="0" smtClean="0"/>
+              <a:t>HW 12 </a:t>
+            </a:r>
+            <a:endParaRPr lang="en-US" dirty="0"/>
+          </a:p>
+          <a:p>
+            <a:pPr algn="ctr"/>
+            <a:r>
+              <a:rPr lang="en-US" b="1" u="sng" dirty="0" smtClean="0"/>
+              <a:t>One-way, independent groups ANOVA</a:t>
+            </a:r>
+          </a:p>
+          <a:p>
+            <a:pPr algn="ctr"/>
+            <a:r>
+              <a:rPr lang="en-US" dirty="0" smtClean="0"/>
+              <a:t>Items with APA methods/results</a:t>
+            </a:r>
+          </a:p>
+          <a:p>
+            <a:pPr algn="ctr"/>
+            <a:endParaRPr lang="en-US" b="1" dirty="0"/>
+          </a:p>
+        </p:txBody>
+      </p:sp>
+      <p:pic>
+        <p:nvPicPr>
+          <p:cNvPr id="5" name="Picture 4"/>
+          <p:cNvPicPr>
+            <a:picLocks noChangeAspect="1"/>
+          </p:cNvPicPr>
+          <p:nvPr/>
+        </p:nvPicPr>
+        <p:blipFill>
+          <a:blip r:embed="rId6"/>
+          <a:stretch>
+            <a:fillRect/>
+          </a:stretch>
+        </p:blipFill>
+        <p:spPr>
+          <a:xfrm>
+            <a:off x="1985351" y="4872564"/>
+            <a:ext cx="1853345" cy="853514"/>
+          </a:xfrm>
+          <a:prstGeom prst="rect">
+            <a:avLst/>
+          </a:prstGeom>
+        </p:spPr>
+      </p:pic>
+    </p:spTree>
+    <p:extLst>
+      <p:ext uri="{BB962C8B-B14F-4D97-AF65-F5344CB8AC3E}">
+        <p14:creationId xmlns:p14="http://schemas.microsoft.com/office/powerpoint/2010/main" val="636154248"/>
+      </p:ext>
+    </p:extLst>
+  </p:cSld>
+  <p:clrMapOvr>
+    <a:masterClrMapping/>
+  </p:clrMapOvr>
+</p:sld>
+</file>
+
+<file path=ppt/slides/slide4.xml><?xml version="1.0" encoding="utf-8"?>
 <p:sld xmlns:a="http://schemas.openxmlformats.org/drawingml/2006/main" xmlns:r="http://schemas.openxmlformats.org/officeDocument/2006/relationships" xmlns:p="http://schemas.openxmlformats.org/presentationml/2006/main">
   <p:cSld>
     <p:spTree>
@@ -6417,7 +7941,7 @@
 </p:sld>
 </file>
 
-<file path=ppt/slides/slide3.xml><?xml version="1.0" encoding="utf-8"?>
+<file path=ppt/slides/slide5.xml><?xml version="1.0" encoding="utf-8"?>
 <p:sld xmlns:a="http://schemas.openxmlformats.org/drawingml/2006/main" xmlns:r="http://schemas.openxmlformats.org/officeDocument/2006/relationships" xmlns:p="http://schemas.openxmlformats.org/presentationml/2006/main">
   <p:cSld>
     <p:spTree>
@@ -6827,7 +8351,7 @@
 </p:sld>
 </file>
 
-<file path=ppt/slides/slide4.xml><?xml version="1.0" encoding="utf-8"?>
+<file path=ppt/slides/slide6.xml><?xml version="1.0" encoding="utf-8"?>
 <p:sld xmlns:a="http://schemas.openxmlformats.org/drawingml/2006/main" xmlns:r="http://schemas.openxmlformats.org/officeDocument/2006/relationships" xmlns:p="http://schemas.openxmlformats.org/presentationml/2006/main">
   <p:cSld>
     <p:spTree>
@@ -7162,7 +8686,7 @@
 </p:sld>
 </file>
 
-<file path=ppt/slides/slide5.xml><?xml version="1.0" encoding="utf-8"?>
+<file path=ppt/slides/slide7.xml><?xml version="1.0" encoding="utf-8"?>
 <p:sld xmlns:a="http://schemas.openxmlformats.org/drawingml/2006/main" xmlns:r="http://schemas.openxmlformats.org/officeDocument/2006/relationships" xmlns:p="http://schemas.openxmlformats.org/presentationml/2006/main">
   <p:cSld>
     <p:spTree>
@@ -7480,7 +9004,7 @@
 </p:sld>
 </file>
 
-<file path=ppt/slides/slide6.xml><?xml version="1.0" encoding="utf-8"?>
+<file path=ppt/slides/slide8.xml><?xml version="1.0" encoding="utf-8"?>
 <p:sld xmlns:a="http://schemas.openxmlformats.org/drawingml/2006/main" xmlns:r="http://schemas.openxmlformats.org/officeDocument/2006/relationships" xmlns:p="http://schemas.openxmlformats.org/presentationml/2006/main">
   <p:cSld>
     <p:spTree>
@@ -7807,7 +9331,7 @@
 </p:sld>
 </file>
 
-<file path=ppt/slides/slide7.xml><?xml version="1.0" encoding="utf-8"?>
+<file path=ppt/slides/slide9.xml><?xml version="1.0" encoding="utf-8"?>
 <p:sld xmlns:a="http://schemas.openxmlformats.org/drawingml/2006/main" xmlns:r="http://schemas.openxmlformats.org/officeDocument/2006/relationships" xmlns:p="http://schemas.openxmlformats.org/presentationml/2006/main">
   <p:cSld>
     <p:spTree>
@@ -8123,698 +9647,6 @@
     <p:extLst>
       <p:ext uri="{BB962C8B-B14F-4D97-AF65-F5344CB8AC3E}">
         <p14:creationId xmlns:p14="http://schemas.microsoft.com/office/powerpoint/2010/main" val="928580799"/>
-      </p:ext>
-    </p:extLst>
-  </p:cSld>
-  <p:clrMapOvr>
-    <a:masterClrMapping/>
-  </p:clrMapOvr>
-</p:sld>
-</file>
-
-<file path=ppt/slides/slide8.xml><?xml version="1.0" encoding="utf-8"?>
-<p:sld xmlns:a="http://schemas.openxmlformats.org/drawingml/2006/main" xmlns:r="http://schemas.openxmlformats.org/officeDocument/2006/relationships" xmlns:p="http://schemas.openxmlformats.org/presentationml/2006/main">
-  <p:cSld>
-    <p:spTree>
-      <p:nvGrpSpPr>
-        <p:cNvPr id="1" name=""/>
-        <p:cNvGrpSpPr/>
-        <p:nvPr/>
-      </p:nvGrpSpPr>
-      <p:grpSpPr>
-        <a:xfrm>
-          <a:off x="0" y="0"/>
-          <a:ext cx="0" cy="0"/>
-          <a:chOff x="0" y="0"/>
-          <a:chExt cx="0" cy="0"/>
-        </a:xfrm>
-      </p:grpSpPr>
-      <p:sp>
-        <p:nvSpPr>
-          <p:cNvPr id="4" name="Rectangle 3"/>
-          <p:cNvSpPr/>
-          <p:nvPr/>
-        </p:nvSpPr>
-        <p:spPr>
-          <a:xfrm>
-            <a:off x="1808702" y="824230"/>
-            <a:ext cx="8778240" cy="5010912"/>
-          </a:xfrm>
-          <a:prstGeom prst="rect">
-            <a:avLst/>
-          </a:prstGeom>
-          <a:solidFill>
-            <a:schemeClr val="bg1">
-              <a:lumMod val="95000"/>
-            </a:schemeClr>
-          </a:solidFill>
-          <a:ln w="38100"/>
-        </p:spPr>
-        <p:style>
-          <a:lnRef idx="2">
-            <a:schemeClr val="accent1">
-              <a:shade val="50000"/>
-            </a:schemeClr>
-          </a:lnRef>
-          <a:fillRef idx="1">
-            <a:schemeClr val="accent1"/>
-          </a:fillRef>
-          <a:effectRef idx="0">
-            <a:schemeClr val="accent1"/>
-          </a:effectRef>
-          <a:fontRef idx="minor">
-            <a:schemeClr val="lt1"/>
-          </a:fontRef>
-        </p:style>
-        <p:txBody>
-          <a:bodyPr rtlCol="0" anchor="ctr"/>
-          <a:lstStyle/>
-          <a:p>
-            <a:pPr algn="ctr"/>
-            <a:endParaRPr lang="en-US"/>
-          </a:p>
-        </p:txBody>
-      </p:sp>
-      <p:sp>
-        <p:nvSpPr>
-          <p:cNvPr id="7" name="TextBox 6"/>
-          <p:cNvSpPr txBox="1"/>
-          <p:nvPr/>
-        </p:nvSpPr>
-        <p:spPr>
-          <a:xfrm>
-            <a:off x="3840385" y="1213849"/>
-            <a:ext cx="5712369" cy="923330"/>
-          </a:xfrm>
-          <a:prstGeom prst="rect">
-            <a:avLst/>
-          </a:prstGeom>
-          <a:noFill/>
-        </p:spPr>
-        <p:txBody>
-          <a:bodyPr wrap="square" rtlCol="0">
-            <a:spAutoFit/>
-          </a:bodyPr>
-          <a:lstStyle/>
-          <a:p>
-            <a:r>
-              <a:rPr lang="en-US" sz="5400" dirty="0" smtClean="0"/>
-              <a:t>INCLASS LECTURES</a:t>
-            </a:r>
-            <a:endParaRPr lang="en-US" sz="5400" dirty="0"/>
-          </a:p>
-        </p:txBody>
-      </p:sp>
-      <p:sp>
-        <p:nvSpPr>
-          <p:cNvPr id="8" name="TextBox 7"/>
-          <p:cNvSpPr txBox="1"/>
-          <p:nvPr/>
-        </p:nvSpPr>
-        <p:spPr>
-          <a:xfrm>
-            <a:off x="7731444" y="5278932"/>
-            <a:ext cx="2076450" cy="369332"/>
-          </a:xfrm>
-          <a:prstGeom prst="rect">
-            <a:avLst/>
-          </a:prstGeom>
-          <a:noFill/>
-        </p:spPr>
-        <p:txBody>
-          <a:bodyPr wrap="square" rtlCol="0">
-            <a:spAutoFit/>
-          </a:bodyPr>
-          <a:lstStyle/>
-          <a:p>
-            <a:pPr algn="ctr"/>
-            <a:r>
-              <a:rPr lang="en-US" dirty="0" smtClean="0"/>
-              <a:t>March 9, 2020</a:t>
-            </a:r>
-            <a:endParaRPr lang="en-US" dirty="0"/>
-          </a:p>
-        </p:txBody>
-      </p:sp>
-      <p:sp>
-        <p:nvSpPr>
-          <p:cNvPr id="9" name="TextBox 8"/>
-          <p:cNvSpPr txBox="1"/>
-          <p:nvPr/>
-        </p:nvSpPr>
-        <p:spPr>
-          <a:xfrm>
-            <a:off x="2175358" y="3486436"/>
-            <a:ext cx="5005769" cy="1200329"/>
-          </a:xfrm>
-          <a:prstGeom prst="rect">
-            <a:avLst/>
-          </a:prstGeom>
-          <a:noFill/>
-        </p:spPr>
-        <p:txBody>
-          <a:bodyPr wrap="square" rtlCol="0">
-            <a:spAutoFit/>
-          </a:bodyPr>
-          <a:lstStyle/>
-          <a:p>
-            <a:pPr algn="ctr"/>
-            <a:r>
-              <a:rPr lang="en-US" dirty="0" smtClean="0"/>
-              <a:t>Chapter 12</a:t>
-            </a:r>
-            <a:endParaRPr lang="en-US" dirty="0"/>
-          </a:p>
-          <a:p>
-            <a:pPr algn="ctr"/>
-            <a:r>
-              <a:rPr lang="en-US" b="1" u="sng" dirty="0" smtClean="0"/>
-              <a:t>One-way Independent Groups ANOVA</a:t>
-            </a:r>
-            <a:endParaRPr lang="en-US" dirty="0" smtClean="0"/>
-          </a:p>
-          <a:p>
-            <a:pPr algn="ctr"/>
-            <a:r>
-              <a:rPr lang="en-US" i="1" dirty="0" smtClean="0"/>
-              <a:t>First half, chapter slides</a:t>
-            </a:r>
-          </a:p>
-          <a:p>
-            <a:pPr algn="ctr"/>
-            <a:r>
-              <a:rPr lang="en-US" i="1" dirty="0" smtClean="0"/>
-              <a:t>Mostly New Material Presentation</a:t>
-            </a:r>
-          </a:p>
-        </p:txBody>
-      </p:sp>
-      <p:grpSp>
-        <p:nvGrpSpPr>
-          <p:cNvPr id="14" name="Group 13"/>
-          <p:cNvGrpSpPr/>
-          <p:nvPr/>
-        </p:nvGrpSpPr>
-        <p:grpSpPr>
-          <a:xfrm>
-            <a:off x="7198839" y="2137179"/>
-            <a:ext cx="3141660" cy="3193339"/>
-            <a:chOff x="7047391" y="1961976"/>
-            <a:chExt cx="3141660" cy="3193339"/>
-          </a:xfrm>
-        </p:grpSpPr>
-        <p:pic>
-          <p:nvPicPr>
-            <p:cNvPr id="2" name="Picture 1"/>
-            <p:cNvPicPr>
-              <a:picLocks noChangeAspect="1"/>
-            </p:cNvPicPr>
-            <p:nvPr/>
-          </p:nvPicPr>
-          <p:blipFill>
-            <a:blip r:embed="rId2" cstate="print">
-              <a:extLst>
-                <a:ext uri="{28A0092B-C50C-407E-A947-70E740481C1C}">
-                  <a14:useLocalDpi xmlns:a14="http://schemas.microsoft.com/office/drawing/2010/main" val="0"/>
-                </a:ext>
-              </a:extLst>
-            </a:blip>
-            <a:stretch>
-              <a:fillRect/>
-            </a:stretch>
-          </p:blipFill>
-          <p:spPr>
-            <a:xfrm>
-              <a:off x="7047391" y="3320161"/>
-              <a:ext cx="1578867" cy="1828804"/>
-            </a:xfrm>
-            <a:prstGeom prst="rect">
-              <a:avLst/>
-            </a:prstGeom>
-          </p:spPr>
-        </p:pic>
-        <p:pic>
-          <p:nvPicPr>
-            <p:cNvPr id="3" name="Picture 2"/>
-            <p:cNvPicPr>
-              <a:picLocks noChangeAspect="1"/>
-            </p:cNvPicPr>
-            <p:nvPr/>
-          </p:nvPicPr>
-          <p:blipFill>
-            <a:blip r:embed="rId3" cstate="print">
-              <a:extLst>
-                <a:ext uri="{28A0092B-C50C-407E-A947-70E740481C1C}">
-                  <a14:useLocalDpi xmlns:a14="http://schemas.microsoft.com/office/drawing/2010/main" val="0"/>
-                </a:ext>
-              </a:extLst>
-            </a:blip>
-            <a:stretch>
-              <a:fillRect/>
-            </a:stretch>
-          </p:blipFill>
-          <p:spPr>
-            <a:xfrm>
-              <a:off x="7830475" y="1961976"/>
-              <a:ext cx="1578867" cy="1828804"/>
-            </a:xfrm>
-            <a:prstGeom prst="rect">
-              <a:avLst/>
-            </a:prstGeom>
-          </p:spPr>
-        </p:pic>
-        <p:pic>
-          <p:nvPicPr>
-            <p:cNvPr id="11" name="Picture 10"/>
-            <p:cNvPicPr>
-              <a:picLocks noChangeAspect="1"/>
-            </p:cNvPicPr>
-            <p:nvPr/>
-          </p:nvPicPr>
-          <p:blipFill>
-            <a:blip r:embed="rId4" cstate="print">
-              <a:extLst>
-                <a:ext uri="{28A0092B-C50C-407E-A947-70E740481C1C}">
-                  <a14:useLocalDpi xmlns:a14="http://schemas.microsoft.com/office/drawing/2010/main" val="0"/>
-                </a:ext>
-              </a:extLst>
-            </a:blip>
-            <a:stretch>
-              <a:fillRect/>
-            </a:stretch>
-          </p:blipFill>
-          <p:spPr>
-            <a:xfrm>
-              <a:off x="8610184" y="3326511"/>
-              <a:ext cx="1578867" cy="1828804"/>
-            </a:xfrm>
-            <a:prstGeom prst="rect">
-              <a:avLst/>
-            </a:prstGeom>
-          </p:spPr>
-        </p:pic>
-      </p:grpSp>
-      <p:pic>
-        <p:nvPicPr>
-          <p:cNvPr id="12" name="Picture 11"/>
-          <p:cNvPicPr>
-            <a:picLocks noChangeAspect="1"/>
-          </p:cNvPicPr>
-          <p:nvPr/>
-        </p:nvPicPr>
-        <p:blipFill>
-          <a:blip r:embed="rId5" cstate="print">
-            <a:extLst>
-              <a:ext uri="{28A0092B-C50C-407E-A947-70E740481C1C}">
-                <a14:useLocalDpi xmlns:a14="http://schemas.microsoft.com/office/drawing/2010/main" val="0"/>
-              </a:ext>
-            </a:extLst>
-          </a:blip>
-          <a:stretch>
-            <a:fillRect/>
-          </a:stretch>
-        </p:blipFill>
-        <p:spPr>
-          <a:xfrm>
-            <a:off x="2035110" y="1019593"/>
-            <a:ext cx="1578867" cy="1828804"/>
-          </a:xfrm>
-          <a:prstGeom prst="rect">
-            <a:avLst/>
-          </a:prstGeom>
-        </p:spPr>
-      </p:pic>
-    </p:spTree>
-    <p:extLst>
-      <p:ext uri="{BB962C8B-B14F-4D97-AF65-F5344CB8AC3E}">
-        <p14:creationId xmlns:p14="http://schemas.microsoft.com/office/powerpoint/2010/main" val="2758197068"/>
-      </p:ext>
-    </p:extLst>
-  </p:cSld>
-  <p:clrMapOvr>
-    <a:masterClrMapping/>
-  </p:clrMapOvr>
-</p:sld>
-</file>
-
-<file path=ppt/slides/slide9.xml><?xml version="1.0" encoding="utf-8"?>
-<p:sld xmlns:a="http://schemas.openxmlformats.org/drawingml/2006/main" xmlns:r="http://schemas.openxmlformats.org/officeDocument/2006/relationships" xmlns:p="http://schemas.openxmlformats.org/presentationml/2006/main">
-  <p:cSld>
-    <p:spTree>
-      <p:nvGrpSpPr>
-        <p:cNvPr id="1" name=""/>
-        <p:cNvGrpSpPr/>
-        <p:nvPr/>
-      </p:nvGrpSpPr>
-      <p:grpSpPr>
-        <a:xfrm>
-          <a:off x="0" y="0"/>
-          <a:ext cx="0" cy="0"/>
-          <a:chOff x="0" y="0"/>
-          <a:chExt cx="0" cy="0"/>
-        </a:xfrm>
-      </p:grpSpPr>
-      <p:sp>
-        <p:nvSpPr>
-          <p:cNvPr id="4" name="Rectangle 3"/>
-          <p:cNvSpPr/>
-          <p:nvPr/>
-        </p:nvSpPr>
-        <p:spPr>
-          <a:xfrm>
-            <a:off x="1808702" y="824230"/>
-            <a:ext cx="8778240" cy="5010912"/>
-          </a:xfrm>
-          <a:prstGeom prst="rect">
-            <a:avLst/>
-          </a:prstGeom>
-          <a:solidFill>
-            <a:schemeClr val="bg1">
-              <a:lumMod val="95000"/>
-            </a:schemeClr>
-          </a:solidFill>
-          <a:ln w="38100"/>
-        </p:spPr>
-        <p:style>
-          <a:lnRef idx="2">
-            <a:schemeClr val="accent1">
-              <a:shade val="50000"/>
-            </a:schemeClr>
-          </a:lnRef>
-          <a:fillRef idx="1">
-            <a:schemeClr val="accent1"/>
-          </a:fillRef>
-          <a:effectRef idx="0">
-            <a:schemeClr val="accent1"/>
-          </a:effectRef>
-          <a:fontRef idx="minor">
-            <a:schemeClr val="lt1"/>
-          </a:fontRef>
-        </p:style>
-        <p:txBody>
-          <a:bodyPr rtlCol="0" anchor="ctr"/>
-          <a:lstStyle/>
-          <a:p>
-            <a:pPr algn="ctr"/>
-            <a:endParaRPr lang="en-US"/>
-          </a:p>
-        </p:txBody>
-      </p:sp>
-      <p:sp>
-        <p:nvSpPr>
-          <p:cNvPr id="7" name="TextBox 6"/>
-          <p:cNvSpPr txBox="1"/>
-          <p:nvPr/>
-        </p:nvSpPr>
-        <p:spPr>
-          <a:xfrm>
-            <a:off x="3840385" y="1213849"/>
-            <a:ext cx="5712369" cy="923330"/>
-          </a:xfrm>
-          <a:prstGeom prst="rect">
-            <a:avLst/>
-          </a:prstGeom>
-          <a:noFill/>
-        </p:spPr>
-        <p:txBody>
-          <a:bodyPr wrap="square" rtlCol="0">
-            <a:spAutoFit/>
-          </a:bodyPr>
-          <a:lstStyle/>
-          <a:p>
-            <a:r>
-              <a:rPr lang="en-US" sz="5400" dirty="0" smtClean="0"/>
-              <a:t>INCLASS LECTURES</a:t>
-            </a:r>
-            <a:endParaRPr lang="en-US" sz="5400" dirty="0"/>
-          </a:p>
-        </p:txBody>
-      </p:sp>
-      <p:sp>
-        <p:nvSpPr>
-          <p:cNvPr id="8" name="TextBox 7"/>
-          <p:cNvSpPr txBox="1"/>
-          <p:nvPr/>
-        </p:nvSpPr>
-        <p:spPr>
-          <a:xfrm>
-            <a:off x="7731444" y="5278932"/>
-            <a:ext cx="2076450" cy="369332"/>
-          </a:xfrm>
-          <a:prstGeom prst="rect">
-            <a:avLst/>
-          </a:prstGeom>
-          <a:noFill/>
-        </p:spPr>
-        <p:txBody>
-          <a:bodyPr wrap="square" rtlCol="0">
-            <a:spAutoFit/>
-          </a:bodyPr>
-          <a:lstStyle/>
-          <a:p>
-            <a:pPr algn="ctr"/>
-            <a:r>
-              <a:rPr lang="en-US" dirty="0" smtClean="0"/>
-              <a:t>Feb. 19, 2020</a:t>
-            </a:r>
-            <a:endParaRPr lang="en-US" dirty="0"/>
-          </a:p>
-        </p:txBody>
-      </p:sp>
-      <p:sp>
-        <p:nvSpPr>
-          <p:cNvPr id="9" name="TextBox 8"/>
-          <p:cNvSpPr txBox="1"/>
-          <p:nvPr/>
-        </p:nvSpPr>
-        <p:spPr>
-          <a:xfrm>
-            <a:off x="2130478" y="2956774"/>
-            <a:ext cx="5005769" cy="923330"/>
-          </a:xfrm>
-          <a:prstGeom prst="rect">
-            <a:avLst/>
-          </a:prstGeom>
-          <a:noFill/>
-        </p:spPr>
-        <p:txBody>
-          <a:bodyPr wrap="square" rtlCol="0">
-            <a:spAutoFit/>
-          </a:bodyPr>
-          <a:lstStyle/>
-          <a:p>
-            <a:pPr algn="ctr"/>
-            <a:r>
-              <a:rPr lang="en-US" dirty="0" smtClean="0"/>
-              <a:t>Chapter </a:t>
-            </a:r>
-            <a:r>
-              <a:rPr lang="en-US" dirty="0"/>
-              <a:t>9</a:t>
-            </a:r>
-          </a:p>
-          <a:p>
-            <a:pPr algn="ctr"/>
-            <a:r>
-              <a:rPr lang="en-US" b="1" u="sng" dirty="0" smtClean="0"/>
-              <a:t>Correlation</a:t>
-            </a:r>
-            <a:endParaRPr lang="en-US" dirty="0" smtClean="0"/>
-          </a:p>
-          <a:p>
-            <a:pPr algn="ctr"/>
-            <a:r>
-              <a:rPr lang="en-US" i="1" dirty="0" smtClean="0"/>
-              <a:t>Second half, chapter slides</a:t>
-            </a:r>
-          </a:p>
-        </p:txBody>
-      </p:sp>
-      <p:grpSp>
-        <p:nvGrpSpPr>
-          <p:cNvPr id="14" name="Group 13"/>
-          <p:cNvGrpSpPr/>
-          <p:nvPr/>
-        </p:nvGrpSpPr>
-        <p:grpSpPr>
-          <a:xfrm>
-            <a:off x="7198839" y="2137179"/>
-            <a:ext cx="3141660" cy="3193339"/>
-            <a:chOff x="7047391" y="1961976"/>
-            <a:chExt cx="3141660" cy="3193339"/>
-          </a:xfrm>
-        </p:grpSpPr>
-        <p:pic>
-          <p:nvPicPr>
-            <p:cNvPr id="2" name="Picture 1"/>
-            <p:cNvPicPr>
-              <a:picLocks noChangeAspect="1"/>
-            </p:cNvPicPr>
-            <p:nvPr/>
-          </p:nvPicPr>
-          <p:blipFill>
-            <a:blip r:embed="rId2" cstate="print">
-              <a:extLst>
-                <a:ext uri="{28A0092B-C50C-407E-A947-70E740481C1C}">
-                  <a14:useLocalDpi xmlns:a14="http://schemas.microsoft.com/office/drawing/2010/main" val="0"/>
-                </a:ext>
-              </a:extLst>
-            </a:blip>
-            <a:stretch>
-              <a:fillRect/>
-            </a:stretch>
-          </p:blipFill>
-          <p:spPr>
-            <a:xfrm>
-              <a:off x="7047391" y="3320161"/>
-              <a:ext cx="1578867" cy="1828804"/>
-            </a:xfrm>
-            <a:prstGeom prst="rect">
-              <a:avLst/>
-            </a:prstGeom>
-          </p:spPr>
-        </p:pic>
-        <p:pic>
-          <p:nvPicPr>
-            <p:cNvPr id="3" name="Picture 2"/>
-            <p:cNvPicPr>
-              <a:picLocks noChangeAspect="1"/>
-            </p:cNvPicPr>
-            <p:nvPr/>
-          </p:nvPicPr>
-          <p:blipFill>
-            <a:blip r:embed="rId3" cstate="print">
-              <a:extLst>
-                <a:ext uri="{28A0092B-C50C-407E-A947-70E740481C1C}">
-                  <a14:useLocalDpi xmlns:a14="http://schemas.microsoft.com/office/drawing/2010/main" val="0"/>
-                </a:ext>
-              </a:extLst>
-            </a:blip>
-            <a:stretch>
-              <a:fillRect/>
-            </a:stretch>
-          </p:blipFill>
-          <p:spPr>
-            <a:xfrm>
-              <a:off x="7830475" y="1961976"/>
-              <a:ext cx="1578867" cy="1828804"/>
-            </a:xfrm>
-            <a:prstGeom prst="rect">
-              <a:avLst/>
-            </a:prstGeom>
-          </p:spPr>
-        </p:pic>
-        <p:pic>
-          <p:nvPicPr>
-            <p:cNvPr id="11" name="Picture 10"/>
-            <p:cNvPicPr>
-              <a:picLocks noChangeAspect="1"/>
-            </p:cNvPicPr>
-            <p:nvPr/>
-          </p:nvPicPr>
-          <p:blipFill>
-            <a:blip r:embed="rId4" cstate="print">
-              <a:extLst>
-                <a:ext uri="{28A0092B-C50C-407E-A947-70E740481C1C}">
-                  <a14:useLocalDpi xmlns:a14="http://schemas.microsoft.com/office/drawing/2010/main" val="0"/>
-                </a:ext>
-              </a:extLst>
-            </a:blip>
-            <a:stretch>
-              <a:fillRect/>
-            </a:stretch>
-          </p:blipFill>
-          <p:spPr>
-            <a:xfrm>
-              <a:off x="8610184" y="3326511"/>
-              <a:ext cx="1578867" cy="1828804"/>
-            </a:xfrm>
-            <a:prstGeom prst="rect">
-              <a:avLst/>
-            </a:prstGeom>
-          </p:spPr>
-        </p:pic>
-      </p:grpSp>
-      <p:pic>
-        <p:nvPicPr>
-          <p:cNvPr id="12" name="Picture 11"/>
-          <p:cNvPicPr>
-            <a:picLocks noChangeAspect="1"/>
-          </p:cNvPicPr>
-          <p:nvPr/>
-        </p:nvPicPr>
-        <p:blipFill>
-          <a:blip r:embed="rId5" cstate="print">
-            <a:extLst>
-              <a:ext uri="{28A0092B-C50C-407E-A947-70E740481C1C}">
-                <a14:useLocalDpi xmlns:a14="http://schemas.microsoft.com/office/drawing/2010/main" val="0"/>
-              </a:ext>
-            </a:extLst>
-          </a:blip>
-          <a:stretch>
-            <a:fillRect/>
-          </a:stretch>
-        </p:blipFill>
-        <p:spPr>
-          <a:xfrm>
-            <a:off x="2035110" y="1019593"/>
-            <a:ext cx="1578867" cy="1828804"/>
-          </a:xfrm>
-          <a:prstGeom prst="rect">
-            <a:avLst/>
-          </a:prstGeom>
-        </p:spPr>
-      </p:pic>
-      <p:sp>
-        <p:nvSpPr>
-          <p:cNvPr id="15" name="TextBox 14"/>
-          <p:cNvSpPr txBox="1"/>
-          <p:nvPr/>
-        </p:nvSpPr>
-        <p:spPr>
-          <a:xfrm>
-            <a:off x="2107241" y="4130160"/>
-            <a:ext cx="5005769" cy="923330"/>
-          </a:xfrm>
-          <a:prstGeom prst="rect">
-            <a:avLst/>
-          </a:prstGeom>
-          <a:noFill/>
-        </p:spPr>
-        <p:txBody>
-          <a:bodyPr wrap="square" rtlCol="0">
-            <a:spAutoFit/>
-          </a:bodyPr>
-          <a:lstStyle/>
-          <a:p>
-            <a:pPr algn="ctr"/>
-            <a:r>
-              <a:rPr lang="en-US" dirty="0" smtClean="0"/>
-              <a:t>Chapter 10</a:t>
-            </a:r>
-            <a:endParaRPr lang="en-US" dirty="0"/>
-          </a:p>
-          <a:p>
-            <a:pPr algn="ctr"/>
-            <a:r>
-              <a:rPr lang="en-US" b="1" u="sng" dirty="0" smtClean="0"/>
-              <a:t>Simple Linear Regression</a:t>
-            </a:r>
-            <a:endParaRPr lang="en-US" dirty="0" smtClean="0"/>
-          </a:p>
-          <a:p>
-            <a:pPr algn="ctr"/>
-            <a:r>
-              <a:rPr lang="en-US" i="1" dirty="0" smtClean="0"/>
-              <a:t>chapter slides (majority)</a:t>
-            </a:r>
-          </a:p>
-        </p:txBody>
-      </p:sp>
-    </p:spTree>
-    <p:extLst>
-      <p:ext uri="{BB962C8B-B14F-4D97-AF65-F5344CB8AC3E}">
-        <p14:creationId xmlns:p14="http://schemas.microsoft.com/office/powerpoint/2010/main" val="2730707931"/>
       </p:ext>
     </p:extLst>
   </p:cSld>

</xml_diff>

<commit_message>
type-o model name HW 16 skeleton in R
</commit_message>
<xml_diff>
--- a/static/img/youtube_thumbnails/video_thumbnail_building.pptx
+++ b/static/img/youtube_thumbnails/video_thumbnail_building.pptx
@@ -5,31 +5,32 @@
     <p:sldMasterId id="2147483648" r:id="rId1"/>
   </p:sldMasterIdLst>
   <p:sldIdLst>
-    <p:sldId id="280" r:id="rId2"/>
-    <p:sldId id="279" r:id="rId3"/>
-    <p:sldId id="278" r:id="rId4"/>
-    <p:sldId id="277" r:id="rId5"/>
-    <p:sldId id="276" r:id="rId6"/>
-    <p:sldId id="275" r:id="rId7"/>
-    <p:sldId id="273" r:id="rId8"/>
-    <p:sldId id="274" r:id="rId9"/>
-    <p:sldId id="272" r:id="rId10"/>
-    <p:sldId id="271" r:id="rId11"/>
-    <p:sldId id="270" r:id="rId12"/>
-    <p:sldId id="259" r:id="rId13"/>
-    <p:sldId id="261" r:id="rId14"/>
-    <p:sldId id="260" r:id="rId15"/>
-    <p:sldId id="269" r:id="rId16"/>
-    <p:sldId id="268" r:id="rId17"/>
-    <p:sldId id="267" r:id="rId18"/>
-    <p:sldId id="266" r:id="rId19"/>
-    <p:sldId id="265" r:id="rId20"/>
-    <p:sldId id="264" r:id="rId21"/>
-    <p:sldId id="263" r:id="rId22"/>
-    <p:sldId id="262" r:id="rId23"/>
-    <p:sldId id="257" r:id="rId24"/>
-    <p:sldId id="256" r:id="rId25"/>
-    <p:sldId id="258" r:id="rId26"/>
+    <p:sldId id="281" r:id="rId2"/>
+    <p:sldId id="280" r:id="rId3"/>
+    <p:sldId id="279" r:id="rId4"/>
+    <p:sldId id="278" r:id="rId5"/>
+    <p:sldId id="277" r:id="rId6"/>
+    <p:sldId id="276" r:id="rId7"/>
+    <p:sldId id="275" r:id="rId8"/>
+    <p:sldId id="273" r:id="rId9"/>
+    <p:sldId id="274" r:id="rId10"/>
+    <p:sldId id="272" r:id="rId11"/>
+    <p:sldId id="271" r:id="rId12"/>
+    <p:sldId id="270" r:id="rId13"/>
+    <p:sldId id="259" r:id="rId14"/>
+    <p:sldId id="261" r:id="rId15"/>
+    <p:sldId id="260" r:id="rId16"/>
+    <p:sldId id="269" r:id="rId17"/>
+    <p:sldId id="268" r:id="rId18"/>
+    <p:sldId id="267" r:id="rId19"/>
+    <p:sldId id="266" r:id="rId20"/>
+    <p:sldId id="265" r:id="rId21"/>
+    <p:sldId id="264" r:id="rId22"/>
+    <p:sldId id="263" r:id="rId23"/>
+    <p:sldId id="262" r:id="rId24"/>
+    <p:sldId id="257" r:id="rId25"/>
+    <p:sldId id="256" r:id="rId26"/>
+    <p:sldId id="258" r:id="rId27"/>
   </p:sldIdLst>
   <p:sldSz cx="12192000" cy="6858000"/>
   <p:notesSz cx="6858000" cy="9144000"/>
@@ -3001,7 +3002,7 @@
         </p:nvSpPr>
         <p:spPr>
           <a:xfrm>
-            <a:off x="1808702" y="824230"/>
+            <a:off x="1853580" y="824230"/>
             <a:ext cx="8778240" cy="5010912"/>
           </a:xfrm>
           <a:prstGeom prst="rect">
@@ -3047,7 +3048,7 @@
         </p:nvSpPr>
         <p:spPr>
           <a:xfrm>
-            <a:off x="4184694" y="1065121"/>
+            <a:off x="3838696" y="1056832"/>
             <a:ext cx="5712369" cy="1754326"/>
           </a:xfrm>
           <a:prstGeom prst="rect">
@@ -3063,7 +3064,13 @@
           <a:p>
             <a:r>
               <a:rPr lang="en-US" sz="5400" dirty="0" smtClean="0"/>
-              <a:t>OUT-OF-CLASS LECTURES</a:t>
+              <a:t>Virtual </a:t>
+            </a:r>
+          </a:p>
+          <a:p>
+            <a:r>
+              <a:rPr lang="en-US" sz="5400" dirty="0" smtClean="0"/>
+              <a:t>Office Hours</a:t>
             </a:r>
             <a:endParaRPr lang="en-US" sz="5400" dirty="0"/>
           </a:p>
@@ -3094,11 +3101,15 @@
             <a:pPr algn="ctr"/>
             <a:r>
               <a:rPr lang="en-US" dirty="0" smtClean="0"/>
-              <a:t>April</a:t>
+              <a:t>April </a:t>
             </a:r>
             <a:r>
               <a:rPr lang="en-US" dirty="0" smtClean="0"/>
-              <a:t> 13, </a:t>
+              <a:t>14</a:t>
+            </a:r>
+            <a:r>
+              <a:rPr lang="en-US" dirty="0" smtClean="0"/>
+              <a:t>, </a:t>
             </a:r>
             <a:r>
               <a:rPr lang="en-US" dirty="0" smtClean="0"/>
@@ -3116,8 +3127,8 @@
         </p:nvSpPr>
         <p:spPr>
           <a:xfrm>
-            <a:off x="2136087" y="2916921"/>
-            <a:ext cx="5005769" cy="2308324"/>
+            <a:off x="1985351" y="3033699"/>
+            <a:ext cx="5005769" cy="923330"/>
           </a:xfrm>
           <a:prstGeom prst="rect">
             <a:avLst/>
@@ -3133,76 +3144,28 @@
             <a:pPr algn="ctr"/>
             <a:r>
               <a:rPr lang="en-US" dirty="0" smtClean="0"/>
-              <a:t>Chapter </a:t>
+              <a:t>HW </a:t>
             </a:r>
             <a:r>
               <a:rPr lang="en-US" dirty="0" smtClean="0"/>
-              <a:t>15</a:t>
+              <a:t>15 </a:t>
             </a:r>
             <a:endParaRPr lang="en-US" dirty="0"/>
           </a:p>
           <a:p>
             <a:pPr algn="ctr"/>
             <a:r>
+              <a:rPr lang="en-US" b="1" u="sng" dirty="0"/>
+              <a:t>1</a:t>
+            </a:r>
+            <a:r>
               <a:rPr lang="en-US" b="1" u="sng" dirty="0" smtClean="0"/>
-              <a:t>Repeated </a:t>
-            </a:r>
-            <a:r>
-              <a:rPr lang="en-US" b="1" u="sng" dirty="0" err="1" smtClean="0"/>
-              <a:t>Measurs</a:t>
-            </a:r>
-            <a:r>
-              <a:rPr lang="en-US" b="1" u="sng" dirty="0" smtClean="0"/>
-              <a:t> </a:t>
-            </a:r>
-            <a:r>
-              <a:rPr lang="en-US" b="1" u="sng" dirty="0" smtClean="0"/>
-              <a:t>ANOVA</a:t>
-            </a:r>
-            <a:endParaRPr lang="en-US" b="1" u="sng" dirty="0"/>
-          </a:p>
-          <a:p>
-            <a:pPr algn="ctr"/>
-            <a:r>
-              <a:rPr lang="en-US" i="1" dirty="0" smtClean="0"/>
-              <a:t>2-way RM ANOVA</a:t>
-            </a:r>
-          </a:p>
-          <a:p>
-            <a:pPr algn="ctr"/>
-            <a:r>
-              <a:rPr lang="en-US" i="1" dirty="0" smtClean="0"/>
-              <a:t>Effect Sizes</a:t>
-            </a:r>
-          </a:p>
-          <a:p>
-            <a:pPr algn="ctr"/>
-            <a:r>
-              <a:rPr lang="en-US" i="1" dirty="0" smtClean="0"/>
-              <a:t>Follow-up test &amp; Multiple Comparisons</a:t>
-            </a:r>
-          </a:p>
-          <a:p>
-            <a:pPr algn="ctr"/>
-            <a:r>
-              <a:rPr lang="en-US" i="1" dirty="0" smtClean="0"/>
-              <a:t>Interaction</a:t>
-            </a:r>
-          </a:p>
-          <a:p>
-            <a:pPr algn="ctr"/>
-            <a:r>
-              <a:rPr lang="en-US" i="1" dirty="0" smtClean="0"/>
-              <a:t>Reporting Results</a:t>
-            </a:r>
-          </a:p>
-          <a:p>
-            <a:pPr algn="ctr"/>
-            <a:r>
-              <a:rPr lang="en-US" i="1" dirty="0" smtClean="0"/>
-              <a:t>Slides 37-end</a:t>
-            </a:r>
-            <a:endParaRPr lang="en-US" i="1" dirty="0"/>
+              <a:t>-way RM ANOVAs</a:t>
+            </a:r>
+          </a:p>
+          <a:p>
+            <a:pPr algn="ctr"/>
+            <a:endParaRPr lang="en-US" dirty="0" smtClean="0"/>
           </a:p>
         </p:txBody>
       </p:sp>
@@ -3343,55 +3306,38 @@
       </p:pic>
       <p:pic>
         <p:nvPicPr>
-          <p:cNvPr id="1026" name="Picture 2" descr="Image result for virus"/>
+          <p:cNvPr id="5" name="Picture 4"/>
           <p:cNvPicPr>
-            <a:picLocks noChangeAspect="1" noChangeArrowheads="1"/>
+            <a:picLocks noChangeAspect="1"/>
           </p:cNvPicPr>
           <p:nvPr/>
         </p:nvPicPr>
         <p:blipFill>
-          <a:blip r:embed="rId6" cstate="print">
-            <a:extLst>
-              <a:ext uri="{28A0092B-C50C-407E-A947-70E740481C1C}">
-                <a14:useLocalDpi xmlns:a14="http://schemas.microsoft.com/office/drawing/2010/main" val="0"/>
-              </a:ext>
-            </a:extLst>
-          </a:blip>
-          <a:srcRect/>
+          <a:blip r:embed="rId6"/>
           <a:stretch>
             <a:fillRect/>
           </a:stretch>
         </p:blipFill>
-        <p:spPr bwMode="auto">
-          <a:xfrm>
-            <a:off x="1908176" y="4866721"/>
-            <a:ext cx="825034" cy="824421"/>
-          </a:xfrm>
-          <a:prstGeom prst="rect">
-            <a:avLst/>
-          </a:prstGeom>
-          <a:noFill/>
-          <a:extLst>
-            <a:ext uri="{909E8E84-426E-40DD-AFC4-6F175D3DCCD1}">
-              <a14:hiddenFill xmlns:a14="http://schemas.microsoft.com/office/drawing/2010/main">
-                <a:solidFill>
-                  <a:srgbClr val="FFFFFF"/>
-                </a:solidFill>
-              </a14:hiddenFill>
-            </a:ext>
-          </a:extLst>
+        <p:spPr>
+          <a:xfrm>
+            <a:off x="1985351" y="4872564"/>
+            <a:ext cx="1853345" cy="853514"/>
+          </a:xfrm>
+          <a:prstGeom prst="rect">
+            <a:avLst/>
+          </a:prstGeom>
         </p:spPr>
       </p:pic>
       <p:sp>
         <p:nvSpPr>
-          <p:cNvPr id="13" name="TextBox 12"/>
+          <p:cNvPr id="17" name="TextBox 16"/>
           <p:cNvSpPr txBox="1"/>
           <p:nvPr/>
         </p:nvSpPr>
         <p:spPr>
           <a:xfrm>
-            <a:off x="2524444" y="5254195"/>
-            <a:ext cx="1238954" cy="369332"/>
+            <a:off x="2735076" y="4097297"/>
+            <a:ext cx="5005769" cy="923330"/>
           </a:xfrm>
           <a:prstGeom prst="rect">
             <a:avLst/>
@@ -3406,29 +3352,36 @@
           <a:p>
             <a:pPr algn="ctr"/>
             <a:r>
-              <a:rPr lang="en-US" b="1" dirty="0" smtClean="0">
-                <a:solidFill>
-                  <a:schemeClr val="accent1">
-                    <a:lumMod val="75000"/>
-                  </a:schemeClr>
-                </a:solidFill>
-              </a:rPr>
-              <a:t>Covid-19</a:t>
-            </a:r>
-            <a:endParaRPr lang="en-US" b="1" dirty="0">
-              <a:solidFill>
-                <a:schemeClr val="accent1">
-                  <a:lumMod val="75000"/>
-                </a:schemeClr>
-              </a:solidFill>
-            </a:endParaRPr>
+              <a:rPr lang="en-US" dirty="0" smtClean="0"/>
+              <a:t>HW </a:t>
+            </a:r>
+            <a:r>
+              <a:rPr lang="en-US" dirty="0" smtClean="0"/>
+              <a:t>16</a:t>
+            </a:r>
+            <a:endParaRPr lang="en-US" dirty="0"/>
+          </a:p>
+          <a:p>
+            <a:pPr algn="ctr"/>
+            <a:r>
+              <a:rPr lang="en-US" b="1" u="sng" dirty="0" smtClean="0"/>
+              <a:t>Mixed </a:t>
+            </a:r>
+            <a:r>
+              <a:rPr lang="en-US" b="1" u="sng" dirty="0" smtClean="0"/>
+              <a:t>ANOVAs</a:t>
+            </a:r>
+          </a:p>
+          <a:p>
+            <a:pPr algn="ctr"/>
+            <a:endParaRPr lang="en-US" dirty="0" smtClean="0"/>
           </a:p>
         </p:txBody>
       </p:sp>
     </p:spTree>
     <p:extLst>
       <p:ext uri="{BB962C8B-B14F-4D97-AF65-F5344CB8AC3E}">
-        <p14:creationId xmlns:p14="http://schemas.microsoft.com/office/powerpoint/2010/main" val="2525452429"/>
+        <p14:creationId xmlns:p14="http://schemas.microsoft.com/office/powerpoint/2010/main" val="2620031016"/>
       </p:ext>
     </p:extLst>
   </p:cSld>
@@ -3439,6 +3392,406 @@
 </file>
 
 <file path=ppt/slides/slide10.xml><?xml version="1.0" encoding="utf-8"?>
+<p:sld xmlns:a="http://schemas.openxmlformats.org/drawingml/2006/main" xmlns:r="http://schemas.openxmlformats.org/officeDocument/2006/relationships" xmlns:p="http://schemas.openxmlformats.org/presentationml/2006/main">
+  <p:cSld>
+    <p:spTree>
+      <p:nvGrpSpPr>
+        <p:cNvPr id="1" name=""/>
+        <p:cNvGrpSpPr/>
+        <p:nvPr/>
+      </p:nvGrpSpPr>
+      <p:grpSpPr>
+        <a:xfrm>
+          <a:off x="0" y="0"/>
+          <a:ext cx="0" cy="0"/>
+          <a:chOff x="0" y="0"/>
+          <a:chExt cx="0" cy="0"/>
+        </a:xfrm>
+      </p:grpSpPr>
+      <p:sp>
+        <p:nvSpPr>
+          <p:cNvPr id="4" name="Rectangle 3"/>
+          <p:cNvSpPr/>
+          <p:nvPr/>
+        </p:nvSpPr>
+        <p:spPr>
+          <a:xfrm>
+            <a:off x="1853580" y="824230"/>
+            <a:ext cx="8778240" cy="5010912"/>
+          </a:xfrm>
+          <a:prstGeom prst="rect">
+            <a:avLst/>
+          </a:prstGeom>
+          <a:solidFill>
+            <a:schemeClr val="bg1">
+              <a:lumMod val="95000"/>
+            </a:schemeClr>
+          </a:solidFill>
+          <a:ln w="38100"/>
+        </p:spPr>
+        <p:style>
+          <a:lnRef idx="2">
+            <a:schemeClr val="accent1">
+              <a:shade val="50000"/>
+            </a:schemeClr>
+          </a:lnRef>
+          <a:fillRef idx="1">
+            <a:schemeClr val="accent1"/>
+          </a:fillRef>
+          <a:effectRef idx="0">
+            <a:schemeClr val="accent1"/>
+          </a:effectRef>
+          <a:fontRef idx="minor">
+            <a:schemeClr val="lt1"/>
+          </a:fontRef>
+        </p:style>
+        <p:txBody>
+          <a:bodyPr rtlCol="0" anchor="ctr"/>
+          <a:lstStyle/>
+          <a:p>
+            <a:pPr algn="ctr"/>
+            <a:endParaRPr lang="en-US"/>
+          </a:p>
+        </p:txBody>
+      </p:sp>
+      <p:sp>
+        <p:nvSpPr>
+          <p:cNvPr id="7" name="TextBox 6"/>
+          <p:cNvSpPr txBox="1"/>
+          <p:nvPr/>
+        </p:nvSpPr>
+        <p:spPr>
+          <a:xfrm>
+            <a:off x="3838696" y="1056832"/>
+            <a:ext cx="5712369" cy="1754326"/>
+          </a:xfrm>
+          <a:prstGeom prst="rect">
+            <a:avLst/>
+          </a:prstGeom>
+          <a:noFill/>
+        </p:spPr>
+        <p:txBody>
+          <a:bodyPr wrap="square" rtlCol="0">
+            <a:spAutoFit/>
+          </a:bodyPr>
+          <a:lstStyle/>
+          <a:p>
+            <a:r>
+              <a:rPr lang="en-US" sz="5400" dirty="0" smtClean="0"/>
+              <a:t>Virtual </a:t>
+            </a:r>
+          </a:p>
+          <a:p>
+            <a:r>
+              <a:rPr lang="en-US" sz="5400" dirty="0" smtClean="0"/>
+              <a:t>Office Hours</a:t>
+            </a:r>
+            <a:endParaRPr lang="en-US" sz="5400" dirty="0"/>
+          </a:p>
+        </p:txBody>
+      </p:sp>
+      <p:sp>
+        <p:nvSpPr>
+          <p:cNvPr id="8" name="TextBox 7"/>
+          <p:cNvSpPr txBox="1"/>
+          <p:nvPr/>
+        </p:nvSpPr>
+        <p:spPr>
+          <a:xfrm>
+            <a:off x="7731444" y="5278932"/>
+            <a:ext cx="2076450" cy="369332"/>
+          </a:xfrm>
+          <a:prstGeom prst="rect">
+            <a:avLst/>
+          </a:prstGeom>
+          <a:noFill/>
+        </p:spPr>
+        <p:txBody>
+          <a:bodyPr wrap="square" rtlCol="0">
+            <a:spAutoFit/>
+          </a:bodyPr>
+          <a:lstStyle/>
+          <a:p>
+            <a:pPr algn="ctr"/>
+            <a:r>
+              <a:rPr lang="en-US" dirty="0" smtClean="0"/>
+              <a:t>March 25, 2020</a:t>
+            </a:r>
+            <a:endParaRPr lang="en-US" dirty="0"/>
+          </a:p>
+        </p:txBody>
+      </p:sp>
+      <p:sp>
+        <p:nvSpPr>
+          <p:cNvPr id="9" name="TextBox 8"/>
+          <p:cNvSpPr txBox="1"/>
+          <p:nvPr/>
+        </p:nvSpPr>
+        <p:spPr>
+          <a:xfrm>
+            <a:off x="2023325" y="2848397"/>
+            <a:ext cx="5005769" cy="1200329"/>
+          </a:xfrm>
+          <a:prstGeom prst="rect">
+            <a:avLst/>
+          </a:prstGeom>
+          <a:noFill/>
+        </p:spPr>
+        <p:txBody>
+          <a:bodyPr wrap="square" rtlCol="0">
+            <a:spAutoFit/>
+          </a:bodyPr>
+          <a:lstStyle/>
+          <a:p>
+            <a:pPr algn="ctr"/>
+            <a:r>
+              <a:rPr lang="en-US" dirty="0" smtClean="0"/>
+              <a:t>HW 13 </a:t>
+            </a:r>
+            <a:endParaRPr lang="en-US" dirty="0"/>
+          </a:p>
+          <a:p>
+            <a:pPr algn="ctr"/>
+            <a:r>
+              <a:rPr lang="en-US" b="1" u="sng" dirty="0" smtClean="0"/>
+              <a:t>Multiple Comparisons: pairwise &amp; linear contrasts</a:t>
+            </a:r>
+          </a:p>
+          <a:p>
+            <a:pPr algn="ctr"/>
+            <a:r>
+              <a:rPr lang="en-US" dirty="0" smtClean="0"/>
+              <a:t>Items # 5 &amp; 6</a:t>
+            </a:r>
+          </a:p>
+          <a:p>
+            <a:pPr algn="ctr"/>
+            <a:endParaRPr lang="en-US" b="1" dirty="0"/>
+          </a:p>
+        </p:txBody>
+      </p:sp>
+      <p:grpSp>
+        <p:nvGrpSpPr>
+          <p:cNvPr id="14" name="Group 13"/>
+          <p:cNvGrpSpPr/>
+          <p:nvPr/>
+        </p:nvGrpSpPr>
+        <p:grpSpPr>
+          <a:xfrm>
+            <a:off x="7198839" y="2137179"/>
+            <a:ext cx="3141660" cy="3193339"/>
+            <a:chOff x="7047391" y="1961976"/>
+            <a:chExt cx="3141660" cy="3193339"/>
+          </a:xfrm>
+        </p:grpSpPr>
+        <p:pic>
+          <p:nvPicPr>
+            <p:cNvPr id="2" name="Picture 1"/>
+            <p:cNvPicPr>
+              <a:picLocks noChangeAspect="1"/>
+            </p:cNvPicPr>
+            <p:nvPr/>
+          </p:nvPicPr>
+          <p:blipFill>
+            <a:blip r:embed="rId2" cstate="print">
+              <a:extLst>
+                <a:ext uri="{28A0092B-C50C-407E-A947-70E740481C1C}">
+                  <a14:useLocalDpi xmlns:a14="http://schemas.microsoft.com/office/drawing/2010/main" val="0"/>
+                </a:ext>
+              </a:extLst>
+            </a:blip>
+            <a:stretch>
+              <a:fillRect/>
+            </a:stretch>
+          </p:blipFill>
+          <p:spPr>
+            <a:xfrm>
+              <a:off x="7047391" y="3320161"/>
+              <a:ext cx="1578867" cy="1828804"/>
+            </a:xfrm>
+            <a:prstGeom prst="rect">
+              <a:avLst/>
+            </a:prstGeom>
+          </p:spPr>
+        </p:pic>
+        <p:pic>
+          <p:nvPicPr>
+            <p:cNvPr id="3" name="Picture 2"/>
+            <p:cNvPicPr>
+              <a:picLocks noChangeAspect="1"/>
+            </p:cNvPicPr>
+            <p:nvPr/>
+          </p:nvPicPr>
+          <p:blipFill>
+            <a:blip r:embed="rId3" cstate="print">
+              <a:extLst>
+                <a:ext uri="{28A0092B-C50C-407E-A947-70E740481C1C}">
+                  <a14:useLocalDpi xmlns:a14="http://schemas.microsoft.com/office/drawing/2010/main" val="0"/>
+                </a:ext>
+              </a:extLst>
+            </a:blip>
+            <a:stretch>
+              <a:fillRect/>
+            </a:stretch>
+          </p:blipFill>
+          <p:spPr>
+            <a:xfrm>
+              <a:off x="7830475" y="1961976"/>
+              <a:ext cx="1578867" cy="1828804"/>
+            </a:xfrm>
+            <a:prstGeom prst="rect">
+              <a:avLst/>
+            </a:prstGeom>
+          </p:spPr>
+        </p:pic>
+        <p:pic>
+          <p:nvPicPr>
+            <p:cNvPr id="11" name="Picture 10"/>
+            <p:cNvPicPr>
+              <a:picLocks noChangeAspect="1"/>
+            </p:cNvPicPr>
+            <p:nvPr/>
+          </p:nvPicPr>
+          <p:blipFill>
+            <a:blip r:embed="rId4" cstate="print">
+              <a:extLst>
+                <a:ext uri="{28A0092B-C50C-407E-A947-70E740481C1C}">
+                  <a14:useLocalDpi xmlns:a14="http://schemas.microsoft.com/office/drawing/2010/main" val="0"/>
+                </a:ext>
+              </a:extLst>
+            </a:blip>
+            <a:stretch>
+              <a:fillRect/>
+            </a:stretch>
+          </p:blipFill>
+          <p:spPr>
+            <a:xfrm>
+              <a:off x="8610184" y="3326511"/>
+              <a:ext cx="1578867" cy="1828804"/>
+            </a:xfrm>
+            <a:prstGeom prst="rect">
+              <a:avLst/>
+            </a:prstGeom>
+          </p:spPr>
+        </p:pic>
+      </p:grpSp>
+      <p:pic>
+        <p:nvPicPr>
+          <p:cNvPr id="12" name="Picture 11"/>
+          <p:cNvPicPr>
+            <a:picLocks noChangeAspect="1"/>
+          </p:cNvPicPr>
+          <p:nvPr/>
+        </p:nvPicPr>
+        <p:blipFill>
+          <a:blip r:embed="rId5" cstate="print">
+            <a:extLst>
+              <a:ext uri="{28A0092B-C50C-407E-A947-70E740481C1C}">
+                <a14:useLocalDpi xmlns:a14="http://schemas.microsoft.com/office/drawing/2010/main" val="0"/>
+              </a:ext>
+            </a:extLst>
+          </a:blip>
+          <a:stretch>
+            <a:fillRect/>
+          </a:stretch>
+        </p:blipFill>
+        <p:spPr>
+          <a:xfrm>
+            <a:off x="2035110" y="1019593"/>
+            <a:ext cx="1578867" cy="1828804"/>
+          </a:xfrm>
+          <a:prstGeom prst="rect">
+            <a:avLst/>
+          </a:prstGeom>
+        </p:spPr>
+      </p:pic>
+      <p:sp>
+        <p:nvSpPr>
+          <p:cNvPr id="13" name="TextBox 12"/>
+          <p:cNvSpPr txBox="1"/>
+          <p:nvPr/>
+        </p:nvSpPr>
+        <p:spPr>
+          <a:xfrm>
+            <a:off x="2023324" y="3965983"/>
+            <a:ext cx="5005769" cy="1200329"/>
+          </a:xfrm>
+          <a:prstGeom prst="rect">
+            <a:avLst/>
+          </a:prstGeom>
+          <a:noFill/>
+        </p:spPr>
+        <p:txBody>
+          <a:bodyPr wrap="square" rtlCol="0">
+            <a:spAutoFit/>
+          </a:bodyPr>
+          <a:lstStyle/>
+          <a:p>
+            <a:pPr algn="ctr"/>
+            <a:r>
+              <a:rPr lang="en-US" dirty="0" smtClean="0"/>
+              <a:t>HW 12 </a:t>
+            </a:r>
+            <a:endParaRPr lang="en-US" dirty="0"/>
+          </a:p>
+          <a:p>
+            <a:pPr algn="ctr"/>
+            <a:r>
+              <a:rPr lang="en-US" b="1" u="sng" dirty="0" smtClean="0"/>
+              <a:t>One-way, independent groups ANOVA</a:t>
+            </a:r>
+          </a:p>
+          <a:p>
+            <a:pPr algn="ctr"/>
+            <a:r>
+              <a:rPr lang="en-US" dirty="0" smtClean="0"/>
+              <a:t>Items with APA methods/results</a:t>
+            </a:r>
+          </a:p>
+          <a:p>
+            <a:pPr algn="ctr"/>
+            <a:endParaRPr lang="en-US" b="1" dirty="0"/>
+          </a:p>
+        </p:txBody>
+      </p:sp>
+      <p:pic>
+        <p:nvPicPr>
+          <p:cNvPr id="5" name="Picture 4"/>
+          <p:cNvPicPr>
+            <a:picLocks noChangeAspect="1"/>
+          </p:cNvPicPr>
+          <p:nvPr/>
+        </p:nvPicPr>
+        <p:blipFill>
+          <a:blip r:embed="rId6"/>
+          <a:stretch>
+            <a:fillRect/>
+          </a:stretch>
+        </p:blipFill>
+        <p:spPr>
+          <a:xfrm>
+            <a:off x="1985351" y="4872564"/>
+            <a:ext cx="1853345" cy="853514"/>
+          </a:xfrm>
+          <a:prstGeom prst="rect">
+            <a:avLst/>
+          </a:prstGeom>
+        </p:spPr>
+      </p:pic>
+    </p:spTree>
+    <p:extLst>
+      <p:ext uri="{BB962C8B-B14F-4D97-AF65-F5344CB8AC3E}">
+        <p14:creationId xmlns:p14="http://schemas.microsoft.com/office/powerpoint/2010/main" val="636154248"/>
+      </p:ext>
+    </p:extLst>
+  </p:cSld>
+  <p:clrMapOvr>
+    <a:masterClrMapping/>
+  </p:clrMapOvr>
+</p:sld>
+</file>
+
+<file path=ppt/slides/slide11.xml><?xml version="1.0" encoding="utf-8"?>
 <p:sld xmlns:a="http://schemas.openxmlformats.org/drawingml/2006/main" xmlns:r="http://schemas.openxmlformats.org/officeDocument/2006/relationships" xmlns:p="http://schemas.openxmlformats.org/presentationml/2006/main">
   <p:cSld>
     <p:spTree>
@@ -3886,7 +4239,7 @@
 </p:sld>
 </file>
 
-<file path=ppt/slides/slide11.xml><?xml version="1.0" encoding="utf-8"?>
+<file path=ppt/slides/slide12.xml><?xml version="1.0" encoding="utf-8"?>
 <p:sld xmlns:a="http://schemas.openxmlformats.org/drawingml/2006/main" xmlns:r="http://schemas.openxmlformats.org/officeDocument/2006/relationships" xmlns:p="http://schemas.openxmlformats.org/presentationml/2006/main">
   <p:cSld>
     <p:spTree>
@@ -4296,7 +4649,7 @@
 </p:sld>
 </file>
 
-<file path=ppt/slides/slide12.xml><?xml version="1.0" encoding="utf-8"?>
+<file path=ppt/slides/slide13.xml><?xml version="1.0" encoding="utf-8"?>
 <p:sld xmlns:a="http://schemas.openxmlformats.org/drawingml/2006/main" xmlns:r="http://schemas.openxmlformats.org/officeDocument/2006/relationships" xmlns:p="http://schemas.openxmlformats.org/presentationml/2006/main">
   <p:cSld>
     <p:spTree>
@@ -4631,7 +4984,7 @@
 </p:sld>
 </file>
 
-<file path=ppt/slides/slide13.xml><?xml version="1.0" encoding="utf-8"?>
+<file path=ppt/slides/slide14.xml><?xml version="1.0" encoding="utf-8"?>
 <p:sld xmlns:a="http://schemas.openxmlformats.org/drawingml/2006/main" xmlns:r="http://schemas.openxmlformats.org/officeDocument/2006/relationships" xmlns:p="http://schemas.openxmlformats.org/presentationml/2006/main">
   <p:cSld>
     <p:spTree>
@@ -4949,7 +5302,7 @@
 </p:sld>
 </file>
 
-<file path=ppt/slides/slide14.xml><?xml version="1.0" encoding="utf-8"?>
+<file path=ppt/slides/slide15.xml><?xml version="1.0" encoding="utf-8"?>
 <p:sld xmlns:a="http://schemas.openxmlformats.org/drawingml/2006/main" xmlns:r="http://schemas.openxmlformats.org/officeDocument/2006/relationships" xmlns:p="http://schemas.openxmlformats.org/presentationml/2006/main">
   <p:cSld>
     <p:spTree>
@@ -5276,7 +5629,7 @@
 </p:sld>
 </file>
 
-<file path=ppt/slides/slide15.xml><?xml version="1.0" encoding="utf-8"?>
+<file path=ppt/slides/slide16.xml><?xml version="1.0" encoding="utf-8"?>
 <p:sld xmlns:a="http://schemas.openxmlformats.org/drawingml/2006/main" xmlns:r="http://schemas.openxmlformats.org/officeDocument/2006/relationships" xmlns:p="http://schemas.openxmlformats.org/presentationml/2006/main">
   <p:cSld>
     <p:spTree>
@@ -5601,7 +5954,7 @@
 </p:sld>
 </file>
 
-<file path=ppt/slides/slide16.xml><?xml version="1.0" encoding="utf-8"?>
+<file path=ppt/slides/slide17.xml><?xml version="1.0" encoding="utf-8"?>
 <p:sld xmlns:a="http://schemas.openxmlformats.org/drawingml/2006/main" xmlns:r="http://schemas.openxmlformats.org/officeDocument/2006/relationships" xmlns:p="http://schemas.openxmlformats.org/presentationml/2006/main">
   <p:cSld>
     <p:spTree>
@@ -5926,7 +6279,7 @@
 </p:sld>
 </file>
 
-<file path=ppt/slides/slide17.xml><?xml version="1.0" encoding="utf-8"?>
+<file path=ppt/slides/slide18.xml><?xml version="1.0" encoding="utf-8"?>
 <p:sld xmlns:a="http://schemas.openxmlformats.org/drawingml/2006/main" xmlns:r="http://schemas.openxmlformats.org/officeDocument/2006/relationships" xmlns:p="http://schemas.openxmlformats.org/presentationml/2006/main">
   <p:cSld>
     <p:spTree>
@@ -6293,7 +6646,7 @@
 </p:sld>
 </file>
 
-<file path=ppt/slides/slide18.xml><?xml version="1.0" encoding="utf-8"?>
+<file path=ppt/slides/slide19.xml><?xml version="1.0" encoding="utf-8"?>
 <p:sld xmlns:a="http://schemas.openxmlformats.org/drawingml/2006/main" xmlns:r="http://schemas.openxmlformats.org/officeDocument/2006/relationships" xmlns:p="http://schemas.openxmlformats.org/presentationml/2006/main">
   <p:cSld>
     <p:spTree>
@@ -6677,7 +7030,7 @@
 </p:sld>
 </file>
 
-<file path=ppt/slides/slide19.xml><?xml version="1.0" encoding="utf-8"?>
+<file path=ppt/slides/slide2.xml><?xml version="1.0" encoding="utf-8"?>
 <p:sld xmlns:a="http://schemas.openxmlformats.org/drawingml/2006/main" xmlns:r="http://schemas.openxmlformats.org/officeDocument/2006/relationships" xmlns:p="http://schemas.openxmlformats.org/presentationml/2006/main">
   <p:cSld>
     <p:spTree>
@@ -6748,8 +7101,8 @@
         </p:nvSpPr>
         <p:spPr>
           <a:xfrm>
-            <a:off x="3840385" y="1213849"/>
-            <a:ext cx="5712369" cy="923330"/>
+            <a:off x="4184694" y="1065121"/>
+            <a:ext cx="5712369" cy="1754326"/>
           </a:xfrm>
           <a:prstGeom prst="rect">
             <a:avLst/>
@@ -6764,7 +7117,7 @@
           <a:p>
             <a:r>
               <a:rPr lang="en-US" sz="5400" dirty="0" smtClean="0"/>
-              <a:t>INCLASS LECTURES</a:t>
+              <a:t>OUT-OF-CLASS LECTURES</a:t>
             </a:r>
             <a:endParaRPr lang="en-US" sz="5400" dirty="0"/>
           </a:p>
@@ -6795,7 +7148,15 @@
             <a:pPr algn="ctr"/>
             <a:r>
               <a:rPr lang="en-US" dirty="0" smtClean="0"/>
-              <a:t>Feb. 10, 2020</a:t>
+              <a:t>April</a:t>
+            </a:r>
+            <a:r>
+              <a:rPr lang="en-US" dirty="0" smtClean="0"/>
+              <a:t> 13, </a:t>
+            </a:r>
+            <a:r>
+              <a:rPr lang="en-US" dirty="0" smtClean="0"/>
+              <a:t>2020</a:t>
             </a:r>
             <a:endParaRPr lang="en-US" dirty="0"/>
           </a:p>
@@ -6809,8 +7170,8 @@
         </p:nvSpPr>
         <p:spPr>
           <a:xfrm>
-            <a:off x="2035110" y="3043759"/>
-            <a:ext cx="5005769" cy="923330"/>
+            <a:off x="2136087" y="2916921"/>
+            <a:ext cx="5005769" cy="2308324"/>
           </a:xfrm>
           <a:prstGeom prst="rect">
             <a:avLst/>
@@ -6829,26 +7190,71 @@
               <a:t>Chapter </a:t>
             </a:r>
             <a:r>
-              <a:rPr lang="en-US" dirty="0"/>
-              <a:t>7</a:t>
-            </a:r>
-          </a:p>
-          <a:p>
-            <a:pPr algn="ctr"/>
-            <a:r>
-              <a:rPr lang="en-US" b="1" u="sng" dirty="0"/>
-              <a:t>Independent Samples t-Test for </a:t>
-            </a:r>
+              <a:rPr lang="en-US" dirty="0" smtClean="0"/>
+              <a:t>15</a:t>
+            </a:r>
+            <a:endParaRPr lang="en-US" dirty="0"/>
+          </a:p>
+          <a:p>
+            <a:pPr algn="ctr"/>
             <a:r>
               <a:rPr lang="en-US" b="1" u="sng" dirty="0" smtClean="0"/>
-              <a:t>Means</a:t>
-            </a:r>
+              <a:t>Repeated </a:t>
+            </a:r>
+            <a:r>
+              <a:rPr lang="en-US" b="1" u="sng" dirty="0" err="1" smtClean="0"/>
+              <a:t>Measurs</a:t>
+            </a:r>
+            <a:r>
+              <a:rPr lang="en-US" b="1" u="sng" dirty="0" smtClean="0"/>
+              <a:t> </a:t>
+            </a:r>
+            <a:r>
+              <a:rPr lang="en-US" b="1" u="sng" dirty="0" smtClean="0"/>
+              <a:t>ANOVA</a:t>
+            </a:r>
+            <a:endParaRPr lang="en-US" b="1" u="sng" dirty="0"/>
           </a:p>
           <a:p>
             <a:pPr algn="ctr"/>
             <a:r>
               <a:rPr lang="en-US" i="1" dirty="0" smtClean="0"/>
-              <a:t>Mostly Homework Helps</a:t>
+              <a:t>2-way RM ANOVA</a:t>
+            </a:r>
+          </a:p>
+          <a:p>
+            <a:pPr algn="ctr"/>
+            <a:r>
+              <a:rPr lang="en-US" i="1" dirty="0" smtClean="0"/>
+              <a:t>Effect Sizes</a:t>
+            </a:r>
+          </a:p>
+          <a:p>
+            <a:pPr algn="ctr"/>
+            <a:r>
+              <a:rPr lang="en-US" i="1" dirty="0" smtClean="0"/>
+              <a:t>Follow-up test &amp; Multiple Comparisons</a:t>
+            </a:r>
+          </a:p>
+          <a:p>
+            <a:pPr algn="ctr"/>
+            <a:r>
+              <a:rPr lang="en-US" i="1" dirty="0" smtClean="0"/>
+              <a:t>Interaction</a:t>
+            </a:r>
+          </a:p>
+          <a:p>
+            <a:pPr algn="ctr"/>
+            <a:r>
+              <a:rPr lang="en-US" i="1" dirty="0" smtClean="0"/>
+              <a:t>Reporting Results</a:t>
+            </a:r>
+          </a:p>
+          <a:p>
+            <a:pPr algn="ctr"/>
+            <a:r>
+              <a:rPr lang="en-US" i="1" dirty="0" smtClean="0"/>
+              <a:t>Slides 37-end</a:t>
             </a:r>
             <a:endParaRPr lang="en-US" i="1" dirty="0"/>
           </a:p>
@@ -6989,10 +7395,94 @@
           </a:prstGeom>
         </p:spPr>
       </p:pic>
+      <p:pic>
+        <p:nvPicPr>
+          <p:cNvPr id="1026" name="Picture 2" descr="Image result for virus"/>
+          <p:cNvPicPr>
+            <a:picLocks noChangeAspect="1" noChangeArrowheads="1"/>
+          </p:cNvPicPr>
+          <p:nvPr/>
+        </p:nvPicPr>
+        <p:blipFill>
+          <a:blip r:embed="rId6" cstate="print">
+            <a:extLst>
+              <a:ext uri="{28A0092B-C50C-407E-A947-70E740481C1C}">
+                <a14:useLocalDpi xmlns:a14="http://schemas.microsoft.com/office/drawing/2010/main" val="0"/>
+              </a:ext>
+            </a:extLst>
+          </a:blip>
+          <a:srcRect/>
+          <a:stretch>
+            <a:fillRect/>
+          </a:stretch>
+        </p:blipFill>
+        <p:spPr bwMode="auto">
+          <a:xfrm>
+            <a:off x="1908176" y="4866721"/>
+            <a:ext cx="825034" cy="824421"/>
+          </a:xfrm>
+          <a:prstGeom prst="rect">
+            <a:avLst/>
+          </a:prstGeom>
+          <a:noFill/>
+          <a:extLst>
+            <a:ext uri="{909E8E84-426E-40DD-AFC4-6F175D3DCCD1}">
+              <a14:hiddenFill xmlns:a14="http://schemas.microsoft.com/office/drawing/2010/main">
+                <a:solidFill>
+                  <a:srgbClr val="FFFFFF"/>
+                </a:solidFill>
+              </a14:hiddenFill>
+            </a:ext>
+          </a:extLst>
+        </p:spPr>
+      </p:pic>
+      <p:sp>
+        <p:nvSpPr>
+          <p:cNvPr id="13" name="TextBox 12"/>
+          <p:cNvSpPr txBox="1"/>
+          <p:nvPr/>
+        </p:nvSpPr>
+        <p:spPr>
+          <a:xfrm>
+            <a:off x="2524444" y="5254195"/>
+            <a:ext cx="1238954" cy="369332"/>
+          </a:xfrm>
+          <a:prstGeom prst="rect">
+            <a:avLst/>
+          </a:prstGeom>
+          <a:noFill/>
+        </p:spPr>
+        <p:txBody>
+          <a:bodyPr wrap="square" rtlCol="0">
+            <a:spAutoFit/>
+          </a:bodyPr>
+          <a:lstStyle/>
+          <a:p>
+            <a:pPr algn="ctr"/>
+            <a:r>
+              <a:rPr lang="en-US" b="1" dirty="0" smtClean="0">
+                <a:solidFill>
+                  <a:schemeClr val="accent1">
+                    <a:lumMod val="75000"/>
+                  </a:schemeClr>
+                </a:solidFill>
+              </a:rPr>
+              <a:t>Covid-19</a:t>
+            </a:r>
+            <a:endParaRPr lang="en-US" b="1" dirty="0">
+              <a:solidFill>
+                <a:schemeClr val="accent1">
+                  <a:lumMod val="75000"/>
+                </a:schemeClr>
+              </a:solidFill>
+            </a:endParaRPr>
+          </a:p>
+        </p:txBody>
+      </p:sp>
     </p:spTree>
     <p:extLst>
       <p:ext uri="{BB962C8B-B14F-4D97-AF65-F5344CB8AC3E}">
-        <p14:creationId xmlns:p14="http://schemas.microsoft.com/office/powerpoint/2010/main" val="2916572011"/>
+        <p14:creationId xmlns:p14="http://schemas.microsoft.com/office/powerpoint/2010/main" val="2525452429"/>
       </p:ext>
     </p:extLst>
   </p:cSld>
@@ -7002,7 +7492,7 @@
 </p:sld>
 </file>
 
-<file path=ppt/slides/slide2.xml><?xml version="1.0" encoding="utf-8"?>
+<file path=ppt/slides/slide20.xml><?xml version="1.0" encoding="utf-8"?>
 <p:sld xmlns:a="http://schemas.openxmlformats.org/drawingml/2006/main" xmlns:r="http://schemas.openxmlformats.org/officeDocument/2006/relationships" xmlns:p="http://schemas.openxmlformats.org/presentationml/2006/main">
   <p:cSld>
     <p:spTree>
@@ -7073,8 +7563,8 @@
         </p:nvSpPr>
         <p:spPr>
           <a:xfrm>
-            <a:off x="4184694" y="1065121"/>
-            <a:ext cx="5712369" cy="1754326"/>
+            <a:off x="3840385" y="1213849"/>
+            <a:ext cx="5712369" cy="923330"/>
           </a:xfrm>
           <a:prstGeom prst="rect">
             <a:avLst/>
@@ -7089,7 +7579,7 @@
           <a:p>
             <a:r>
               <a:rPr lang="en-US" sz="5400" dirty="0" smtClean="0"/>
-              <a:t>OUT-OF-CLASS LECTURES</a:t>
+              <a:t>INCLASS LECTURES</a:t>
             </a:r>
             <a:endParaRPr lang="en-US" sz="5400" dirty="0"/>
           </a:p>
@@ -7120,15 +7610,7 @@
             <a:pPr algn="ctr"/>
             <a:r>
               <a:rPr lang="en-US" dirty="0" smtClean="0"/>
-              <a:t>April</a:t>
-            </a:r>
-            <a:r>
-              <a:rPr lang="en-US" dirty="0" smtClean="0"/>
-              <a:t> 13, </a:t>
-            </a:r>
-            <a:r>
-              <a:rPr lang="en-US" dirty="0" smtClean="0"/>
-              <a:t>2020</a:t>
+              <a:t>Feb. 10, 2020</a:t>
             </a:r>
             <a:endParaRPr lang="en-US" dirty="0"/>
           </a:p>
@@ -7143,7 +7625,7 @@
         <p:spPr>
           <a:xfrm>
             <a:off x="2035110" y="3043759"/>
-            <a:ext cx="5005769" cy="1200329"/>
+            <a:ext cx="5005769" cy="923330"/>
           </a:xfrm>
           <a:prstGeom prst="rect">
             <a:avLst/>
@@ -7162,43 +7644,26 @@
               <a:t>Chapter </a:t>
             </a:r>
             <a:r>
-              <a:rPr lang="en-US" dirty="0" smtClean="0"/>
-              <a:t>15</a:t>
-            </a:r>
-            <a:endParaRPr lang="en-US" dirty="0"/>
-          </a:p>
-          <a:p>
-            <a:pPr algn="ctr"/>
+              <a:rPr lang="en-US" dirty="0"/>
+              <a:t>7</a:t>
+            </a:r>
+          </a:p>
+          <a:p>
+            <a:pPr algn="ctr"/>
+            <a:r>
+              <a:rPr lang="en-US" b="1" u="sng" dirty="0"/>
+              <a:t>Independent Samples t-Test for </a:t>
+            </a:r>
             <a:r>
               <a:rPr lang="en-US" b="1" u="sng" dirty="0" smtClean="0"/>
-              <a:t>Repeated </a:t>
-            </a:r>
-            <a:r>
-              <a:rPr lang="en-US" b="1" u="sng" dirty="0" err="1" smtClean="0"/>
-              <a:t>Measurs</a:t>
-            </a:r>
-            <a:r>
-              <a:rPr lang="en-US" b="1" u="sng" dirty="0" smtClean="0"/>
-              <a:t> </a:t>
-            </a:r>
-            <a:r>
-              <a:rPr lang="en-US" b="1" u="sng" dirty="0" smtClean="0"/>
-              <a:t>ANOVA</a:t>
-            </a:r>
-            <a:endParaRPr lang="en-US" b="1" u="sng" dirty="0"/>
+              <a:t>Means</a:t>
+            </a:r>
           </a:p>
           <a:p>
             <a:pPr algn="ctr"/>
             <a:r>
               <a:rPr lang="en-US" i="1" dirty="0" smtClean="0"/>
-              <a:t>1-way RM ANOVA</a:t>
-            </a:r>
-          </a:p>
-          <a:p>
-            <a:pPr algn="ctr"/>
-            <a:r>
-              <a:rPr lang="en-US" i="1" dirty="0" smtClean="0"/>
-              <a:t>Slides 1 - 36</a:t>
+              <a:t>Mostly Homework Helps</a:t>
             </a:r>
             <a:endParaRPr lang="en-US" i="1" dirty="0"/>
           </a:p>
@@ -7339,94 +7804,10 @@
           </a:prstGeom>
         </p:spPr>
       </p:pic>
-      <p:pic>
-        <p:nvPicPr>
-          <p:cNvPr id="1026" name="Picture 2" descr="Image result for virus"/>
-          <p:cNvPicPr>
-            <a:picLocks noChangeAspect="1" noChangeArrowheads="1"/>
-          </p:cNvPicPr>
-          <p:nvPr/>
-        </p:nvPicPr>
-        <p:blipFill>
-          <a:blip r:embed="rId6" cstate="print">
-            <a:extLst>
-              <a:ext uri="{28A0092B-C50C-407E-A947-70E740481C1C}">
-                <a14:useLocalDpi xmlns:a14="http://schemas.microsoft.com/office/drawing/2010/main" val="0"/>
-              </a:ext>
-            </a:extLst>
-          </a:blip>
-          <a:srcRect/>
-          <a:stretch>
-            <a:fillRect/>
-          </a:stretch>
-        </p:blipFill>
-        <p:spPr bwMode="auto">
-          <a:xfrm>
-            <a:off x="1908176" y="4866721"/>
-            <a:ext cx="825034" cy="824421"/>
-          </a:xfrm>
-          <a:prstGeom prst="rect">
-            <a:avLst/>
-          </a:prstGeom>
-          <a:noFill/>
-          <a:extLst>
-            <a:ext uri="{909E8E84-426E-40DD-AFC4-6F175D3DCCD1}">
-              <a14:hiddenFill xmlns:a14="http://schemas.microsoft.com/office/drawing/2010/main">
-                <a:solidFill>
-                  <a:srgbClr val="FFFFFF"/>
-                </a:solidFill>
-              </a14:hiddenFill>
-            </a:ext>
-          </a:extLst>
-        </p:spPr>
-      </p:pic>
-      <p:sp>
-        <p:nvSpPr>
-          <p:cNvPr id="13" name="TextBox 12"/>
-          <p:cNvSpPr txBox="1"/>
-          <p:nvPr/>
-        </p:nvSpPr>
-        <p:spPr>
-          <a:xfrm>
-            <a:off x="2524444" y="5254195"/>
-            <a:ext cx="1238954" cy="369332"/>
-          </a:xfrm>
-          <a:prstGeom prst="rect">
-            <a:avLst/>
-          </a:prstGeom>
-          <a:noFill/>
-        </p:spPr>
-        <p:txBody>
-          <a:bodyPr wrap="square" rtlCol="0">
-            <a:spAutoFit/>
-          </a:bodyPr>
-          <a:lstStyle/>
-          <a:p>
-            <a:pPr algn="ctr"/>
-            <a:r>
-              <a:rPr lang="en-US" b="1" dirty="0" smtClean="0">
-                <a:solidFill>
-                  <a:schemeClr val="accent1">
-                    <a:lumMod val="75000"/>
-                  </a:schemeClr>
-                </a:solidFill>
-              </a:rPr>
-              <a:t>Covid-19</a:t>
-            </a:r>
-            <a:endParaRPr lang="en-US" b="1" dirty="0">
-              <a:solidFill>
-                <a:schemeClr val="accent1">
-                  <a:lumMod val="75000"/>
-                </a:schemeClr>
-              </a:solidFill>
-            </a:endParaRPr>
-          </a:p>
-        </p:txBody>
-      </p:sp>
     </p:spTree>
     <p:extLst>
       <p:ext uri="{BB962C8B-B14F-4D97-AF65-F5344CB8AC3E}">
-        <p14:creationId xmlns:p14="http://schemas.microsoft.com/office/powerpoint/2010/main" val="3454054716"/>
+        <p14:creationId xmlns:p14="http://schemas.microsoft.com/office/powerpoint/2010/main" val="2916572011"/>
       </p:ext>
     </p:extLst>
   </p:cSld>
@@ -7436,7 +7817,7 @@
 </p:sld>
 </file>
 
-<file path=ppt/slides/slide20.xml><?xml version="1.0" encoding="utf-8"?>
+<file path=ppt/slides/slide21.xml><?xml version="1.0" encoding="utf-8"?>
 <p:sld xmlns:a="http://schemas.openxmlformats.org/drawingml/2006/main" xmlns:r="http://schemas.openxmlformats.org/officeDocument/2006/relationships" xmlns:p="http://schemas.openxmlformats.org/presentationml/2006/main">
   <p:cSld>
     <p:spTree>
@@ -7773,7 +8154,7 @@
 </p:sld>
 </file>
 
-<file path=ppt/slides/slide21.xml><?xml version="1.0" encoding="utf-8"?>
+<file path=ppt/slides/slide22.xml><?xml version="1.0" encoding="utf-8"?>
 <p:sld xmlns:a="http://schemas.openxmlformats.org/drawingml/2006/main" xmlns:r="http://schemas.openxmlformats.org/officeDocument/2006/relationships" xmlns:p="http://schemas.openxmlformats.org/presentationml/2006/main">
   <p:cSld>
     <p:spTree>
@@ -8110,7 +8491,7 @@
 </p:sld>
 </file>
 
-<file path=ppt/slides/slide22.xml><?xml version="1.0" encoding="utf-8"?>
+<file path=ppt/slides/slide23.xml><?xml version="1.0" encoding="utf-8"?>
 <p:sld xmlns:a="http://schemas.openxmlformats.org/drawingml/2006/main" xmlns:r="http://schemas.openxmlformats.org/officeDocument/2006/relationships" xmlns:p="http://schemas.openxmlformats.org/presentationml/2006/main">
   <p:cSld>
     <p:spTree>
@@ -8478,7 +8859,7 @@
 </p:sld>
 </file>
 
-<file path=ppt/slides/slide23.xml><?xml version="1.0" encoding="utf-8"?>
+<file path=ppt/slides/slide24.xml><?xml version="1.0" encoding="utf-8"?>
 <p:sld xmlns:a="http://schemas.openxmlformats.org/drawingml/2006/main" xmlns:r="http://schemas.openxmlformats.org/officeDocument/2006/relationships" xmlns:p="http://schemas.openxmlformats.org/presentationml/2006/main">
   <p:cSld>
     <p:spTree>
@@ -8845,7 +9226,7 @@
 </p:sld>
 </file>
 
-<file path=ppt/slides/slide24.xml><?xml version="1.0" encoding="utf-8"?>
+<file path=ppt/slides/slide25.xml><?xml version="1.0" encoding="utf-8"?>
 <p:sld xmlns:a="http://schemas.openxmlformats.org/drawingml/2006/main" xmlns:r="http://schemas.openxmlformats.org/officeDocument/2006/relationships" xmlns:p="http://schemas.openxmlformats.org/presentationml/2006/main">
   <p:cSld>
     <p:spTree>
@@ -9206,7 +9587,7 @@
 </p:sld>
 </file>
 
-<file path=ppt/slides/slide25.xml><?xml version="1.0" encoding="utf-8"?>
+<file path=ppt/slides/slide26.xml><?xml version="1.0" encoding="utf-8"?>
 <p:sld xmlns:a="http://schemas.openxmlformats.org/drawingml/2006/main" xmlns:r="http://schemas.openxmlformats.org/officeDocument/2006/relationships" xmlns:p="http://schemas.openxmlformats.org/presentationml/2006/main">
   <p:cSld>
     <p:spTree>
@@ -9448,7 +9829,7 @@
         <p:spPr>
           <a:xfrm>
             <a:off x="2035110" y="3043759"/>
-            <a:ext cx="5005769" cy="1477328"/>
+            <a:ext cx="5005769" cy="1200329"/>
           </a:xfrm>
           <a:prstGeom prst="rect">
             <a:avLst/>
@@ -9496,38 +9877,14 @@
             <a:pPr algn="ctr"/>
             <a:r>
               <a:rPr lang="en-US" i="1" dirty="0" smtClean="0"/>
-              <a:t>Examples, in R</a:t>
-            </a:r>
-            <a:endParaRPr lang="en-US" i="1" dirty="0" smtClean="0"/>
+              <a:t>1-way RM ANOVA</a:t>
+            </a:r>
           </a:p>
           <a:p>
             <a:pPr algn="ctr"/>
             <a:r>
               <a:rPr lang="en-US" i="1" dirty="0" smtClean="0"/>
-              <a:t>1</a:t>
-            </a:r>
-            <a:r>
-              <a:rPr lang="en-US" i="1" baseline="30000" dirty="0" smtClean="0"/>
-              <a:t>st</a:t>
-            </a:r>
-            <a:r>
-              <a:rPr lang="en-US" i="1" dirty="0" smtClean="0"/>
-              <a:t> – textbook’s example with word recall</a:t>
-            </a:r>
-          </a:p>
-          <a:p>
-            <a:pPr algn="ctr"/>
-            <a:r>
-              <a:rPr lang="en-US" i="1" dirty="0" smtClean="0"/>
-              <a:t>2</a:t>
-            </a:r>
-            <a:r>
-              <a:rPr lang="en-US" i="1" baseline="30000" dirty="0" smtClean="0"/>
-              <a:t>nd</a:t>
-            </a:r>
-            <a:r>
-              <a:rPr lang="en-US" i="1" dirty="0" smtClean="0"/>
-              <a:t> – weight loss over 3 months</a:t>
+              <a:t>Slides 1 - 36</a:t>
             </a:r>
             <a:endParaRPr lang="en-US" i="1" dirty="0"/>
           </a:p>
@@ -9755,7 +10112,7 @@
     </p:spTree>
     <p:extLst>
       <p:ext uri="{BB962C8B-B14F-4D97-AF65-F5344CB8AC3E}">
-        <p14:creationId xmlns:p14="http://schemas.microsoft.com/office/powerpoint/2010/main" val="707466089"/>
+        <p14:creationId xmlns:p14="http://schemas.microsoft.com/office/powerpoint/2010/main" val="3454054716"/>
       </p:ext>
     </p:extLst>
   </p:cSld>
@@ -9790,7 +10147,7 @@
         </p:nvSpPr>
         <p:spPr>
           <a:xfrm>
-            <a:off x="1853580" y="824230"/>
+            <a:off x="1808702" y="824230"/>
             <a:ext cx="8778240" cy="5010912"/>
           </a:xfrm>
           <a:prstGeom prst="rect">
@@ -9836,7 +10193,7 @@
         </p:nvSpPr>
         <p:spPr>
           <a:xfrm>
-            <a:off x="3838696" y="1056832"/>
+            <a:off x="4184694" y="1065121"/>
             <a:ext cx="5712369" cy="1754326"/>
           </a:xfrm>
           <a:prstGeom prst="rect">
@@ -9852,13 +10209,7 @@
           <a:p>
             <a:r>
               <a:rPr lang="en-US" sz="5400" dirty="0" smtClean="0"/>
-              <a:t>Virtual </a:t>
-            </a:r>
-          </a:p>
-          <a:p>
-            <a:r>
-              <a:rPr lang="en-US" sz="5400" dirty="0" smtClean="0"/>
-              <a:t>Office Hours</a:t>
+              <a:t>OUT-OF-CLASS LECTURES</a:t>
             </a:r>
             <a:endParaRPr lang="en-US" sz="5400" dirty="0"/>
           </a:p>
@@ -9889,11 +10240,11 @@
             <a:pPr algn="ctr"/>
             <a:r>
               <a:rPr lang="en-US" dirty="0" smtClean="0"/>
-              <a:t>April </a:t>
+              <a:t>April</a:t>
             </a:r>
             <a:r>
               <a:rPr lang="en-US" dirty="0" smtClean="0"/>
-              <a:t>7, </a:t>
+              <a:t> 13, </a:t>
             </a:r>
             <a:r>
               <a:rPr lang="en-US" dirty="0" smtClean="0"/>
@@ -9911,8 +10262,8 @@
         </p:nvSpPr>
         <p:spPr>
           <a:xfrm>
-            <a:off x="3133161" y="2743036"/>
-            <a:ext cx="5005769" cy="923330"/>
+            <a:off x="2035110" y="3043759"/>
+            <a:ext cx="5005769" cy="1477328"/>
           </a:xfrm>
           <a:prstGeom prst="rect">
             <a:avLst/>
@@ -9928,7 +10279,11 @@
             <a:pPr algn="ctr"/>
             <a:r>
               <a:rPr lang="en-US" dirty="0" smtClean="0"/>
-              <a:t>HW 14 </a:t>
+              <a:t>Chapter </a:t>
+            </a:r>
+            <a:r>
+              <a:rPr lang="en-US" dirty="0" smtClean="0"/>
+              <a:t>15</a:t>
             </a:r>
             <a:endParaRPr lang="en-US" dirty="0"/>
           </a:p>
@@ -9936,28 +10291,60 @@
             <a:pPr algn="ctr"/>
             <a:r>
               <a:rPr lang="en-US" b="1" u="sng" dirty="0" smtClean="0"/>
-              <a:t>2-way Factorial ANOVAs</a:t>
-            </a:r>
-          </a:p>
-          <a:p>
-            <a:pPr algn="ctr"/>
-            <a:r>
-              <a:rPr lang="en-US" dirty="0" smtClean="0"/>
-              <a:t>Items # </a:t>
-            </a:r>
-            <a:r>
-              <a:rPr lang="en-US" dirty="0" smtClean="0"/>
-              <a:t>4, 5, </a:t>
-            </a:r>
-            <a:r>
-              <a:rPr lang="en-US" dirty="0" smtClean="0"/>
-              <a:t>&amp; </a:t>
-            </a:r>
-            <a:r>
-              <a:rPr lang="en-US" dirty="0" smtClean="0"/>
-              <a:t>6</a:t>
-            </a:r>
-            <a:endParaRPr lang="en-US" dirty="0" smtClean="0"/>
+              <a:t>Repeated </a:t>
+            </a:r>
+            <a:r>
+              <a:rPr lang="en-US" b="1" u="sng" dirty="0" err="1" smtClean="0"/>
+              <a:t>Measurs</a:t>
+            </a:r>
+            <a:r>
+              <a:rPr lang="en-US" b="1" u="sng" dirty="0" smtClean="0"/>
+              <a:t> </a:t>
+            </a:r>
+            <a:r>
+              <a:rPr lang="en-US" b="1" u="sng" dirty="0" smtClean="0"/>
+              <a:t>ANOVA</a:t>
+            </a:r>
+            <a:endParaRPr lang="en-US" b="1" u="sng" dirty="0"/>
+          </a:p>
+          <a:p>
+            <a:pPr algn="ctr"/>
+            <a:r>
+              <a:rPr lang="en-US" i="1" dirty="0" smtClean="0"/>
+              <a:t>Examples, in R</a:t>
+            </a:r>
+            <a:endParaRPr lang="en-US" i="1" dirty="0" smtClean="0"/>
+          </a:p>
+          <a:p>
+            <a:pPr algn="ctr"/>
+            <a:r>
+              <a:rPr lang="en-US" i="1" dirty="0" smtClean="0"/>
+              <a:t>1</a:t>
+            </a:r>
+            <a:r>
+              <a:rPr lang="en-US" i="1" baseline="30000" dirty="0" smtClean="0"/>
+              <a:t>st</a:t>
+            </a:r>
+            <a:r>
+              <a:rPr lang="en-US" i="1" dirty="0" smtClean="0"/>
+              <a:t> – textbook’s example with word recall</a:t>
+            </a:r>
+          </a:p>
+          <a:p>
+            <a:pPr algn="ctr"/>
+            <a:r>
+              <a:rPr lang="en-US" i="1" dirty="0" smtClean="0"/>
+              <a:t>2</a:t>
+            </a:r>
+            <a:r>
+              <a:rPr lang="en-US" i="1" baseline="30000" dirty="0" smtClean="0"/>
+              <a:t>nd</a:t>
+            </a:r>
+            <a:r>
+              <a:rPr lang="en-US" i="1" dirty="0" smtClean="0"/>
+              <a:t> – weight loss over 3 months</a:t>
+            </a:r>
+            <a:endParaRPr lang="en-US" i="1" dirty="0"/>
           </a:p>
         </p:txBody>
       </p:sp>
@@ -10098,38 +10485,55 @@
       </p:pic>
       <p:pic>
         <p:nvPicPr>
-          <p:cNvPr id="5" name="Picture 4"/>
+          <p:cNvPr id="1026" name="Picture 2" descr="Image result for virus"/>
           <p:cNvPicPr>
-            <a:picLocks noChangeAspect="1"/>
+            <a:picLocks noChangeAspect="1" noChangeArrowheads="1"/>
           </p:cNvPicPr>
           <p:nvPr/>
         </p:nvPicPr>
         <p:blipFill>
-          <a:blip r:embed="rId6"/>
+          <a:blip r:embed="rId6" cstate="print">
+            <a:extLst>
+              <a:ext uri="{28A0092B-C50C-407E-A947-70E740481C1C}">
+                <a14:useLocalDpi xmlns:a14="http://schemas.microsoft.com/office/drawing/2010/main" val="0"/>
+              </a:ext>
+            </a:extLst>
+          </a:blip>
+          <a:srcRect/>
           <a:stretch>
             <a:fillRect/>
           </a:stretch>
         </p:blipFill>
-        <p:spPr>
-          <a:xfrm>
-            <a:off x="1985351" y="4872564"/>
-            <a:ext cx="1853345" cy="853514"/>
-          </a:xfrm>
-          <a:prstGeom prst="rect">
-            <a:avLst/>
-          </a:prstGeom>
+        <p:spPr bwMode="auto">
+          <a:xfrm>
+            <a:off x="1908176" y="4866721"/>
+            <a:ext cx="825034" cy="824421"/>
+          </a:xfrm>
+          <a:prstGeom prst="rect">
+            <a:avLst/>
+          </a:prstGeom>
+          <a:noFill/>
+          <a:extLst>
+            <a:ext uri="{909E8E84-426E-40DD-AFC4-6F175D3DCCD1}">
+              <a14:hiddenFill xmlns:a14="http://schemas.microsoft.com/office/drawing/2010/main">
+                <a:solidFill>
+                  <a:srgbClr val="FFFFFF"/>
+                </a:solidFill>
+              </a14:hiddenFill>
+            </a:ext>
+          </a:extLst>
         </p:spPr>
       </p:pic>
       <p:sp>
         <p:nvSpPr>
-          <p:cNvPr id="6" name="TextBox 5"/>
+          <p:cNvPr id="13" name="TextBox 12"/>
           <p:cNvSpPr txBox="1"/>
           <p:nvPr/>
         </p:nvSpPr>
         <p:spPr>
           <a:xfrm>
-            <a:off x="2163479" y="3316893"/>
-            <a:ext cx="1952216" cy="646331"/>
+            <a:off x="2524444" y="5254195"/>
+            <a:ext cx="1238954" cy="369332"/>
           </a:xfrm>
           <a:prstGeom prst="rect">
             <a:avLst/>
@@ -10144,121 +10548,29 @@
           <a:p>
             <a:pPr algn="ctr"/>
             <a:r>
-              <a:rPr lang="en-US" u="sng" dirty="0" smtClean="0"/>
-              <a:t>Factorial ANOVA</a:t>
-            </a:r>
-          </a:p>
-          <a:p>
-            <a:pPr algn="ctr"/>
-            <a:r>
-              <a:rPr lang="en-US" dirty="0" smtClean="0"/>
-              <a:t>Omnibus F-tests</a:t>
-            </a:r>
-            <a:endParaRPr lang="en-US" dirty="0"/>
-          </a:p>
-        </p:txBody>
-      </p:sp>
-      <p:sp>
-        <p:nvSpPr>
-          <p:cNvPr id="15" name="TextBox 14"/>
-          <p:cNvSpPr txBox="1"/>
-          <p:nvPr/>
-        </p:nvSpPr>
-        <p:spPr>
-          <a:xfrm>
-            <a:off x="3473229" y="3827424"/>
-            <a:ext cx="2184037" cy="923330"/>
-          </a:xfrm>
-          <a:prstGeom prst="rect">
-            <a:avLst/>
-          </a:prstGeom>
-          <a:noFill/>
-        </p:spPr>
-        <p:txBody>
-          <a:bodyPr wrap="square" rtlCol="0">
-            <a:spAutoFit/>
-          </a:bodyPr>
-          <a:lstStyle/>
-          <a:p>
-            <a:pPr algn="ctr"/>
-            <a:r>
-              <a:rPr lang="en-US" u="sng" dirty="0" smtClean="0"/>
-              <a:t>Interactions</a:t>
-            </a:r>
-          </a:p>
-          <a:p>
-            <a:pPr algn="ctr"/>
-            <a:r>
-              <a:rPr lang="en-US" dirty="0" smtClean="0"/>
-              <a:t>2-way means plots</a:t>
-            </a:r>
-          </a:p>
-          <a:p>
-            <a:pPr algn="ctr"/>
-            <a:r>
-              <a:rPr lang="en-US" dirty="0" smtClean="0"/>
-              <a:t>Interaction contrasts</a:t>
-            </a:r>
-            <a:endParaRPr lang="en-US" dirty="0"/>
-          </a:p>
-        </p:txBody>
-      </p:sp>
-      <p:sp>
-        <p:nvSpPr>
-          <p:cNvPr id="16" name="TextBox 15"/>
-          <p:cNvSpPr txBox="1"/>
-          <p:nvPr/>
-        </p:nvSpPr>
-        <p:spPr>
-          <a:xfrm>
-            <a:off x="4851703" y="4576843"/>
-            <a:ext cx="2667658" cy="1200329"/>
-          </a:xfrm>
-          <a:prstGeom prst="rect">
-            <a:avLst/>
-          </a:prstGeom>
-          <a:noFill/>
-        </p:spPr>
-        <p:txBody>
-          <a:bodyPr wrap="square" rtlCol="0">
-            <a:spAutoFit/>
-          </a:bodyPr>
-          <a:lstStyle/>
-          <a:p>
-            <a:pPr algn="ctr"/>
-            <a:r>
-              <a:rPr lang="en-US" u="sng" dirty="0" smtClean="0"/>
-              <a:t>Main Effects</a:t>
-            </a:r>
-          </a:p>
-          <a:p>
-            <a:pPr algn="ctr"/>
-            <a:r>
-              <a:rPr lang="en-US" dirty="0" smtClean="0"/>
-              <a:t>1-way means table</a:t>
-            </a:r>
-          </a:p>
-          <a:p>
-            <a:pPr algn="ctr"/>
-            <a:r>
-              <a:rPr lang="en-US" dirty="0" smtClean="0"/>
-              <a:t>1-way means plot</a:t>
-            </a:r>
-          </a:p>
-          <a:p>
-            <a:pPr algn="ctr"/>
-            <a:r>
-              <a:rPr lang="en-US" dirty="0" smtClean="0"/>
-              <a:t>Pairwise post hoc t-tests</a:t>
-            </a:r>
-            <a:endParaRPr lang="en-US" dirty="0"/>
+              <a:rPr lang="en-US" b="1" dirty="0" smtClean="0">
+                <a:solidFill>
+                  <a:schemeClr val="accent1">
+                    <a:lumMod val="75000"/>
+                  </a:schemeClr>
+                </a:solidFill>
+              </a:rPr>
+              <a:t>Covid-19</a:t>
+            </a:r>
+            <a:endParaRPr lang="en-US" b="1" dirty="0">
+              <a:solidFill>
+                <a:schemeClr val="accent1">
+                  <a:lumMod val="75000"/>
+                </a:schemeClr>
+              </a:solidFill>
+            </a:endParaRPr>
           </a:p>
         </p:txBody>
       </p:sp>
     </p:spTree>
     <p:extLst>
       <p:ext uri="{BB962C8B-B14F-4D97-AF65-F5344CB8AC3E}">
-        <p14:creationId xmlns:p14="http://schemas.microsoft.com/office/powerpoint/2010/main" val="1875168771"/>
+        <p14:creationId xmlns:p14="http://schemas.microsoft.com/office/powerpoint/2010/main" val="707466089"/>
       </p:ext>
     </p:extLst>
   </p:cSld>
@@ -10392,7 +10704,15 @@
             <a:pPr algn="ctr"/>
             <a:r>
               <a:rPr lang="en-US" dirty="0" smtClean="0"/>
-              <a:t>April 2, 2020</a:t>
+              <a:t>April </a:t>
+            </a:r>
+            <a:r>
+              <a:rPr lang="en-US" dirty="0" smtClean="0"/>
+              <a:t>7, </a:t>
+            </a:r>
+            <a:r>
+              <a:rPr lang="en-US" dirty="0" smtClean="0"/>
+              <a:t>2020</a:t>
             </a:r>
             <a:endParaRPr lang="en-US" dirty="0"/>
           </a:p>
@@ -10438,8 +10758,21 @@
             <a:pPr algn="ctr"/>
             <a:r>
               <a:rPr lang="en-US" dirty="0" smtClean="0"/>
-              <a:t>Items # 2, 3, &amp; 5</a:t>
-            </a:r>
+              <a:t>Items # </a:t>
+            </a:r>
+            <a:r>
+              <a:rPr lang="en-US" dirty="0" smtClean="0"/>
+              <a:t>4, 5, </a:t>
+            </a:r>
+            <a:r>
+              <a:rPr lang="en-US" dirty="0" smtClean="0"/>
+              <a:t>&amp; </a:t>
+            </a:r>
+            <a:r>
+              <a:rPr lang="en-US" dirty="0" smtClean="0"/>
+              <a:t>6</a:t>
+            </a:r>
+            <a:endParaRPr lang="en-US" dirty="0" smtClean="0"/>
           </a:p>
         </p:txBody>
       </p:sp>
@@ -10740,6 +11073,488 @@
     </p:spTree>
     <p:extLst>
       <p:ext uri="{BB962C8B-B14F-4D97-AF65-F5344CB8AC3E}">
+        <p14:creationId xmlns:p14="http://schemas.microsoft.com/office/powerpoint/2010/main" val="1875168771"/>
+      </p:ext>
+    </p:extLst>
+  </p:cSld>
+  <p:clrMapOvr>
+    <a:masterClrMapping/>
+  </p:clrMapOvr>
+</p:sld>
+</file>
+
+<file path=ppt/slides/slide6.xml><?xml version="1.0" encoding="utf-8"?>
+<p:sld xmlns:a="http://schemas.openxmlformats.org/drawingml/2006/main" xmlns:r="http://schemas.openxmlformats.org/officeDocument/2006/relationships" xmlns:p="http://schemas.openxmlformats.org/presentationml/2006/main">
+  <p:cSld>
+    <p:spTree>
+      <p:nvGrpSpPr>
+        <p:cNvPr id="1" name=""/>
+        <p:cNvGrpSpPr/>
+        <p:nvPr/>
+      </p:nvGrpSpPr>
+      <p:grpSpPr>
+        <a:xfrm>
+          <a:off x="0" y="0"/>
+          <a:ext cx="0" cy="0"/>
+          <a:chOff x="0" y="0"/>
+          <a:chExt cx="0" cy="0"/>
+        </a:xfrm>
+      </p:grpSpPr>
+      <p:sp>
+        <p:nvSpPr>
+          <p:cNvPr id="4" name="Rectangle 3"/>
+          <p:cNvSpPr/>
+          <p:nvPr/>
+        </p:nvSpPr>
+        <p:spPr>
+          <a:xfrm>
+            <a:off x="1853580" y="824230"/>
+            <a:ext cx="8778240" cy="5010912"/>
+          </a:xfrm>
+          <a:prstGeom prst="rect">
+            <a:avLst/>
+          </a:prstGeom>
+          <a:solidFill>
+            <a:schemeClr val="bg1">
+              <a:lumMod val="95000"/>
+            </a:schemeClr>
+          </a:solidFill>
+          <a:ln w="38100"/>
+        </p:spPr>
+        <p:style>
+          <a:lnRef idx="2">
+            <a:schemeClr val="accent1">
+              <a:shade val="50000"/>
+            </a:schemeClr>
+          </a:lnRef>
+          <a:fillRef idx="1">
+            <a:schemeClr val="accent1"/>
+          </a:fillRef>
+          <a:effectRef idx="0">
+            <a:schemeClr val="accent1"/>
+          </a:effectRef>
+          <a:fontRef idx="minor">
+            <a:schemeClr val="lt1"/>
+          </a:fontRef>
+        </p:style>
+        <p:txBody>
+          <a:bodyPr rtlCol="0" anchor="ctr"/>
+          <a:lstStyle/>
+          <a:p>
+            <a:pPr algn="ctr"/>
+            <a:endParaRPr lang="en-US"/>
+          </a:p>
+        </p:txBody>
+      </p:sp>
+      <p:sp>
+        <p:nvSpPr>
+          <p:cNvPr id="7" name="TextBox 6"/>
+          <p:cNvSpPr txBox="1"/>
+          <p:nvPr/>
+        </p:nvSpPr>
+        <p:spPr>
+          <a:xfrm>
+            <a:off x="3838696" y="1056832"/>
+            <a:ext cx="5712369" cy="1754326"/>
+          </a:xfrm>
+          <a:prstGeom prst="rect">
+            <a:avLst/>
+          </a:prstGeom>
+          <a:noFill/>
+        </p:spPr>
+        <p:txBody>
+          <a:bodyPr wrap="square" rtlCol="0">
+            <a:spAutoFit/>
+          </a:bodyPr>
+          <a:lstStyle/>
+          <a:p>
+            <a:r>
+              <a:rPr lang="en-US" sz="5400" dirty="0" smtClean="0"/>
+              <a:t>Virtual </a:t>
+            </a:r>
+          </a:p>
+          <a:p>
+            <a:r>
+              <a:rPr lang="en-US" sz="5400" dirty="0" smtClean="0"/>
+              <a:t>Office Hours</a:t>
+            </a:r>
+            <a:endParaRPr lang="en-US" sz="5400" dirty="0"/>
+          </a:p>
+        </p:txBody>
+      </p:sp>
+      <p:sp>
+        <p:nvSpPr>
+          <p:cNvPr id="8" name="TextBox 7"/>
+          <p:cNvSpPr txBox="1"/>
+          <p:nvPr/>
+        </p:nvSpPr>
+        <p:spPr>
+          <a:xfrm>
+            <a:off x="7731444" y="5278932"/>
+            <a:ext cx="2076450" cy="369332"/>
+          </a:xfrm>
+          <a:prstGeom prst="rect">
+            <a:avLst/>
+          </a:prstGeom>
+          <a:noFill/>
+        </p:spPr>
+        <p:txBody>
+          <a:bodyPr wrap="square" rtlCol="0">
+            <a:spAutoFit/>
+          </a:bodyPr>
+          <a:lstStyle/>
+          <a:p>
+            <a:pPr algn="ctr"/>
+            <a:r>
+              <a:rPr lang="en-US" dirty="0" smtClean="0"/>
+              <a:t>April 2, 2020</a:t>
+            </a:r>
+            <a:endParaRPr lang="en-US" dirty="0"/>
+          </a:p>
+        </p:txBody>
+      </p:sp>
+      <p:sp>
+        <p:nvSpPr>
+          <p:cNvPr id="9" name="TextBox 8"/>
+          <p:cNvSpPr txBox="1"/>
+          <p:nvPr/>
+        </p:nvSpPr>
+        <p:spPr>
+          <a:xfrm>
+            <a:off x="3133161" y="2743036"/>
+            <a:ext cx="5005769" cy="923330"/>
+          </a:xfrm>
+          <a:prstGeom prst="rect">
+            <a:avLst/>
+          </a:prstGeom>
+          <a:noFill/>
+        </p:spPr>
+        <p:txBody>
+          <a:bodyPr wrap="square" rtlCol="0">
+            <a:spAutoFit/>
+          </a:bodyPr>
+          <a:lstStyle/>
+          <a:p>
+            <a:pPr algn="ctr"/>
+            <a:r>
+              <a:rPr lang="en-US" dirty="0" smtClean="0"/>
+              <a:t>HW 14 </a:t>
+            </a:r>
+            <a:endParaRPr lang="en-US" dirty="0"/>
+          </a:p>
+          <a:p>
+            <a:pPr algn="ctr"/>
+            <a:r>
+              <a:rPr lang="en-US" b="1" u="sng" dirty="0" smtClean="0"/>
+              <a:t>2-way Factorial ANOVAs</a:t>
+            </a:r>
+          </a:p>
+          <a:p>
+            <a:pPr algn="ctr"/>
+            <a:r>
+              <a:rPr lang="en-US" dirty="0" smtClean="0"/>
+              <a:t>Items # 2, 3, &amp; 5</a:t>
+            </a:r>
+          </a:p>
+        </p:txBody>
+      </p:sp>
+      <p:grpSp>
+        <p:nvGrpSpPr>
+          <p:cNvPr id="14" name="Group 13"/>
+          <p:cNvGrpSpPr/>
+          <p:nvPr/>
+        </p:nvGrpSpPr>
+        <p:grpSpPr>
+          <a:xfrm>
+            <a:off x="7198839" y="2137179"/>
+            <a:ext cx="3141660" cy="3193339"/>
+            <a:chOff x="7047391" y="1961976"/>
+            <a:chExt cx="3141660" cy="3193339"/>
+          </a:xfrm>
+        </p:grpSpPr>
+        <p:pic>
+          <p:nvPicPr>
+            <p:cNvPr id="2" name="Picture 1"/>
+            <p:cNvPicPr>
+              <a:picLocks noChangeAspect="1"/>
+            </p:cNvPicPr>
+            <p:nvPr/>
+          </p:nvPicPr>
+          <p:blipFill>
+            <a:blip r:embed="rId2" cstate="print">
+              <a:extLst>
+                <a:ext uri="{28A0092B-C50C-407E-A947-70E740481C1C}">
+                  <a14:useLocalDpi xmlns:a14="http://schemas.microsoft.com/office/drawing/2010/main" val="0"/>
+                </a:ext>
+              </a:extLst>
+            </a:blip>
+            <a:stretch>
+              <a:fillRect/>
+            </a:stretch>
+          </p:blipFill>
+          <p:spPr>
+            <a:xfrm>
+              <a:off x="7047391" y="3320161"/>
+              <a:ext cx="1578867" cy="1828804"/>
+            </a:xfrm>
+            <a:prstGeom prst="rect">
+              <a:avLst/>
+            </a:prstGeom>
+          </p:spPr>
+        </p:pic>
+        <p:pic>
+          <p:nvPicPr>
+            <p:cNvPr id="3" name="Picture 2"/>
+            <p:cNvPicPr>
+              <a:picLocks noChangeAspect="1"/>
+            </p:cNvPicPr>
+            <p:nvPr/>
+          </p:nvPicPr>
+          <p:blipFill>
+            <a:blip r:embed="rId3" cstate="print">
+              <a:extLst>
+                <a:ext uri="{28A0092B-C50C-407E-A947-70E740481C1C}">
+                  <a14:useLocalDpi xmlns:a14="http://schemas.microsoft.com/office/drawing/2010/main" val="0"/>
+                </a:ext>
+              </a:extLst>
+            </a:blip>
+            <a:stretch>
+              <a:fillRect/>
+            </a:stretch>
+          </p:blipFill>
+          <p:spPr>
+            <a:xfrm>
+              <a:off x="7830475" y="1961976"/>
+              <a:ext cx="1578867" cy="1828804"/>
+            </a:xfrm>
+            <a:prstGeom prst="rect">
+              <a:avLst/>
+            </a:prstGeom>
+          </p:spPr>
+        </p:pic>
+        <p:pic>
+          <p:nvPicPr>
+            <p:cNvPr id="11" name="Picture 10"/>
+            <p:cNvPicPr>
+              <a:picLocks noChangeAspect="1"/>
+            </p:cNvPicPr>
+            <p:nvPr/>
+          </p:nvPicPr>
+          <p:blipFill>
+            <a:blip r:embed="rId4" cstate="print">
+              <a:extLst>
+                <a:ext uri="{28A0092B-C50C-407E-A947-70E740481C1C}">
+                  <a14:useLocalDpi xmlns:a14="http://schemas.microsoft.com/office/drawing/2010/main" val="0"/>
+                </a:ext>
+              </a:extLst>
+            </a:blip>
+            <a:stretch>
+              <a:fillRect/>
+            </a:stretch>
+          </p:blipFill>
+          <p:spPr>
+            <a:xfrm>
+              <a:off x="8610184" y="3326511"/>
+              <a:ext cx="1578867" cy="1828804"/>
+            </a:xfrm>
+            <a:prstGeom prst="rect">
+              <a:avLst/>
+            </a:prstGeom>
+          </p:spPr>
+        </p:pic>
+      </p:grpSp>
+      <p:pic>
+        <p:nvPicPr>
+          <p:cNvPr id="12" name="Picture 11"/>
+          <p:cNvPicPr>
+            <a:picLocks noChangeAspect="1"/>
+          </p:cNvPicPr>
+          <p:nvPr/>
+        </p:nvPicPr>
+        <p:blipFill>
+          <a:blip r:embed="rId5" cstate="print">
+            <a:extLst>
+              <a:ext uri="{28A0092B-C50C-407E-A947-70E740481C1C}">
+                <a14:useLocalDpi xmlns:a14="http://schemas.microsoft.com/office/drawing/2010/main" val="0"/>
+              </a:ext>
+            </a:extLst>
+          </a:blip>
+          <a:stretch>
+            <a:fillRect/>
+          </a:stretch>
+        </p:blipFill>
+        <p:spPr>
+          <a:xfrm>
+            <a:off x="2035110" y="1019593"/>
+            <a:ext cx="1578867" cy="1828804"/>
+          </a:xfrm>
+          <a:prstGeom prst="rect">
+            <a:avLst/>
+          </a:prstGeom>
+        </p:spPr>
+      </p:pic>
+      <p:pic>
+        <p:nvPicPr>
+          <p:cNvPr id="5" name="Picture 4"/>
+          <p:cNvPicPr>
+            <a:picLocks noChangeAspect="1"/>
+          </p:cNvPicPr>
+          <p:nvPr/>
+        </p:nvPicPr>
+        <p:blipFill>
+          <a:blip r:embed="rId6"/>
+          <a:stretch>
+            <a:fillRect/>
+          </a:stretch>
+        </p:blipFill>
+        <p:spPr>
+          <a:xfrm>
+            <a:off x="1985351" y="4872564"/>
+            <a:ext cx="1853345" cy="853514"/>
+          </a:xfrm>
+          <a:prstGeom prst="rect">
+            <a:avLst/>
+          </a:prstGeom>
+        </p:spPr>
+      </p:pic>
+      <p:sp>
+        <p:nvSpPr>
+          <p:cNvPr id="6" name="TextBox 5"/>
+          <p:cNvSpPr txBox="1"/>
+          <p:nvPr/>
+        </p:nvSpPr>
+        <p:spPr>
+          <a:xfrm>
+            <a:off x="2163479" y="3316893"/>
+            <a:ext cx="1952216" cy="646331"/>
+          </a:xfrm>
+          <a:prstGeom prst="rect">
+            <a:avLst/>
+          </a:prstGeom>
+          <a:noFill/>
+        </p:spPr>
+        <p:txBody>
+          <a:bodyPr wrap="square" rtlCol="0">
+            <a:spAutoFit/>
+          </a:bodyPr>
+          <a:lstStyle/>
+          <a:p>
+            <a:pPr algn="ctr"/>
+            <a:r>
+              <a:rPr lang="en-US" u="sng" dirty="0" smtClean="0"/>
+              <a:t>Factorial ANOVA</a:t>
+            </a:r>
+          </a:p>
+          <a:p>
+            <a:pPr algn="ctr"/>
+            <a:r>
+              <a:rPr lang="en-US" dirty="0" smtClean="0"/>
+              <a:t>Omnibus F-tests</a:t>
+            </a:r>
+            <a:endParaRPr lang="en-US" dirty="0"/>
+          </a:p>
+        </p:txBody>
+      </p:sp>
+      <p:sp>
+        <p:nvSpPr>
+          <p:cNvPr id="15" name="TextBox 14"/>
+          <p:cNvSpPr txBox="1"/>
+          <p:nvPr/>
+        </p:nvSpPr>
+        <p:spPr>
+          <a:xfrm>
+            <a:off x="3473229" y="3827424"/>
+            <a:ext cx="2184037" cy="923330"/>
+          </a:xfrm>
+          <a:prstGeom prst="rect">
+            <a:avLst/>
+          </a:prstGeom>
+          <a:noFill/>
+        </p:spPr>
+        <p:txBody>
+          <a:bodyPr wrap="square" rtlCol="0">
+            <a:spAutoFit/>
+          </a:bodyPr>
+          <a:lstStyle/>
+          <a:p>
+            <a:pPr algn="ctr"/>
+            <a:r>
+              <a:rPr lang="en-US" u="sng" dirty="0" smtClean="0"/>
+              <a:t>Interactions</a:t>
+            </a:r>
+          </a:p>
+          <a:p>
+            <a:pPr algn="ctr"/>
+            <a:r>
+              <a:rPr lang="en-US" dirty="0" smtClean="0"/>
+              <a:t>2-way means plots</a:t>
+            </a:r>
+          </a:p>
+          <a:p>
+            <a:pPr algn="ctr"/>
+            <a:r>
+              <a:rPr lang="en-US" dirty="0" smtClean="0"/>
+              <a:t>Interaction contrasts</a:t>
+            </a:r>
+            <a:endParaRPr lang="en-US" dirty="0"/>
+          </a:p>
+        </p:txBody>
+      </p:sp>
+      <p:sp>
+        <p:nvSpPr>
+          <p:cNvPr id="16" name="TextBox 15"/>
+          <p:cNvSpPr txBox="1"/>
+          <p:nvPr/>
+        </p:nvSpPr>
+        <p:spPr>
+          <a:xfrm>
+            <a:off x="4851703" y="4576843"/>
+            <a:ext cx="2667658" cy="1200329"/>
+          </a:xfrm>
+          <a:prstGeom prst="rect">
+            <a:avLst/>
+          </a:prstGeom>
+          <a:noFill/>
+        </p:spPr>
+        <p:txBody>
+          <a:bodyPr wrap="square" rtlCol="0">
+            <a:spAutoFit/>
+          </a:bodyPr>
+          <a:lstStyle/>
+          <a:p>
+            <a:pPr algn="ctr"/>
+            <a:r>
+              <a:rPr lang="en-US" u="sng" dirty="0" smtClean="0"/>
+              <a:t>Main Effects</a:t>
+            </a:r>
+          </a:p>
+          <a:p>
+            <a:pPr algn="ctr"/>
+            <a:r>
+              <a:rPr lang="en-US" dirty="0" smtClean="0"/>
+              <a:t>1-way means table</a:t>
+            </a:r>
+          </a:p>
+          <a:p>
+            <a:pPr algn="ctr"/>
+            <a:r>
+              <a:rPr lang="en-US" dirty="0" smtClean="0"/>
+              <a:t>1-way means plot</a:t>
+            </a:r>
+          </a:p>
+          <a:p>
+            <a:pPr algn="ctr"/>
+            <a:r>
+              <a:rPr lang="en-US" dirty="0" smtClean="0"/>
+              <a:t>Pairwise post hoc t-tests</a:t>
+            </a:r>
+            <a:endParaRPr lang="en-US" dirty="0"/>
+          </a:p>
+        </p:txBody>
+      </p:sp>
+    </p:spTree>
+    <p:extLst>
+      <p:ext uri="{BB962C8B-B14F-4D97-AF65-F5344CB8AC3E}">
         <p14:creationId xmlns:p14="http://schemas.microsoft.com/office/powerpoint/2010/main" val="3811887098"/>
       </p:ext>
     </p:extLst>
@@ -10750,7 +11565,7 @@
 </p:sld>
 </file>
 
-<file path=ppt/slides/slide6.xml><?xml version="1.0" encoding="utf-8"?>
+<file path=ppt/slides/slide7.xml><?xml version="1.0" encoding="utf-8"?>
 <p:sld xmlns:a="http://schemas.openxmlformats.org/drawingml/2006/main" xmlns:r="http://schemas.openxmlformats.org/officeDocument/2006/relationships" xmlns:p="http://schemas.openxmlformats.org/presentationml/2006/main">
   <p:cSld>
     <p:spTree>
@@ -11183,7 +11998,7 @@
 </p:sld>
 </file>
 
-<file path=ppt/slides/slide7.xml><?xml version="1.0" encoding="utf-8"?>
+<file path=ppt/slides/slide8.xml><?xml version="1.0" encoding="utf-8"?>
 <p:sld xmlns:a="http://schemas.openxmlformats.org/drawingml/2006/main" xmlns:r="http://schemas.openxmlformats.org/officeDocument/2006/relationships" xmlns:p="http://schemas.openxmlformats.org/presentationml/2006/main">
   <p:cSld>
     <p:spTree>
@@ -11610,7 +12425,7 @@
 </p:sld>
 </file>
 
-<file path=ppt/slides/slide8.xml><?xml version="1.0" encoding="utf-8"?>
+<file path=ppt/slides/slide9.xml><?xml version="1.0" encoding="utf-8"?>
 <p:sld xmlns:a="http://schemas.openxmlformats.org/drawingml/2006/main" xmlns:r="http://schemas.openxmlformats.org/officeDocument/2006/relationships" xmlns:p="http://schemas.openxmlformats.org/presentationml/2006/main">
   <p:cSld>
     <p:spTree>
@@ -12011,406 +12826,6 @@
     <p:extLst>
       <p:ext uri="{BB962C8B-B14F-4D97-AF65-F5344CB8AC3E}">
         <p14:creationId xmlns:p14="http://schemas.microsoft.com/office/powerpoint/2010/main" val="1235567156"/>
-      </p:ext>
-    </p:extLst>
-  </p:cSld>
-  <p:clrMapOvr>
-    <a:masterClrMapping/>
-  </p:clrMapOvr>
-</p:sld>
-</file>
-
-<file path=ppt/slides/slide9.xml><?xml version="1.0" encoding="utf-8"?>
-<p:sld xmlns:a="http://schemas.openxmlformats.org/drawingml/2006/main" xmlns:r="http://schemas.openxmlformats.org/officeDocument/2006/relationships" xmlns:p="http://schemas.openxmlformats.org/presentationml/2006/main">
-  <p:cSld>
-    <p:spTree>
-      <p:nvGrpSpPr>
-        <p:cNvPr id="1" name=""/>
-        <p:cNvGrpSpPr/>
-        <p:nvPr/>
-      </p:nvGrpSpPr>
-      <p:grpSpPr>
-        <a:xfrm>
-          <a:off x="0" y="0"/>
-          <a:ext cx="0" cy="0"/>
-          <a:chOff x="0" y="0"/>
-          <a:chExt cx="0" cy="0"/>
-        </a:xfrm>
-      </p:grpSpPr>
-      <p:sp>
-        <p:nvSpPr>
-          <p:cNvPr id="4" name="Rectangle 3"/>
-          <p:cNvSpPr/>
-          <p:nvPr/>
-        </p:nvSpPr>
-        <p:spPr>
-          <a:xfrm>
-            <a:off x="1853580" y="824230"/>
-            <a:ext cx="8778240" cy="5010912"/>
-          </a:xfrm>
-          <a:prstGeom prst="rect">
-            <a:avLst/>
-          </a:prstGeom>
-          <a:solidFill>
-            <a:schemeClr val="bg1">
-              <a:lumMod val="95000"/>
-            </a:schemeClr>
-          </a:solidFill>
-          <a:ln w="38100"/>
-        </p:spPr>
-        <p:style>
-          <a:lnRef idx="2">
-            <a:schemeClr val="accent1">
-              <a:shade val="50000"/>
-            </a:schemeClr>
-          </a:lnRef>
-          <a:fillRef idx="1">
-            <a:schemeClr val="accent1"/>
-          </a:fillRef>
-          <a:effectRef idx="0">
-            <a:schemeClr val="accent1"/>
-          </a:effectRef>
-          <a:fontRef idx="minor">
-            <a:schemeClr val="lt1"/>
-          </a:fontRef>
-        </p:style>
-        <p:txBody>
-          <a:bodyPr rtlCol="0" anchor="ctr"/>
-          <a:lstStyle/>
-          <a:p>
-            <a:pPr algn="ctr"/>
-            <a:endParaRPr lang="en-US"/>
-          </a:p>
-        </p:txBody>
-      </p:sp>
-      <p:sp>
-        <p:nvSpPr>
-          <p:cNvPr id="7" name="TextBox 6"/>
-          <p:cNvSpPr txBox="1"/>
-          <p:nvPr/>
-        </p:nvSpPr>
-        <p:spPr>
-          <a:xfrm>
-            <a:off x="3838696" y="1056832"/>
-            <a:ext cx="5712369" cy="1754326"/>
-          </a:xfrm>
-          <a:prstGeom prst="rect">
-            <a:avLst/>
-          </a:prstGeom>
-          <a:noFill/>
-        </p:spPr>
-        <p:txBody>
-          <a:bodyPr wrap="square" rtlCol="0">
-            <a:spAutoFit/>
-          </a:bodyPr>
-          <a:lstStyle/>
-          <a:p>
-            <a:r>
-              <a:rPr lang="en-US" sz="5400" dirty="0" smtClean="0"/>
-              <a:t>Virtual </a:t>
-            </a:r>
-          </a:p>
-          <a:p>
-            <a:r>
-              <a:rPr lang="en-US" sz="5400" dirty="0" smtClean="0"/>
-              <a:t>Office Hours</a:t>
-            </a:r>
-            <a:endParaRPr lang="en-US" sz="5400" dirty="0"/>
-          </a:p>
-        </p:txBody>
-      </p:sp>
-      <p:sp>
-        <p:nvSpPr>
-          <p:cNvPr id="8" name="TextBox 7"/>
-          <p:cNvSpPr txBox="1"/>
-          <p:nvPr/>
-        </p:nvSpPr>
-        <p:spPr>
-          <a:xfrm>
-            <a:off x="7731444" y="5278932"/>
-            <a:ext cx="2076450" cy="369332"/>
-          </a:xfrm>
-          <a:prstGeom prst="rect">
-            <a:avLst/>
-          </a:prstGeom>
-          <a:noFill/>
-        </p:spPr>
-        <p:txBody>
-          <a:bodyPr wrap="square" rtlCol="0">
-            <a:spAutoFit/>
-          </a:bodyPr>
-          <a:lstStyle/>
-          <a:p>
-            <a:pPr algn="ctr"/>
-            <a:r>
-              <a:rPr lang="en-US" dirty="0" smtClean="0"/>
-              <a:t>March 25, 2020</a:t>
-            </a:r>
-            <a:endParaRPr lang="en-US" dirty="0"/>
-          </a:p>
-        </p:txBody>
-      </p:sp>
-      <p:sp>
-        <p:nvSpPr>
-          <p:cNvPr id="9" name="TextBox 8"/>
-          <p:cNvSpPr txBox="1"/>
-          <p:nvPr/>
-        </p:nvSpPr>
-        <p:spPr>
-          <a:xfrm>
-            <a:off x="2023325" y="2848397"/>
-            <a:ext cx="5005769" cy="1200329"/>
-          </a:xfrm>
-          <a:prstGeom prst="rect">
-            <a:avLst/>
-          </a:prstGeom>
-          <a:noFill/>
-        </p:spPr>
-        <p:txBody>
-          <a:bodyPr wrap="square" rtlCol="0">
-            <a:spAutoFit/>
-          </a:bodyPr>
-          <a:lstStyle/>
-          <a:p>
-            <a:pPr algn="ctr"/>
-            <a:r>
-              <a:rPr lang="en-US" dirty="0" smtClean="0"/>
-              <a:t>HW 13 </a:t>
-            </a:r>
-            <a:endParaRPr lang="en-US" dirty="0"/>
-          </a:p>
-          <a:p>
-            <a:pPr algn="ctr"/>
-            <a:r>
-              <a:rPr lang="en-US" b="1" u="sng" dirty="0" smtClean="0"/>
-              <a:t>Multiple Comparisons: pairwise &amp; linear contrasts</a:t>
-            </a:r>
-          </a:p>
-          <a:p>
-            <a:pPr algn="ctr"/>
-            <a:r>
-              <a:rPr lang="en-US" dirty="0" smtClean="0"/>
-              <a:t>Items # 5 &amp; 6</a:t>
-            </a:r>
-          </a:p>
-          <a:p>
-            <a:pPr algn="ctr"/>
-            <a:endParaRPr lang="en-US" b="1" dirty="0"/>
-          </a:p>
-        </p:txBody>
-      </p:sp>
-      <p:grpSp>
-        <p:nvGrpSpPr>
-          <p:cNvPr id="14" name="Group 13"/>
-          <p:cNvGrpSpPr/>
-          <p:nvPr/>
-        </p:nvGrpSpPr>
-        <p:grpSpPr>
-          <a:xfrm>
-            <a:off x="7198839" y="2137179"/>
-            <a:ext cx="3141660" cy="3193339"/>
-            <a:chOff x="7047391" y="1961976"/>
-            <a:chExt cx="3141660" cy="3193339"/>
-          </a:xfrm>
-        </p:grpSpPr>
-        <p:pic>
-          <p:nvPicPr>
-            <p:cNvPr id="2" name="Picture 1"/>
-            <p:cNvPicPr>
-              <a:picLocks noChangeAspect="1"/>
-            </p:cNvPicPr>
-            <p:nvPr/>
-          </p:nvPicPr>
-          <p:blipFill>
-            <a:blip r:embed="rId2" cstate="print">
-              <a:extLst>
-                <a:ext uri="{28A0092B-C50C-407E-A947-70E740481C1C}">
-                  <a14:useLocalDpi xmlns:a14="http://schemas.microsoft.com/office/drawing/2010/main" val="0"/>
-                </a:ext>
-              </a:extLst>
-            </a:blip>
-            <a:stretch>
-              <a:fillRect/>
-            </a:stretch>
-          </p:blipFill>
-          <p:spPr>
-            <a:xfrm>
-              <a:off x="7047391" y="3320161"/>
-              <a:ext cx="1578867" cy="1828804"/>
-            </a:xfrm>
-            <a:prstGeom prst="rect">
-              <a:avLst/>
-            </a:prstGeom>
-          </p:spPr>
-        </p:pic>
-        <p:pic>
-          <p:nvPicPr>
-            <p:cNvPr id="3" name="Picture 2"/>
-            <p:cNvPicPr>
-              <a:picLocks noChangeAspect="1"/>
-            </p:cNvPicPr>
-            <p:nvPr/>
-          </p:nvPicPr>
-          <p:blipFill>
-            <a:blip r:embed="rId3" cstate="print">
-              <a:extLst>
-                <a:ext uri="{28A0092B-C50C-407E-A947-70E740481C1C}">
-                  <a14:useLocalDpi xmlns:a14="http://schemas.microsoft.com/office/drawing/2010/main" val="0"/>
-                </a:ext>
-              </a:extLst>
-            </a:blip>
-            <a:stretch>
-              <a:fillRect/>
-            </a:stretch>
-          </p:blipFill>
-          <p:spPr>
-            <a:xfrm>
-              <a:off x="7830475" y="1961976"/>
-              <a:ext cx="1578867" cy="1828804"/>
-            </a:xfrm>
-            <a:prstGeom prst="rect">
-              <a:avLst/>
-            </a:prstGeom>
-          </p:spPr>
-        </p:pic>
-        <p:pic>
-          <p:nvPicPr>
-            <p:cNvPr id="11" name="Picture 10"/>
-            <p:cNvPicPr>
-              <a:picLocks noChangeAspect="1"/>
-            </p:cNvPicPr>
-            <p:nvPr/>
-          </p:nvPicPr>
-          <p:blipFill>
-            <a:blip r:embed="rId4" cstate="print">
-              <a:extLst>
-                <a:ext uri="{28A0092B-C50C-407E-A947-70E740481C1C}">
-                  <a14:useLocalDpi xmlns:a14="http://schemas.microsoft.com/office/drawing/2010/main" val="0"/>
-                </a:ext>
-              </a:extLst>
-            </a:blip>
-            <a:stretch>
-              <a:fillRect/>
-            </a:stretch>
-          </p:blipFill>
-          <p:spPr>
-            <a:xfrm>
-              <a:off x="8610184" y="3326511"/>
-              <a:ext cx="1578867" cy="1828804"/>
-            </a:xfrm>
-            <a:prstGeom prst="rect">
-              <a:avLst/>
-            </a:prstGeom>
-          </p:spPr>
-        </p:pic>
-      </p:grpSp>
-      <p:pic>
-        <p:nvPicPr>
-          <p:cNvPr id="12" name="Picture 11"/>
-          <p:cNvPicPr>
-            <a:picLocks noChangeAspect="1"/>
-          </p:cNvPicPr>
-          <p:nvPr/>
-        </p:nvPicPr>
-        <p:blipFill>
-          <a:blip r:embed="rId5" cstate="print">
-            <a:extLst>
-              <a:ext uri="{28A0092B-C50C-407E-A947-70E740481C1C}">
-                <a14:useLocalDpi xmlns:a14="http://schemas.microsoft.com/office/drawing/2010/main" val="0"/>
-              </a:ext>
-            </a:extLst>
-          </a:blip>
-          <a:stretch>
-            <a:fillRect/>
-          </a:stretch>
-        </p:blipFill>
-        <p:spPr>
-          <a:xfrm>
-            <a:off x="2035110" y="1019593"/>
-            <a:ext cx="1578867" cy="1828804"/>
-          </a:xfrm>
-          <a:prstGeom prst="rect">
-            <a:avLst/>
-          </a:prstGeom>
-        </p:spPr>
-      </p:pic>
-      <p:sp>
-        <p:nvSpPr>
-          <p:cNvPr id="13" name="TextBox 12"/>
-          <p:cNvSpPr txBox="1"/>
-          <p:nvPr/>
-        </p:nvSpPr>
-        <p:spPr>
-          <a:xfrm>
-            <a:off x="2023324" y="3965983"/>
-            <a:ext cx="5005769" cy="1200329"/>
-          </a:xfrm>
-          <a:prstGeom prst="rect">
-            <a:avLst/>
-          </a:prstGeom>
-          <a:noFill/>
-        </p:spPr>
-        <p:txBody>
-          <a:bodyPr wrap="square" rtlCol="0">
-            <a:spAutoFit/>
-          </a:bodyPr>
-          <a:lstStyle/>
-          <a:p>
-            <a:pPr algn="ctr"/>
-            <a:r>
-              <a:rPr lang="en-US" dirty="0" smtClean="0"/>
-              <a:t>HW 12 </a:t>
-            </a:r>
-            <a:endParaRPr lang="en-US" dirty="0"/>
-          </a:p>
-          <a:p>
-            <a:pPr algn="ctr"/>
-            <a:r>
-              <a:rPr lang="en-US" b="1" u="sng" dirty="0" smtClean="0"/>
-              <a:t>One-way, independent groups ANOVA</a:t>
-            </a:r>
-          </a:p>
-          <a:p>
-            <a:pPr algn="ctr"/>
-            <a:r>
-              <a:rPr lang="en-US" dirty="0" smtClean="0"/>
-              <a:t>Items with APA methods/results</a:t>
-            </a:r>
-          </a:p>
-          <a:p>
-            <a:pPr algn="ctr"/>
-            <a:endParaRPr lang="en-US" b="1" dirty="0"/>
-          </a:p>
-        </p:txBody>
-      </p:sp>
-      <p:pic>
-        <p:nvPicPr>
-          <p:cNvPr id="5" name="Picture 4"/>
-          <p:cNvPicPr>
-            <a:picLocks noChangeAspect="1"/>
-          </p:cNvPicPr>
-          <p:nvPr/>
-        </p:nvPicPr>
-        <p:blipFill>
-          <a:blip r:embed="rId6"/>
-          <a:stretch>
-            <a:fillRect/>
-          </a:stretch>
-        </p:blipFill>
-        <p:spPr>
-          <a:xfrm>
-            <a:off x="1985351" y="4872564"/>
-            <a:ext cx="1853345" cy="853514"/>
-          </a:xfrm>
-          <a:prstGeom prst="rect">
-            <a:avLst/>
-          </a:prstGeom>
-        </p:spPr>
-      </p:pic>
-    </p:spTree>
-    <p:extLst>
-      <p:ext uri="{BB962C8B-B14F-4D97-AF65-F5344CB8AC3E}">
-        <p14:creationId xmlns:p14="http://schemas.microsoft.com/office/powerpoint/2010/main" val="636154248"/>
       </p:ext>
     </p:extLst>
   </p:cSld>

</xml_diff>